<commit_message>
adicionada nova versão separada da apresentação do TCC
</commit_message>
<xml_diff>
--- a/TCC_apresentação.pptx
+++ b/TCC_apresentação.pptx
@@ -8,49 +8,46 @@
     <p:sldId id="256" r:id="rId2"/>
     <p:sldId id="257" r:id="rId3"/>
     <p:sldId id="260" r:id="rId4"/>
-    <p:sldId id="261" r:id="rId5"/>
-    <p:sldId id="262" r:id="rId6"/>
-    <p:sldId id="263" r:id="rId7"/>
-    <p:sldId id="264" r:id="rId8"/>
-    <p:sldId id="265" r:id="rId9"/>
-    <p:sldId id="266" r:id="rId10"/>
-    <p:sldId id="267" r:id="rId11"/>
-    <p:sldId id="268" r:id="rId12"/>
-    <p:sldId id="278" r:id="rId13"/>
-    <p:sldId id="279" r:id="rId14"/>
-    <p:sldId id="269" r:id="rId15"/>
-    <p:sldId id="281" r:id="rId16"/>
-    <p:sldId id="282" r:id="rId17"/>
-    <p:sldId id="284" r:id="rId18"/>
-    <p:sldId id="283" r:id="rId19"/>
-    <p:sldId id="285" r:id="rId20"/>
-    <p:sldId id="280" r:id="rId21"/>
-    <p:sldId id="286" r:id="rId22"/>
-    <p:sldId id="287" r:id="rId23"/>
-    <p:sldId id="288" r:id="rId24"/>
-    <p:sldId id="270" r:id="rId25"/>
-    <p:sldId id="271" r:id="rId26"/>
-    <p:sldId id="289" r:id="rId27"/>
-    <p:sldId id="272" r:id="rId28"/>
-    <p:sldId id="274" r:id="rId29"/>
-    <p:sldId id="290" r:id="rId30"/>
-    <p:sldId id="291" r:id="rId31"/>
-    <p:sldId id="292" r:id="rId32"/>
-    <p:sldId id="293" r:id="rId33"/>
-    <p:sldId id="294" r:id="rId34"/>
-    <p:sldId id="297" r:id="rId35"/>
-    <p:sldId id="296" r:id="rId36"/>
-    <p:sldId id="298" r:id="rId37"/>
-    <p:sldId id="299" r:id="rId38"/>
-    <p:sldId id="300" r:id="rId39"/>
-    <p:sldId id="301" r:id="rId40"/>
-    <p:sldId id="302" r:id="rId41"/>
-    <p:sldId id="303" r:id="rId42"/>
-    <p:sldId id="304" r:id="rId43"/>
-    <p:sldId id="275" r:id="rId44"/>
-    <p:sldId id="276" r:id="rId45"/>
-    <p:sldId id="305" r:id="rId46"/>
-    <p:sldId id="277" r:id="rId47"/>
+    <p:sldId id="262" r:id="rId5"/>
+    <p:sldId id="263" r:id="rId6"/>
+    <p:sldId id="264" r:id="rId7"/>
+    <p:sldId id="265" r:id="rId8"/>
+    <p:sldId id="267" r:id="rId9"/>
+    <p:sldId id="268" r:id="rId10"/>
+    <p:sldId id="278" r:id="rId11"/>
+    <p:sldId id="279" r:id="rId12"/>
+    <p:sldId id="269" r:id="rId13"/>
+    <p:sldId id="281" r:id="rId14"/>
+    <p:sldId id="282" r:id="rId15"/>
+    <p:sldId id="284" r:id="rId16"/>
+    <p:sldId id="283" r:id="rId17"/>
+    <p:sldId id="280" r:id="rId18"/>
+    <p:sldId id="286" r:id="rId19"/>
+    <p:sldId id="287" r:id="rId20"/>
+    <p:sldId id="288" r:id="rId21"/>
+    <p:sldId id="270" r:id="rId22"/>
+    <p:sldId id="271" r:id="rId23"/>
+    <p:sldId id="289" r:id="rId24"/>
+    <p:sldId id="272" r:id="rId25"/>
+    <p:sldId id="274" r:id="rId26"/>
+    <p:sldId id="290" r:id="rId27"/>
+    <p:sldId id="291" r:id="rId28"/>
+    <p:sldId id="292" r:id="rId29"/>
+    <p:sldId id="293" r:id="rId30"/>
+    <p:sldId id="294" r:id="rId31"/>
+    <p:sldId id="297" r:id="rId32"/>
+    <p:sldId id="296" r:id="rId33"/>
+    <p:sldId id="298" r:id="rId34"/>
+    <p:sldId id="299" r:id="rId35"/>
+    <p:sldId id="300" r:id="rId36"/>
+    <p:sldId id="301" r:id="rId37"/>
+    <p:sldId id="302" r:id="rId38"/>
+    <p:sldId id="303" r:id="rId39"/>
+    <p:sldId id="304" r:id="rId40"/>
+    <p:sldId id="275" r:id="rId41"/>
+    <p:sldId id="276" r:id="rId42"/>
+    <p:sldId id="305" r:id="rId43"/>
+    <p:sldId id="277" r:id="rId44"/>
   </p:sldIdLst>
   <p:sldSz cx="9144000" cy="6858000" type="screen4x3"/>
   <p:notesSz cx="6858000" cy="9144000"/>
@@ -334,7 +331,7 @@
             <a:fld id="{2E700DB3-DBF0-4086-B675-117E7A9610B8}" type="datetimeFigureOut">
               <a:rPr lang="pt-BR" smtClean="0"/>
               <a:pPr/>
-              <a:t>14/12/2018</a:t>
+              <a:t>17/12/2018</a:t>
             </a:fld>
             <a:endParaRPr lang="pt-BR"/>
           </a:p>
@@ -501,7 +498,7 @@
             <a:fld id="{2E700DB3-DBF0-4086-B675-117E7A9610B8}" type="datetimeFigureOut">
               <a:rPr lang="pt-BR" smtClean="0"/>
               <a:pPr/>
-              <a:t>14/12/2018</a:t>
+              <a:t>17/12/2018</a:t>
             </a:fld>
             <a:endParaRPr lang="pt-BR"/>
           </a:p>
@@ -678,7 +675,7 @@
             <a:fld id="{2E700DB3-DBF0-4086-B675-117E7A9610B8}" type="datetimeFigureOut">
               <a:rPr lang="pt-BR" smtClean="0"/>
               <a:pPr/>
-              <a:t>14/12/2018</a:t>
+              <a:t>17/12/2018</a:t>
             </a:fld>
             <a:endParaRPr lang="pt-BR"/>
           </a:p>
@@ -845,7 +842,7 @@
             <a:fld id="{2E700DB3-DBF0-4086-B675-117E7A9610B8}" type="datetimeFigureOut">
               <a:rPr lang="pt-BR" smtClean="0"/>
               <a:pPr/>
-              <a:t>14/12/2018</a:t>
+              <a:t>17/12/2018</a:t>
             </a:fld>
             <a:endParaRPr lang="pt-BR"/>
           </a:p>
@@ -1088,7 +1085,7 @@
             <a:fld id="{2E700DB3-DBF0-4086-B675-117E7A9610B8}" type="datetimeFigureOut">
               <a:rPr lang="pt-BR" smtClean="0"/>
               <a:pPr/>
-              <a:t>14/12/2018</a:t>
+              <a:t>17/12/2018</a:t>
             </a:fld>
             <a:endParaRPr lang="pt-BR"/>
           </a:p>
@@ -1373,7 +1370,7 @@
             <a:fld id="{2E700DB3-DBF0-4086-B675-117E7A9610B8}" type="datetimeFigureOut">
               <a:rPr lang="pt-BR" smtClean="0"/>
               <a:pPr/>
-              <a:t>14/12/2018</a:t>
+              <a:t>17/12/2018</a:t>
             </a:fld>
             <a:endParaRPr lang="pt-BR"/>
           </a:p>
@@ -1792,7 +1789,7 @@
             <a:fld id="{2E700DB3-DBF0-4086-B675-117E7A9610B8}" type="datetimeFigureOut">
               <a:rPr lang="pt-BR" smtClean="0"/>
               <a:pPr/>
-              <a:t>14/12/2018</a:t>
+              <a:t>17/12/2018</a:t>
             </a:fld>
             <a:endParaRPr lang="pt-BR"/>
           </a:p>
@@ -1907,7 +1904,7 @@
             <a:fld id="{2E700DB3-DBF0-4086-B675-117E7A9610B8}" type="datetimeFigureOut">
               <a:rPr lang="pt-BR" smtClean="0"/>
               <a:pPr/>
-              <a:t>14/12/2018</a:t>
+              <a:t>17/12/2018</a:t>
             </a:fld>
             <a:endParaRPr lang="pt-BR"/>
           </a:p>
@@ -1999,7 +1996,7 @@
             <a:fld id="{2E700DB3-DBF0-4086-B675-117E7A9610B8}" type="datetimeFigureOut">
               <a:rPr lang="pt-BR" smtClean="0"/>
               <a:pPr/>
-              <a:t>14/12/2018</a:t>
+              <a:t>17/12/2018</a:t>
             </a:fld>
             <a:endParaRPr lang="pt-BR"/>
           </a:p>
@@ -2273,7 +2270,7 @@
             <a:fld id="{2E700DB3-DBF0-4086-B675-117E7A9610B8}" type="datetimeFigureOut">
               <a:rPr lang="pt-BR" smtClean="0"/>
               <a:pPr/>
-              <a:t>14/12/2018</a:t>
+              <a:t>17/12/2018</a:t>
             </a:fld>
             <a:endParaRPr lang="pt-BR"/>
           </a:p>
@@ -2523,7 +2520,7 @@
             <a:fld id="{2E700DB3-DBF0-4086-B675-117E7A9610B8}" type="datetimeFigureOut">
               <a:rPr lang="pt-BR" smtClean="0"/>
               <a:pPr/>
-              <a:t>14/12/2018</a:t>
+              <a:t>17/12/2018</a:t>
             </a:fld>
             <a:endParaRPr lang="pt-BR"/>
           </a:p>
@@ -2733,7 +2730,7 @@
             <a:fld id="{2E700DB3-DBF0-4086-B675-117E7A9610B8}" type="datetimeFigureOut">
               <a:rPr lang="pt-BR" smtClean="0"/>
               <a:pPr/>
-              <a:t>14/12/2018</a:t>
+              <a:t>17/12/2018</a:t>
             </a:fld>
             <a:endParaRPr lang="pt-BR"/>
           </a:p>
@@ -3223,123 +3220,35 @@
           <a:p>
             <a:r>
               <a:rPr lang="pt-BR" sz="4000" dirty="0" smtClean="0"/>
-              <a:t>Fontes naturais e artificiais de radiação</a:t>
+              <a:t>Marie Curie</a:t>
             </a:r>
             <a:endParaRPr lang="pt-BR" sz="4000" dirty="0"/>
           </a:p>
         </p:txBody>
       </p:sp>
-      <p:sp>
-        <p:nvSpPr>
-          <p:cNvPr id="3" name="Espaço Reservado para Conteúdo 2"/>
-          <p:cNvSpPr>
-            <a:spLocks noGrp="1"/>
-          </p:cNvSpPr>
+      <p:pic>
+        <p:nvPicPr>
+          <p:cNvPr id="4" name="Espaço Reservado para Conteúdo 3" descr="Marie Curie.jpeg"/>
+          <p:cNvPicPr>
+            <a:picLocks noGrp="1" noChangeAspect="1"/>
+          </p:cNvPicPr>
           <p:nvPr>
             <p:ph idx="1"/>
           </p:nvPr>
-        </p:nvSpPr>
-        <p:spPr/>
-        <p:txBody>
-          <a:bodyPr/>
-          <a:lstStyle/>
-          <a:p>
-            <a:r>
-              <a:rPr lang="pt-BR" sz="2800" dirty="0" smtClean="0"/>
-              <a:t>Fonte natural:</a:t>
-            </a:r>
-          </a:p>
-          <a:p>
-            <a:pPr lvl="1"/>
-            <a:r>
-              <a:rPr lang="pt-BR" dirty="0" smtClean="0"/>
-              <a:t>Radiação cósmica:</a:t>
-            </a:r>
-          </a:p>
-          <a:p>
-            <a:pPr lvl="2"/>
-            <a:r>
-              <a:rPr lang="pt-BR" dirty="0" smtClean="0"/>
-              <a:t>Elementos químicos sintetizados no momento da explosão de uma supernova, que são dispersos através do espaço sideral.</a:t>
-            </a:r>
-          </a:p>
-          <a:p>
-            <a:r>
-              <a:rPr lang="pt-BR" sz="2800" dirty="0" smtClean="0"/>
-              <a:t>Fontes artificiais:</a:t>
-            </a:r>
-          </a:p>
-          <a:p>
-            <a:pPr lvl="1"/>
-            <a:r>
-              <a:rPr lang="pt-BR" sz="2400" dirty="0" smtClean="0"/>
-              <a:t>Dispositivos de diagnóstico e terapia na medicina;</a:t>
-            </a:r>
-          </a:p>
-          <a:p>
-            <a:pPr lvl="1"/>
-            <a:r>
-              <a:rPr lang="en-US" sz="2400" dirty="0" err="1" smtClean="0"/>
-              <a:t>Medidores</a:t>
-            </a:r>
-            <a:r>
-              <a:rPr lang="en-US" sz="2400" dirty="0" smtClean="0"/>
-              <a:t> e </a:t>
-            </a:r>
-            <a:r>
-              <a:rPr lang="en-US" sz="2400" dirty="0" err="1" smtClean="0"/>
-              <a:t>radiografias</a:t>
-            </a:r>
-            <a:r>
-              <a:rPr lang="en-US" sz="2400" dirty="0" smtClean="0"/>
-              <a:t> </a:t>
-            </a:r>
-            <a:r>
-              <a:rPr lang="en-US" sz="2400" dirty="0" err="1" smtClean="0"/>
-              <a:t>usados</a:t>
-            </a:r>
-            <a:r>
-              <a:rPr lang="en-US" sz="2400" dirty="0" smtClean="0"/>
-              <a:t> </a:t>
-            </a:r>
-            <a:r>
-              <a:rPr lang="en-US" sz="2400" dirty="0" err="1" smtClean="0"/>
-              <a:t>na</a:t>
-            </a:r>
-            <a:r>
-              <a:rPr lang="en-US" sz="2400" dirty="0" smtClean="0"/>
-              <a:t> </a:t>
-            </a:r>
-            <a:r>
-              <a:rPr lang="en-US" sz="2400" dirty="0" err="1" smtClean="0"/>
-              <a:t>ind</a:t>
-            </a:r>
-            <a:r>
-              <a:rPr lang="pt-BR" sz="2400" dirty="0" err="1" smtClean="0"/>
-              <a:t>ústria</a:t>
-            </a:r>
-            <a:r>
-              <a:rPr lang="pt-BR" sz="2400" dirty="0" smtClean="0"/>
-              <a:t> e comércio;</a:t>
-            </a:r>
-          </a:p>
-          <a:p>
-            <a:pPr lvl="1"/>
-            <a:r>
-              <a:rPr lang="pt-BR" sz="2400" dirty="0" smtClean="0"/>
-              <a:t>Instalações do ciclo de combustível nuclear e máquinas utilizadas nas pesquisas científicas.</a:t>
-            </a:r>
-          </a:p>
-          <a:p>
-            <a:pPr lvl="1"/>
-            <a:endParaRPr lang="pt-BR" sz="2400" dirty="0" smtClean="0"/>
-          </a:p>
-          <a:p>
-            <a:pPr lvl="1"/>
-            <a:endParaRPr lang="pt-BR" dirty="0"/>
-          </a:p>
-        </p:txBody>
-      </p:sp>
+        </p:nvPicPr>
+        <p:blipFill>
+          <a:blip r:embed="rId2" cstate="print"/>
+          <a:stretch>
+            <a:fillRect/>
+          </a:stretch>
+        </p:blipFill>
+        <p:spPr>
+          <a:xfrm>
+            <a:off x="1563155" y="1600200"/>
+            <a:ext cx="6017690" cy="4525963"/>
+          </a:xfrm>
+        </p:spPr>
+      </p:pic>
     </p:spTree>
   </p:cSld>
   <p:clrMapOvr>
@@ -3384,7 +3293,7 @@
           <a:p>
             <a:r>
               <a:rPr lang="pt-BR" sz="4000" dirty="0" smtClean="0"/>
-              <a:t>Efeitos biológicos</a:t>
+              <a:t>Exposição à radiação</a:t>
             </a:r>
             <a:endParaRPr lang="pt-BR" sz="4000" dirty="0"/>
           </a:p>
@@ -3409,30 +3318,28 @@
           <a:p>
             <a:r>
               <a:rPr lang="pt-BR" sz="2800" dirty="0" smtClean="0"/>
-              <a:t>A relação entre exposição à radiação ionizante e os efeitos biológicos induzidos no homem foi estabelecida pela observação de efeitos danosos em pessoas nas primeiras exposições com raios X, e em exposições com </a:t>
-            </a:r>
-            <a:r>
-              <a:rPr lang="pt-BR" sz="2800" dirty="0" err="1" smtClean="0"/>
-              <a:t>radionuclídeos</a:t>
-            </a:r>
-            <a:r>
-              <a:rPr lang="pt-BR" sz="2800" dirty="0" smtClean="0"/>
-              <a:t> sofridas pelos pioneiros nas descobertas sobre radioatividade.</a:t>
+              <a:t>A exposição do homem ou parte de seus tecidos à radiação, pode ter resultados bem diferentes:</a:t>
             </a:r>
           </a:p>
           <a:p>
             <a:pPr lvl="1"/>
             <a:r>
               <a:rPr lang="pt-BR" sz="2400" dirty="0" smtClean="0"/>
-              <a:t>como exemplo o caso de Marie Curie, que, junto de seu marido, descobriu o polônio (</a:t>
-            </a:r>
-            <a:r>
-              <a:rPr lang="pt-BR" sz="2400" dirty="0" err="1" smtClean="0"/>
-              <a:t>Pu</a:t>
-            </a:r>
+              <a:t>Se ocorreu de uma única vez (exames radiológicos, como tomografia);</a:t>
+            </a:r>
+          </a:p>
+          <a:p>
+            <a:pPr lvl="1"/>
             <a:r>
               <a:rPr lang="pt-BR" sz="2400" dirty="0" smtClean="0"/>
-              <a:t>) e o rádio (Ra), e que faleceu por conta de uma grave leucemia devido à exposição maciça a radiação de suas descobertas.</a:t>
+              <a:t>Se ocorreu de maneira fracionada (tratamento radioterápico);</a:t>
+            </a:r>
+          </a:p>
+          <a:p>
+            <a:pPr lvl="1"/>
+            <a:r>
+              <a:rPr lang="pt-BR" sz="2400" dirty="0" smtClean="0"/>
+              <a:t>Se ocorreu periodicamente (rotinas de trabalho com material radioativo em instalações nucleares).</a:t>
             </a:r>
             <a:endParaRPr lang="pt-BR" sz="2400" dirty="0"/>
           </a:p>
@@ -3482,35 +3389,72 @@
           <a:p>
             <a:r>
               <a:rPr lang="pt-BR" sz="4000" dirty="0" smtClean="0"/>
-              <a:t>Marie Curie</a:t>
+              <a:t>Exposição à radiação</a:t>
             </a:r>
             <a:endParaRPr lang="pt-BR" sz="4000" dirty="0"/>
           </a:p>
         </p:txBody>
       </p:sp>
-      <p:pic>
-        <p:nvPicPr>
-          <p:cNvPr id="4" name="Espaço Reservado para Conteúdo 3" descr="Marie Curie.jpeg"/>
-          <p:cNvPicPr>
-            <a:picLocks noGrp="1" noChangeAspect="1"/>
-          </p:cNvPicPr>
+      <p:sp>
+        <p:nvSpPr>
+          <p:cNvPr id="3" name="Espaço Reservado para Conteúdo 2"/>
+          <p:cNvSpPr>
+            <a:spLocks noGrp="1"/>
+          </p:cNvSpPr>
           <p:nvPr>
             <p:ph idx="1"/>
           </p:nvPr>
-        </p:nvPicPr>
-        <p:blipFill>
-          <a:blip r:embed="rId2" cstate="print"/>
-          <a:stretch>
-            <a:fillRect/>
-          </a:stretch>
-        </p:blipFill>
-        <p:spPr>
-          <a:xfrm>
-            <a:off x="1563155" y="1600200"/>
-            <a:ext cx="6017690" cy="4525963"/>
-          </a:xfrm>
-        </p:spPr>
-      </p:pic>
+        </p:nvSpPr>
+        <p:spPr/>
+        <p:txBody>
+          <a:bodyPr>
+            <a:normAutofit/>
+          </a:bodyPr>
+          <a:lstStyle/>
+          <a:p>
+            <a:r>
+              <a:rPr lang="pt-BR" sz="2800" dirty="0" smtClean="0"/>
+              <a:t>Ainda, a reação de um indivíduo exposto à radiação depende de outros fatores, tais como:</a:t>
+            </a:r>
+          </a:p>
+          <a:p>
+            <a:pPr lvl="1"/>
+            <a:r>
+              <a:rPr lang="pt-BR" sz="2400" dirty="0" smtClean="0"/>
+              <a:t>Quantidade total (acumulativa) de radiação recebida;</a:t>
+            </a:r>
+          </a:p>
+          <a:p>
+            <a:pPr lvl="1"/>
+            <a:r>
+              <a:rPr lang="pt-BR" sz="2400" dirty="0" smtClean="0"/>
+              <a:t>Quantidade total (acumulativa) de radiação recebida anteriormente pelo organismo, sem recuperação;</a:t>
+            </a:r>
+          </a:p>
+          <a:p>
+            <a:pPr lvl="1"/>
+            <a:r>
+              <a:rPr lang="pt-BR" sz="2400" dirty="0" smtClean="0"/>
+              <a:t>Textura orgânica individual;</a:t>
+            </a:r>
+          </a:p>
+          <a:p>
+            <a:pPr lvl="1"/>
+            <a:r>
+              <a:rPr lang="pt-BR" sz="2400" dirty="0" smtClean="0"/>
+              <a:t>Dano físico recebido simultaneamente com a dose de radiação (como queimaduras devido ao calor gerado);</a:t>
+            </a:r>
+          </a:p>
+          <a:p>
+            <a:pPr lvl="1"/>
+            <a:r>
+              <a:rPr lang="pt-BR" sz="2400" dirty="0" smtClean="0"/>
+              <a:t>Intervalo de tempo durante o qual a quantidade total de radiação foi recebida.</a:t>
+            </a:r>
+            <a:endParaRPr lang="pt-BR" sz="2400" dirty="0"/>
+          </a:p>
+        </p:txBody>
+      </p:sp>
     </p:spTree>
   </p:cSld>
   <p:clrMapOvr>
@@ -3574,36 +3518,32 @@
         <p:spPr/>
         <p:txBody>
           <a:bodyPr>
-            <a:normAutofit/>
+            <a:normAutofit fontScale="92500"/>
           </a:bodyPr>
           <a:lstStyle/>
           <a:p>
             <a:r>
               <a:rPr lang="pt-BR" sz="2800" dirty="0" smtClean="0"/>
-              <a:t>A exposição do homem ou parte de seus tecidos à radiação, pode ter resultados bem diferentes:</a:t>
-            </a:r>
-          </a:p>
-          <a:p>
-            <a:pPr lvl="1"/>
-            <a:r>
-              <a:rPr lang="pt-BR" sz="2400" dirty="0" smtClean="0"/>
-              <a:t>Se ocorreu de uma única vez (exames radiológicos, como tomografia);</a:t>
-            </a:r>
-          </a:p>
-          <a:p>
-            <a:pPr lvl="1"/>
-            <a:r>
-              <a:rPr lang="pt-BR" sz="2400" dirty="0" smtClean="0"/>
-              <a:t>Se ocorreu de maneira fracionada (tratamento radioterápico);</a:t>
-            </a:r>
-          </a:p>
-          <a:p>
-            <a:pPr lvl="1"/>
-            <a:r>
-              <a:rPr lang="pt-BR" sz="2400" dirty="0" smtClean="0"/>
-              <a:t>Se ocorreu periodicamente (rotinas de trabalho com material radioativo em instalações nucleares).</a:t>
-            </a:r>
-            <a:endParaRPr lang="pt-BR" sz="2400" dirty="0"/>
+              <a:t>A radiação alfa é constituída por núcleos de hélio (sem elétrons) e pode ser detida por uma folha de papel;</a:t>
+            </a:r>
+          </a:p>
+          <a:p>
+            <a:r>
+              <a:rPr lang="pt-BR" sz="2800" dirty="0" smtClean="0"/>
+              <a:t>A radiação beta é constituída pelo envio de apenas um elétron rápido e pode ser detida por uma folha de alumínio, pedaço de plástico e tecido humano;</a:t>
+            </a:r>
+          </a:p>
+          <a:p>
+            <a:r>
+              <a:rPr lang="pt-BR" sz="2800" dirty="0" smtClean="0"/>
+              <a:t>A radiação gama, constituída por ondas eletromagnéticas é absorvida ao penetrar um material mais denso (como concreto ou chumbo);</a:t>
+            </a:r>
+          </a:p>
+          <a:p>
+            <a:r>
+              <a:rPr lang="pt-BR" sz="2800" dirty="0" smtClean="0"/>
+              <a:t>As partículas de nêutron podem atravessar o concreto.</a:t>
+            </a:r>
           </a:p>
         </p:txBody>
       </p:sp>
@@ -3657,70 +3597,37 @@
           </a:p>
         </p:txBody>
       </p:sp>
-      <p:sp>
-        <p:nvSpPr>
-          <p:cNvPr id="3" name="Espaço Reservado para Conteúdo 2"/>
-          <p:cNvSpPr>
-            <a:spLocks noGrp="1"/>
-          </p:cNvSpPr>
+      <p:pic>
+        <p:nvPicPr>
+          <p:cNvPr id="4" name="Espaço Reservado para Conteúdo 3" descr="penetracao_radiacao.png"/>
+          <p:cNvPicPr>
+            <a:picLocks noGrp="1" noChangeAspect="1"/>
+          </p:cNvPicPr>
           <p:nvPr>
             <p:ph idx="1"/>
           </p:nvPr>
-        </p:nvSpPr>
-        <p:spPr/>
-        <p:txBody>
-          <a:bodyPr>
-            <a:normAutofit/>
-          </a:bodyPr>
-          <a:lstStyle/>
-          <a:p>
-            <a:r>
-              <a:rPr lang="pt-BR" sz="2800" dirty="0" smtClean="0"/>
-              <a:t>Ainda, a reação de um indivíduo exposto à radiação depende de outros fatores, tais como:</a:t>
-            </a:r>
-          </a:p>
-          <a:p>
-            <a:pPr lvl="1"/>
-            <a:r>
-              <a:rPr lang="pt-BR" sz="2400" dirty="0" smtClean="0"/>
-              <a:t>Quantidade total (acumulativa) de radiação recebida;</a:t>
-            </a:r>
-          </a:p>
-          <a:p>
-            <a:pPr lvl="1"/>
-            <a:r>
-              <a:rPr lang="pt-BR" sz="2400" dirty="0" smtClean="0"/>
-              <a:t>Quantidade total (acumulativa) de radiação recebida anteriormente pelo organismo, sem recuperação;</a:t>
-            </a:r>
-          </a:p>
-          <a:p>
-            <a:pPr lvl="1"/>
-            <a:r>
-              <a:rPr lang="pt-BR" sz="2400" dirty="0" smtClean="0"/>
-              <a:t>Textura orgânica individual;</a:t>
-            </a:r>
-          </a:p>
-          <a:p>
-            <a:pPr lvl="1"/>
-            <a:r>
-              <a:rPr lang="pt-BR" sz="2400" dirty="0" smtClean="0"/>
-              <a:t>Dano físico recebido simultaneament</a:t>
-            </a:r>
-            <a:r>
-              <a:rPr lang="pt-BR" sz="2400" dirty="0" smtClean="0"/>
-              <a:t>e com a dose de radiação (como queimaduras devido ao calor gerado);</a:t>
-            </a:r>
-          </a:p>
-          <a:p>
-            <a:pPr lvl="1"/>
-            <a:r>
-              <a:rPr lang="pt-BR" sz="2400" dirty="0" smtClean="0"/>
-              <a:t>Intervalo de tempo durante o qual a quantidade total de radiação foi recebida.</a:t>
-            </a:r>
-            <a:endParaRPr lang="pt-BR" sz="2400" dirty="0"/>
-          </a:p>
-        </p:txBody>
-      </p:sp>
+        </p:nvPicPr>
+        <p:blipFill>
+          <a:blip r:embed="rId2" cstate="print"/>
+          <a:stretch>
+            <a:fillRect/>
+          </a:stretch>
+        </p:blipFill>
+        <p:spPr>
+          <a:xfrm>
+            <a:off x="1554691" y="1600200"/>
+            <a:ext cx="6034618" cy="4525963"/>
+          </a:xfrm>
+          <a:ln>
+            <a:solidFill>
+              <a:schemeClr val="tx1">
+                <a:lumMod val="95000"/>
+                <a:lumOff val="5000"/>
+              </a:schemeClr>
+            </a:solidFill>
+          </a:ln>
+        </p:spPr>
+      </p:pic>
     </p:spTree>
   </p:cSld>
   <p:clrMapOvr>
@@ -3784,32 +3691,15 @@
         <p:spPr/>
         <p:txBody>
           <a:bodyPr>
-            <a:normAutofit fontScale="92500"/>
+            <a:normAutofit/>
           </a:bodyPr>
           <a:lstStyle/>
           <a:p>
             <a:r>
               <a:rPr lang="pt-BR" sz="2800" dirty="0" smtClean="0"/>
-              <a:t>A radiação alfa é constituída por núcleos de hélio (sem elétrons) e pode ser detida por uma folha de papel;</a:t>
-            </a:r>
-          </a:p>
-          <a:p>
-            <a:r>
-              <a:rPr lang="pt-BR" sz="2800" dirty="0" smtClean="0"/>
-              <a:t>A radiação beta é constituída pelo envio de apenas um elétron rápido e pode ser detida por uma folha de alumínio, pedaço de plástico e tecido humano;</a:t>
-            </a:r>
-          </a:p>
-          <a:p>
-            <a:r>
-              <a:rPr lang="pt-BR" sz="2800" dirty="0" smtClean="0"/>
-              <a:t>A radiação gama, constituída por ondas eletromagnéticas é absorvida ao penetrar um material mais denso (como concreto ou chumbo);</a:t>
-            </a:r>
-          </a:p>
-          <a:p>
-            <a:r>
-              <a:rPr lang="pt-BR" sz="2800" dirty="0" smtClean="0"/>
-              <a:t>As partículas de nêutron podem atravessar o concreto.</a:t>
-            </a:r>
+              <a:t>Os fótons (raios X e raios gama) e nêutrons constituem as radiações mais penetrantes e causam danos biológicos diferentes conforme a taxa de dose, energia e tipo de irradiação.</a:t>
+            </a:r>
+            <a:endParaRPr lang="pt-BR" sz="2800" dirty="0"/>
           </a:p>
         </p:txBody>
       </p:sp>
@@ -3863,29 +3753,37 @@
           </a:p>
         </p:txBody>
       </p:sp>
-      <p:pic>
-        <p:nvPicPr>
-          <p:cNvPr id="4" name="Espaço Reservado para Conteúdo 3" descr="penetracao_radiacao.png"/>
-          <p:cNvPicPr>
-            <a:picLocks noGrp="1" noChangeAspect="1"/>
-          </p:cNvPicPr>
+      <p:sp>
+        <p:nvSpPr>
+          <p:cNvPr id="3" name="Espaço Reservado para Conteúdo 2"/>
+          <p:cNvSpPr>
+            <a:spLocks noGrp="1"/>
+          </p:cNvSpPr>
           <p:nvPr>
             <p:ph idx="1"/>
           </p:nvPr>
-        </p:nvPicPr>
-        <p:blipFill>
-          <a:blip r:embed="rId2" cstate="print"/>
-          <a:stretch>
-            <a:fillRect/>
-          </a:stretch>
-        </p:blipFill>
-        <p:spPr>
-          <a:xfrm>
-            <a:off x="1554691" y="1600200"/>
-            <a:ext cx="6034618" cy="4525963"/>
-          </a:xfrm>
-        </p:spPr>
-      </p:pic>
+        </p:nvSpPr>
+        <p:spPr/>
+        <p:txBody>
+          <a:bodyPr>
+            <a:normAutofit/>
+          </a:bodyPr>
+          <a:lstStyle/>
+          <a:p>
+            <a:r>
+              <a:rPr lang="pt-BR" sz="2800" dirty="0" smtClean="0"/>
+              <a:t>Quando a quantidade de efeitos biológicos é pequena, o organismo pode ser recuperar, sem que a pessoa perceba;</a:t>
+            </a:r>
+          </a:p>
+          <a:p>
+            <a:r>
+              <a:rPr lang="pt-BR" sz="2800" dirty="0" smtClean="0"/>
+              <a:t>Quando a quantidade ou frequência de efeitos biológicos produzidos pela radiação desequilibra o organismo humano ou o funcionamento de um órgão, surgem sintomas clínicos denunciadores da incapacidade do organismo de superar ou reparar tais danos, que são as doenças.</a:t>
+            </a:r>
+            <a:endParaRPr lang="pt-BR" sz="2800" dirty="0"/>
+          </a:p>
+        </p:txBody>
+      </p:sp>
     </p:spTree>
   </p:cSld>
   <p:clrMapOvr>
@@ -3930,7 +3828,7 @@
           <a:p>
             <a:r>
               <a:rPr lang="pt-BR" sz="4000" dirty="0" smtClean="0"/>
-              <a:t>Exposição à radiação</a:t>
+              <a:t>Efeitos estocásticos</a:t>
             </a:r>
             <a:endParaRPr lang="pt-BR" sz="4000" dirty="0"/>
           </a:p>
@@ -3955,7 +3853,13 @@
           <a:p>
             <a:r>
               <a:rPr lang="pt-BR" sz="2800" dirty="0" smtClean="0"/>
-              <a:t>Os fótons (raios X e raios gama) e nêutrons constituem as radiações mais penetrantes e causam danos biológicos diferentes conforme a taxa de dose, energia e tipo de irradiação.</a:t>
+              <a:t>São efeitos cuja probabilidade de ocorrência é em função da dose de radiação recebida, não existindo limiar, como é o caso dos cânceres;</a:t>
+            </a:r>
+          </a:p>
+          <a:p>
+            <a:r>
+              <a:rPr lang="pt-BR" sz="2800" dirty="0" smtClean="0"/>
+              <a:t>Para qualquer indivíduo irradiado há uma chance de que certos efeitos atribuídos à radiação se manifestem, mas só depois de um período longo (dezenas de anos) a partir do momento que ocorreu o evento de irradiação.</a:t>
             </a:r>
             <a:endParaRPr lang="pt-BR" sz="2800" dirty="0"/>
           </a:p>
@@ -4005,7 +3909,7 @@
           <a:p>
             <a:r>
               <a:rPr lang="pt-BR" sz="4000" dirty="0" smtClean="0"/>
-              <a:t>Exposição à radiação</a:t>
+              <a:t>Danos celulares</a:t>
             </a:r>
             <a:endParaRPr lang="pt-BR" sz="4000" dirty="0"/>
           </a:p>
@@ -4030,15 +3934,35 @@
           <a:p>
             <a:r>
               <a:rPr lang="pt-BR" sz="2800" dirty="0" smtClean="0"/>
-              <a:t>Quando a quantidade de efeitos biológicos é pequena, o organismo pode ser recuperar, sem que a pessoa perceba;</a:t>
-            </a:r>
-          </a:p>
-          <a:p>
-            <a:r>
-              <a:rPr lang="pt-BR" sz="2800" dirty="0" smtClean="0"/>
-              <a:t>Quando a quantidade ou frequência de efeitos biológicos produzidos pela radiação desequilibra o organismo humano ou o funcionamento de um órgão, surgem sintomas clínicos denunciadores da incapacidade do organismo de superar ou reparar tais danos, que são as doenças.</a:t>
-            </a:r>
-            <a:endParaRPr lang="pt-BR" sz="2800" dirty="0"/>
+              <a:t>O processo de ionização pode alterar a estrutura das moléculas </a:t>
+            </a:r>
+            <a:r>
+              <a:rPr lang="pt-BR" sz="2800" dirty="0" smtClean="0"/>
+              <a:t>ou átomos atingidos pela radiação.</a:t>
+            </a:r>
+            <a:endParaRPr lang="pt-BR" sz="2800" dirty="0" smtClean="0"/>
+          </a:p>
+          <a:p>
+            <a:pPr lvl="1"/>
+            <a:r>
+              <a:rPr lang="pt-BR" sz="2400" dirty="0" smtClean="0"/>
+              <a:t>Se a energia de excitação ultrapassar a energia de ligação química entre os átomos, pode ocorrer quebra dessas ligações, criando mudanças moleculares;</a:t>
+            </a:r>
+          </a:p>
+          <a:p>
+            <a:pPr lvl="1"/>
+            <a:r>
+              <a:rPr lang="pt-BR" sz="2400" dirty="0" smtClean="0"/>
+              <a:t>Se células são compostas por essas moléculas modificadas, elas sofrerão as consequências das alterações:</a:t>
+            </a:r>
+          </a:p>
+          <a:p>
+            <a:pPr lvl="2"/>
+            <a:r>
+              <a:rPr lang="pt-BR" sz="2000" dirty="0" smtClean="0"/>
+              <a:t>Produzindo radicais livres, íons e elétrons.</a:t>
+            </a:r>
+            <a:endParaRPr lang="pt-BR" sz="2000" dirty="0"/>
           </a:p>
         </p:txBody>
       </p:sp>
@@ -4086,7 +4010,7 @@
           <a:p>
             <a:r>
               <a:rPr lang="pt-BR" sz="4000" dirty="0" smtClean="0"/>
-              <a:t>Exposição à radiação</a:t>
+              <a:t>Danos celulares</a:t>
             </a:r>
             <a:endParaRPr lang="pt-BR" sz="4000" dirty="0"/>
           </a:p>
@@ -4111,16 +4035,15 @@
           <a:p>
             <a:r>
               <a:rPr lang="pt-BR" sz="2800" dirty="0" smtClean="0"/>
-              <a:t>Um modelo conservativo em termos de proteção radiológica seria a correlação linear entre dose e efeito, mesmo para baixos valores de dose.</a:t>
-            </a:r>
-          </a:p>
-          <a:p>
-            <a:pPr lvl="1"/>
-            <a:r>
-              <a:rPr lang="pt-BR" sz="2400" dirty="0" smtClean="0"/>
-              <a:t>Este modelo, utilizado até hoje, se baseia numa extrapolação para doses muito baixas, do ajuste da curva obtida entre dose e efeitos biológicos observados em valores elevados.</a:t>
-            </a:r>
-            <a:endParaRPr lang="pt-BR" sz="2400" dirty="0"/>
+              <a:t>Se a molécula alterada possui papel crítico para o funcionamento da célula, pode resultar na alteração ou na morte da mesma;</a:t>
+            </a:r>
+          </a:p>
+          <a:p>
+            <a:r>
+              <a:rPr lang="pt-BR" sz="2800" dirty="0" smtClean="0"/>
+              <a:t>Quando a alteração molecular tem caráter deletério, ela significa um dano.</a:t>
+            </a:r>
+            <a:endParaRPr lang="pt-BR" sz="2800" dirty="0"/>
           </a:p>
         </p:txBody>
       </p:sp>
@@ -4312,8 +4235,16 @@
           <a:lstStyle/>
           <a:p>
             <a:r>
-              <a:rPr lang="pt-BR" sz="4000" dirty="0" smtClean="0"/>
-              <a:t>Efeitos estocásticos</a:t>
+              <a:rPr lang="en-US" sz="4000" dirty="0" err="1" smtClean="0"/>
+              <a:t>Danos</a:t>
+            </a:r>
+            <a:r>
+              <a:rPr lang="en-US" sz="4000" dirty="0" smtClean="0"/>
+              <a:t> </a:t>
+            </a:r>
+            <a:r>
+              <a:rPr lang="en-US" sz="4000" dirty="0" err="1" smtClean="0"/>
+              <a:t>celulares</a:t>
             </a:r>
             <a:endParaRPr lang="pt-BR" sz="4000" dirty="0"/>
           </a:p>
@@ -4337,16 +4268,64 @@
           <a:lstStyle/>
           <a:p>
             <a:r>
-              <a:rPr lang="pt-BR" sz="2800" dirty="0" smtClean="0"/>
-              <a:t>São efeitos cuja probabilidade de ocorrência é em função da dose de radiação recebida, não existindo limiar, como é o caso dos cânceres;</a:t>
-            </a:r>
-          </a:p>
-          <a:p>
-            <a:r>
-              <a:rPr lang="pt-BR" sz="2800" dirty="0" smtClean="0"/>
-              <a:t>Para qualquer indivíduo irradiado há uma chance de que certos efeitos atribuídos à radiação se manifestem, mas só depois de um período longo (dezenas de anos) a partir do momento que ocorreu o evento de irradiação.</a:t>
-            </a:r>
-            <a:endParaRPr lang="pt-BR" sz="2800" dirty="0"/>
+              <a:rPr lang="en-US" sz="2800" dirty="0" smtClean="0"/>
+              <a:t>Os </a:t>
+            </a:r>
+            <a:r>
+              <a:rPr lang="en-US" sz="2800" dirty="0" err="1" smtClean="0"/>
+              <a:t>danos</a:t>
+            </a:r>
+            <a:r>
+              <a:rPr lang="en-US" sz="2800" dirty="0" smtClean="0"/>
+              <a:t> </a:t>
+            </a:r>
+            <a:r>
+              <a:rPr lang="en-US" sz="2800" dirty="0" err="1" smtClean="0"/>
+              <a:t>relacionados</a:t>
+            </a:r>
+            <a:r>
+              <a:rPr lang="en-US" sz="2800" dirty="0" smtClean="0"/>
+              <a:t> </a:t>
+            </a:r>
+            <a:r>
+              <a:rPr lang="pt-BR" sz="2800" dirty="0" smtClean="0"/>
+              <a:t>à molécula do DNA são os mais significativos</a:t>
+            </a:r>
+            <a:r>
+              <a:rPr lang="pt-BR" sz="2800" dirty="0" smtClean="0"/>
+              <a:t>:</a:t>
+            </a:r>
+          </a:p>
+          <a:p>
+            <a:pPr lvl="1"/>
+            <a:r>
+              <a:rPr lang="pt-BR" sz="2400" dirty="0" smtClean="0"/>
+              <a:t>Se o reparo é eficiente e em tempo curto, o DNA pode voltar à sua composição original</a:t>
+            </a:r>
+            <a:r>
+              <a:rPr lang="pt-BR" sz="2400" dirty="0" smtClean="0"/>
+              <a:t>;</a:t>
+            </a:r>
+            <a:endParaRPr lang="pt-BR" sz="2400" dirty="0" smtClean="0"/>
+          </a:p>
+          <a:p>
+            <a:pPr lvl="1"/>
+            <a:r>
+              <a:rPr lang="pt-BR" sz="2400" dirty="0" smtClean="0"/>
+              <a:t>As células danificadas podem morrer ao tentar se dividir, ou conseguir realizar reparos mediados por enzimas;</a:t>
+            </a:r>
+          </a:p>
+          <a:p>
+            <a:pPr lvl="1"/>
+            <a:r>
+              <a:rPr lang="pt-BR" sz="2400" dirty="0" smtClean="0"/>
+              <a:t>Em </a:t>
+            </a:r>
+            <a:r>
+              <a:rPr lang="pt-BR" sz="2400" dirty="0" smtClean="0"/>
+              <a:t>um reparo propenso a erros, pode dar origem a mutações na sequência de bases ou rearranjos mais grosseiros, podendo levar à morte reprodutiva da célula ou a alterações no material genético das células sobreviventes, com consequências em longo prazo.</a:t>
+            </a:r>
+            <a:endParaRPr lang="pt-BR" sz="2400" dirty="0"/>
           </a:p>
         </p:txBody>
       </p:sp>
@@ -4394,7 +4373,15 @@
           <a:p>
             <a:r>
               <a:rPr lang="pt-BR" sz="4000" dirty="0" smtClean="0"/>
-              <a:t>Danos celulares</a:t>
+              <a:t>Dose absorvida (</a:t>
+            </a:r>
+            <a:r>
+              <a:rPr lang="pt-BR" sz="4000" i="1" dirty="0" smtClean="0"/>
+              <a:t>D</a:t>
+            </a:r>
+            <a:r>
+              <a:rPr lang="pt-BR" sz="4000" dirty="0" smtClean="0"/>
+              <a:t>)</a:t>
             </a:r>
             <a:endParaRPr lang="pt-BR" sz="4000" dirty="0"/>
           </a:p>
@@ -4419,328 +4406,7 @@
           <a:p>
             <a:r>
               <a:rPr lang="pt-BR" sz="2800" dirty="0" smtClean="0"/>
-              <a:t>O processo de ionização pode alterar a estrutura das moléculas que contém os átomos atingidos.</a:t>
-            </a:r>
-          </a:p>
-          <a:p>
-            <a:pPr lvl="1"/>
-            <a:r>
-              <a:rPr lang="pt-BR" sz="2400" dirty="0" smtClean="0"/>
-              <a:t>Se a energia de excitação ultrapassar a energia de ligação química entre os átomos, pode ocorrer quebra dessas ligações, criando mudanças moleculares;</a:t>
-            </a:r>
-          </a:p>
-          <a:p>
-            <a:pPr lvl="1"/>
-            <a:r>
-              <a:rPr lang="pt-BR" sz="2400" dirty="0" smtClean="0"/>
-              <a:t>Se células são compostas por essas moléculas modificadas, elas sofrerão as consequências das alterações:</a:t>
-            </a:r>
-          </a:p>
-          <a:p>
-            <a:pPr lvl="2"/>
-            <a:r>
-              <a:rPr lang="pt-BR" sz="2000" dirty="0" smtClean="0"/>
-              <a:t>Produzindo radicais livres, íons e elétrons.</a:t>
-            </a:r>
-            <a:endParaRPr lang="pt-BR" sz="2000" dirty="0"/>
-          </a:p>
-        </p:txBody>
-      </p:sp>
-    </p:spTree>
-  </p:cSld>
-  <p:clrMapOvr>
-    <a:masterClrMapping/>
-  </p:clrMapOvr>
-</p:sld>
-</file>
-
-<file path=ppt/slides/slide22.xml><?xml version="1.0" encoding="utf-8"?>
-<p:sld xmlns:a="http://schemas.openxmlformats.org/drawingml/2006/main" xmlns:r="http://schemas.openxmlformats.org/officeDocument/2006/relationships" xmlns:p="http://schemas.openxmlformats.org/presentationml/2006/main">
-  <p:cSld>
-    <p:spTree>
-      <p:nvGrpSpPr>
-        <p:cNvPr id="1" name=""/>
-        <p:cNvGrpSpPr/>
-        <p:nvPr/>
-      </p:nvGrpSpPr>
-      <p:grpSpPr>
-        <a:xfrm>
-          <a:off x="0" y="0"/>
-          <a:ext cx="0" cy="0"/>
-          <a:chOff x="0" y="0"/>
-          <a:chExt cx="0" cy="0"/>
-        </a:xfrm>
-      </p:grpSpPr>
-      <p:sp>
-        <p:nvSpPr>
-          <p:cNvPr id="2" name="Título 1"/>
-          <p:cNvSpPr>
-            <a:spLocks noGrp="1"/>
-          </p:cNvSpPr>
-          <p:nvPr>
-            <p:ph type="title"/>
-          </p:nvPr>
-        </p:nvSpPr>
-        <p:spPr/>
-        <p:txBody>
-          <a:bodyPr>
-            <a:normAutofit/>
-          </a:bodyPr>
-          <a:lstStyle/>
-          <a:p>
-            <a:r>
-              <a:rPr lang="pt-BR" sz="4000" dirty="0" smtClean="0"/>
-              <a:t>Danos celulares</a:t>
-            </a:r>
-            <a:endParaRPr lang="pt-BR" sz="4000" dirty="0"/>
-          </a:p>
-        </p:txBody>
-      </p:sp>
-      <p:sp>
-        <p:nvSpPr>
-          <p:cNvPr id="3" name="Espaço Reservado para Conteúdo 2"/>
-          <p:cNvSpPr>
-            <a:spLocks noGrp="1"/>
-          </p:cNvSpPr>
-          <p:nvPr>
-            <p:ph idx="1"/>
-          </p:nvPr>
-        </p:nvSpPr>
-        <p:spPr/>
-        <p:txBody>
-          <a:bodyPr>
-            <a:normAutofit/>
-          </a:bodyPr>
-          <a:lstStyle/>
-          <a:p>
-            <a:r>
-              <a:rPr lang="pt-BR" sz="2800" dirty="0" smtClean="0"/>
-              <a:t>Se a molécula alterada possui papel crítico para o funcionamento da célula, pode resultar na alteração ou na morte da mesma;</a:t>
-            </a:r>
-          </a:p>
-          <a:p>
-            <a:r>
-              <a:rPr lang="pt-BR" sz="2800" dirty="0" smtClean="0"/>
-              <a:t>Quando a alteração molecular tem caráter deletério, ela significa um dano.</a:t>
-            </a:r>
-            <a:endParaRPr lang="pt-BR" sz="2800" dirty="0"/>
-          </a:p>
-        </p:txBody>
-      </p:sp>
-    </p:spTree>
-  </p:cSld>
-  <p:clrMapOvr>
-    <a:masterClrMapping/>
-  </p:clrMapOvr>
-</p:sld>
-</file>
-
-<file path=ppt/slides/slide23.xml><?xml version="1.0" encoding="utf-8"?>
-<p:sld xmlns:a="http://schemas.openxmlformats.org/drawingml/2006/main" xmlns:r="http://schemas.openxmlformats.org/officeDocument/2006/relationships" xmlns:p="http://schemas.openxmlformats.org/presentationml/2006/main">
-  <p:cSld>
-    <p:spTree>
-      <p:nvGrpSpPr>
-        <p:cNvPr id="1" name=""/>
-        <p:cNvGrpSpPr/>
-        <p:nvPr/>
-      </p:nvGrpSpPr>
-      <p:grpSpPr>
-        <a:xfrm>
-          <a:off x="0" y="0"/>
-          <a:ext cx="0" cy="0"/>
-          <a:chOff x="0" y="0"/>
-          <a:chExt cx="0" cy="0"/>
-        </a:xfrm>
-      </p:grpSpPr>
-      <p:sp>
-        <p:nvSpPr>
-          <p:cNvPr id="2" name="Título 1"/>
-          <p:cNvSpPr>
-            <a:spLocks noGrp="1"/>
-          </p:cNvSpPr>
-          <p:nvPr>
-            <p:ph type="title"/>
-          </p:nvPr>
-        </p:nvSpPr>
-        <p:spPr/>
-        <p:txBody>
-          <a:bodyPr>
-            <a:normAutofit/>
-          </a:bodyPr>
-          <a:lstStyle/>
-          <a:p>
-            <a:r>
-              <a:rPr lang="en-US" sz="4000" dirty="0" err="1" smtClean="0"/>
-              <a:t>Danos</a:t>
-            </a:r>
-            <a:r>
-              <a:rPr lang="en-US" sz="4000" dirty="0" smtClean="0"/>
-              <a:t> </a:t>
-            </a:r>
-            <a:r>
-              <a:rPr lang="en-US" sz="4000" dirty="0" err="1" smtClean="0"/>
-              <a:t>celulares</a:t>
-            </a:r>
-            <a:endParaRPr lang="pt-BR" sz="4000" dirty="0"/>
-          </a:p>
-        </p:txBody>
-      </p:sp>
-      <p:sp>
-        <p:nvSpPr>
-          <p:cNvPr id="3" name="Espaço Reservado para Conteúdo 2"/>
-          <p:cNvSpPr>
-            <a:spLocks noGrp="1"/>
-          </p:cNvSpPr>
-          <p:nvPr>
-            <p:ph idx="1"/>
-          </p:nvPr>
-        </p:nvSpPr>
-        <p:spPr/>
-        <p:txBody>
-          <a:bodyPr>
-            <a:normAutofit/>
-          </a:bodyPr>
-          <a:lstStyle/>
-          <a:p>
-            <a:r>
-              <a:rPr lang="en-US" sz="2800" dirty="0" smtClean="0"/>
-              <a:t>Os </a:t>
-            </a:r>
-            <a:r>
-              <a:rPr lang="en-US" sz="2800" dirty="0" err="1" smtClean="0"/>
-              <a:t>danos</a:t>
-            </a:r>
-            <a:r>
-              <a:rPr lang="en-US" sz="2800" dirty="0" smtClean="0"/>
-              <a:t> </a:t>
-            </a:r>
-            <a:r>
-              <a:rPr lang="en-US" sz="2800" dirty="0" err="1" smtClean="0"/>
-              <a:t>relacionados</a:t>
-            </a:r>
-            <a:r>
-              <a:rPr lang="en-US" sz="2800" dirty="0" smtClean="0"/>
-              <a:t> </a:t>
-            </a:r>
-            <a:r>
-              <a:rPr lang="pt-BR" sz="2800" dirty="0" smtClean="0"/>
-              <a:t>à molécula do DNA são os mais significativos:</a:t>
-            </a:r>
-          </a:p>
-          <a:p>
-            <a:pPr lvl="1"/>
-            <a:r>
-              <a:rPr lang="pt-BR" sz="2400" dirty="0" smtClean="0"/>
-              <a:t>As células danificadas podem morrer ao tentar se dividir, ou conseguir realizar reparos mediados por enzimas;</a:t>
-            </a:r>
-          </a:p>
-          <a:p>
-            <a:pPr lvl="1"/>
-            <a:r>
-              <a:rPr lang="pt-BR" sz="2400" dirty="0" smtClean="0"/>
-              <a:t>Se o reparo é eficiente e em tempo curto, o DNA pode voltar à sua composição original;</a:t>
-            </a:r>
-          </a:p>
-          <a:p>
-            <a:pPr lvl="1"/>
-            <a:r>
-              <a:rPr lang="pt-BR" sz="2400" dirty="0" smtClean="0"/>
-              <a:t>Em um reparo propenso a erros, pode dar origem a mutações na sequência de bases ou rearranjos mais grosseiros, podendo levar à morte reprodutiva da célula ou a alterações no material genético das células sobreviventes, com consequências em longo prazo.</a:t>
-            </a:r>
-            <a:endParaRPr lang="pt-BR" sz="2400" dirty="0"/>
-          </a:p>
-        </p:txBody>
-      </p:sp>
-    </p:spTree>
-  </p:cSld>
-  <p:clrMapOvr>
-    <a:masterClrMapping/>
-  </p:clrMapOvr>
-</p:sld>
-</file>
-
-<file path=ppt/slides/slide24.xml><?xml version="1.0" encoding="utf-8"?>
-<p:sld xmlns:a="http://schemas.openxmlformats.org/drawingml/2006/main" xmlns:r="http://schemas.openxmlformats.org/officeDocument/2006/relationships" xmlns:p="http://schemas.openxmlformats.org/presentationml/2006/main">
-  <p:cSld>
-    <p:spTree>
-      <p:nvGrpSpPr>
-        <p:cNvPr id="1" name=""/>
-        <p:cNvGrpSpPr/>
-        <p:nvPr/>
-      </p:nvGrpSpPr>
-      <p:grpSpPr>
-        <a:xfrm>
-          <a:off x="0" y="0"/>
-          <a:ext cx="0" cy="0"/>
-          <a:chOff x="0" y="0"/>
-          <a:chExt cx="0" cy="0"/>
-        </a:xfrm>
-      </p:grpSpPr>
-      <p:sp>
-        <p:nvSpPr>
-          <p:cNvPr id="2" name="Título 1"/>
-          <p:cNvSpPr>
-            <a:spLocks noGrp="1"/>
-          </p:cNvSpPr>
-          <p:nvPr>
-            <p:ph type="title"/>
-          </p:nvPr>
-        </p:nvSpPr>
-        <p:spPr/>
-        <p:txBody>
-          <a:bodyPr>
-            <a:normAutofit/>
-          </a:bodyPr>
-          <a:lstStyle/>
-          <a:p>
-            <a:r>
-              <a:rPr lang="pt-BR" sz="4000" dirty="0" smtClean="0"/>
-              <a:t>Dose </a:t>
-            </a:r>
-            <a:r>
-              <a:rPr lang="pt-BR" sz="4000" dirty="0" smtClean="0"/>
-              <a:t>absorvida </a:t>
-            </a:r>
-            <a:r>
-              <a:rPr lang="pt-BR" sz="4000" dirty="0" smtClean="0"/>
-              <a:t>(</a:t>
-            </a:r>
-            <a:r>
-              <a:rPr lang="pt-BR" sz="4000" i="1" dirty="0" smtClean="0"/>
-              <a:t>D</a:t>
-            </a:r>
-            <a:r>
-              <a:rPr lang="pt-BR" sz="4000" dirty="0" smtClean="0"/>
-              <a:t>)</a:t>
-            </a:r>
-            <a:endParaRPr lang="pt-BR" sz="4000" dirty="0"/>
-          </a:p>
-        </p:txBody>
-      </p:sp>
-      <p:sp>
-        <p:nvSpPr>
-          <p:cNvPr id="3" name="Espaço Reservado para Conteúdo 2"/>
-          <p:cNvSpPr>
-            <a:spLocks noGrp="1"/>
-          </p:cNvSpPr>
-          <p:nvPr>
-            <p:ph idx="1"/>
-          </p:nvPr>
-        </p:nvSpPr>
-        <p:spPr/>
-        <p:txBody>
-          <a:bodyPr>
-            <a:normAutofit/>
-          </a:bodyPr>
-          <a:lstStyle/>
-          <a:p>
-            <a:r>
-              <a:rPr lang="pt-BR" sz="2800" dirty="0" smtClean="0"/>
-              <a:t>Dose absorvida de radiação ou simplesmente dose </a:t>
-            </a:r>
-            <a:r>
-              <a:rPr lang="pt-BR" sz="2800" dirty="0" smtClean="0"/>
-              <a:t>(</a:t>
+              <a:t>Dose absorvida de radiação ou simplesmente dose (</a:t>
             </a:r>
             <a:r>
               <a:rPr lang="pt-BR" sz="2800" i="1" dirty="0" smtClean="0"/>
@@ -4941,7 +4607,7 @@
 </p:sld>
 </file>
 
-<file path=ppt/slides/slide25.xml><?xml version="1.0" encoding="utf-8"?>
+<file path=ppt/slides/slide22.xml><?xml version="1.0" encoding="utf-8"?>
 <p:sld xmlns:a="http://schemas.openxmlformats.org/drawingml/2006/main" xmlns:r="http://schemas.openxmlformats.org/officeDocument/2006/relationships" xmlns:p="http://schemas.openxmlformats.org/presentationml/2006/main">
   <p:cSld>
     <p:spTree>
@@ -5010,11 +4676,7 @@
           <a:p>
             <a:r>
               <a:rPr lang="pt-BR" sz="2800" dirty="0" smtClean="0"/>
-              <a:t>A dose absorvida </a:t>
-            </a:r>
-            <a:r>
-              <a:rPr lang="pt-BR" sz="2800" dirty="0" smtClean="0"/>
-              <a:t>(</a:t>
+              <a:t>A dose absorvida (</a:t>
             </a:r>
             <a:r>
               <a:rPr lang="pt-BR" sz="2800" i="1" dirty="0" smtClean="0"/>
@@ -5256,7 +4918,7 @@
 </p:sld>
 </file>
 
-<file path=ppt/slides/slide26.xml><?xml version="1.0" encoding="utf-8"?>
+<file path=ppt/slides/slide23.xml><?xml version="1.0" encoding="utf-8"?>
 <p:sld xmlns:a="http://schemas.openxmlformats.org/drawingml/2006/main" xmlns:r="http://schemas.openxmlformats.org/officeDocument/2006/relationships" xmlns:p="http://schemas.openxmlformats.org/presentationml/2006/main">
   <p:cSld>
     <p:spTree>
@@ -5352,7 +5014,7 @@
 </p:sld>
 </file>
 
-<file path=ppt/slides/slide27.xml><?xml version="1.0" encoding="utf-8"?>
+<file path=ppt/slides/slide24.xml><?xml version="1.0" encoding="utf-8"?>
 <p:sld xmlns:a="http://schemas.openxmlformats.org/drawingml/2006/main" xmlns:r="http://schemas.openxmlformats.org/officeDocument/2006/relationships" xmlns:p="http://schemas.openxmlformats.org/presentationml/2006/main">
   <p:cSld>
     <p:spTree>
@@ -5407,7 +5069,7 @@
         <p:spPr/>
         <p:txBody>
           <a:bodyPr>
-            <a:normAutofit lnSpcReduction="10000"/>
+            <a:normAutofit/>
           </a:bodyPr>
           <a:lstStyle/>
           <a:p>
@@ -5419,8 +5081,13 @@
           <a:p>
             <a:r>
               <a:rPr lang="pt-BR" sz="2800" dirty="0" smtClean="0"/>
-              <a:t>Por ter baixo período de latência, a leucemia é a morbidade de interesse dos resultados deste trabalho;</a:t>
-            </a:r>
+              <a:t>Por ter baixo período de latência, a leucemia é a morbidade de </a:t>
+            </a:r>
+            <a:r>
+              <a:rPr lang="pt-BR" sz="2800" dirty="0" smtClean="0"/>
+              <a:t>interesse do BEIR VII;</a:t>
+            </a:r>
+            <a:endParaRPr lang="pt-BR" sz="2800" dirty="0" smtClean="0"/>
           </a:p>
           <a:p>
             <a:r>
@@ -5438,7 +5105,7 @@
 </p:sld>
 </file>
 
-<file path=ppt/slides/slide28.xml><?xml version="1.0" encoding="utf-8"?>
+<file path=ppt/slides/slide25.xml><?xml version="1.0" encoding="utf-8"?>
 <p:sld xmlns:a="http://schemas.openxmlformats.org/drawingml/2006/main" xmlns:r="http://schemas.openxmlformats.org/officeDocument/2006/relationships" xmlns:p="http://schemas.openxmlformats.org/presentationml/2006/main">
   <p:cSld>
     <p:spTree>
@@ -5557,7 +5224,15 @@
             </a:r>
             <a:r>
               <a:rPr lang="pt-BR" sz="2800" dirty="0" smtClean="0"/>
-              <a:t>(RERF) com um grupo de cerca de 120,000 sobreviventes das bombas atômicas em Hiroshima e Nagasaki, em 1945;</a:t>
+              <a:t>(RERF) com um grupo de cerca de </a:t>
+            </a:r>
+            <a:r>
+              <a:rPr lang="pt-BR" sz="2800" dirty="0" smtClean="0"/>
+              <a:t>120.000 </a:t>
+            </a:r>
+            <a:r>
+              <a:rPr lang="pt-BR" sz="2800" dirty="0" smtClean="0"/>
+              <a:t>sobreviventes das bombas atômicas em Hiroshima e Nagasaki, em 1945;</a:t>
             </a:r>
           </a:p>
           <a:p>
@@ -5601,7 +5276,7 @@
 </p:sld>
 </file>
 
-<file path=ppt/slides/slide29.xml><?xml version="1.0" encoding="utf-8"?>
+<file path=ppt/slides/slide26.xml><?xml version="1.0" encoding="utf-8"?>
 <p:sld xmlns:a="http://schemas.openxmlformats.org/drawingml/2006/main" xmlns:r="http://schemas.openxmlformats.org/officeDocument/2006/relationships" xmlns:p="http://schemas.openxmlformats.org/presentationml/2006/main">
   <p:cSld>
     <p:spTree>
@@ -5819,110 +5494,7 @@
 </p:sld>
 </file>
 
-<file path=ppt/slides/slide3.xml><?xml version="1.0" encoding="utf-8"?>
-<p:sld xmlns:a="http://schemas.openxmlformats.org/drawingml/2006/main" xmlns:r="http://schemas.openxmlformats.org/officeDocument/2006/relationships" xmlns:p="http://schemas.openxmlformats.org/presentationml/2006/main">
-  <p:cSld>
-    <p:spTree>
-      <p:nvGrpSpPr>
-        <p:cNvPr id="1" name=""/>
-        <p:cNvGrpSpPr/>
-        <p:nvPr/>
-      </p:nvGrpSpPr>
-      <p:grpSpPr>
-        <a:xfrm>
-          <a:off x="0" y="0"/>
-          <a:ext cx="0" cy="0"/>
-          <a:chOff x="0" y="0"/>
-          <a:chExt cx="0" cy="0"/>
-        </a:xfrm>
-      </p:grpSpPr>
-      <p:sp>
-        <p:nvSpPr>
-          <p:cNvPr id="2" name="Título 1"/>
-          <p:cNvSpPr>
-            <a:spLocks noGrp="1"/>
-          </p:cNvSpPr>
-          <p:nvPr>
-            <p:ph type="title"/>
-          </p:nvPr>
-        </p:nvSpPr>
-        <p:spPr/>
-        <p:txBody>
-          <a:bodyPr/>
-          <a:lstStyle/>
-          <a:p>
-            <a:r>
-              <a:rPr lang="pt-BR" sz="4000" dirty="0" smtClean="0"/>
-              <a:t>Introdução</a:t>
-            </a:r>
-            <a:endParaRPr lang="pt-BR" sz="4000" dirty="0"/>
-          </a:p>
-        </p:txBody>
-      </p:sp>
-      <p:sp>
-        <p:nvSpPr>
-          <p:cNvPr id="3" name="Espaço Reservado para Conteúdo 2"/>
-          <p:cNvSpPr>
-            <a:spLocks noGrp="1"/>
-          </p:cNvSpPr>
-          <p:nvPr>
-            <p:ph idx="1"/>
-          </p:nvPr>
-        </p:nvSpPr>
-        <p:spPr/>
-        <p:txBody>
-          <a:bodyPr/>
-          <a:lstStyle/>
-          <a:p>
-            <a:r>
-              <a:rPr lang="pt-BR" sz="2800" dirty="0" smtClean="0"/>
-              <a:t>O sistema possui a capacidade de organizar dados de levantamentos radiométricos feitos com o aparelho de detecção </a:t>
-            </a:r>
-            <a:r>
-              <a:rPr lang="pt-BR" sz="2800" dirty="0" err="1" smtClean="0"/>
-              <a:t>SpiR-ID</a:t>
-            </a:r>
-            <a:r>
-              <a:rPr lang="pt-BR" sz="2800" dirty="0" smtClean="0"/>
-              <a:t>®, e aplicar equações do BEIR VII para calcular as estimativas de Excesso de Risco Relativo para o surgimento da leucemia.</a:t>
-            </a:r>
-          </a:p>
-          <a:p>
-            <a:r>
-              <a:rPr lang="pt-BR" sz="2800" dirty="0" smtClean="0"/>
-              <a:t>Uma aplicação </a:t>
-            </a:r>
-            <a:r>
-              <a:rPr lang="pt-BR" sz="2800" i="1" dirty="0" smtClean="0"/>
-              <a:t>desktop </a:t>
-            </a:r>
-            <a:r>
-              <a:rPr lang="pt-BR" sz="2800" dirty="0" smtClean="0"/>
-              <a:t>faz todo o processamento, exibe o resultado através de gráficos e pode ainda enviar as estimativas para aplicações </a:t>
-            </a:r>
-            <a:r>
-              <a:rPr lang="pt-BR" sz="2800" dirty="0" err="1" smtClean="0"/>
-              <a:t>Android</a:t>
-            </a:r>
-            <a:r>
-              <a:rPr lang="pt-BR" sz="2800" dirty="0" smtClean="0"/>
-              <a:t>®.</a:t>
-            </a:r>
-          </a:p>
-          <a:p>
-            <a:endParaRPr lang="pt-BR" dirty="0"/>
-          </a:p>
-        </p:txBody>
-      </p:sp>
-    </p:spTree>
-  </p:cSld>
-  <p:clrMapOvr>
-    <a:masterClrMapping/>
-  </p:clrMapOvr>
-</p:sld>
-</file>
-
-<file path=ppt/slides/slide30.xml><?xml version="1.0" encoding="utf-8"?>
+<file path=ppt/slides/slide27.xml><?xml version="1.0" encoding="utf-8"?>
 <p:sld xmlns:a="http://schemas.openxmlformats.org/drawingml/2006/main" xmlns:r="http://schemas.openxmlformats.org/officeDocument/2006/relationships" xmlns:p="http://schemas.openxmlformats.org/presentationml/2006/main">
   <p:cSld>
     <p:spTree>
@@ -6316,6 +5888,554 @@
 </p:sld>
 </file>
 
+<file path=ppt/slides/slide28.xml><?xml version="1.0" encoding="utf-8"?>
+<p:sld xmlns:a="http://schemas.openxmlformats.org/drawingml/2006/main" xmlns:r="http://schemas.openxmlformats.org/officeDocument/2006/relationships" xmlns:p="http://schemas.openxmlformats.org/presentationml/2006/main">
+  <p:cSld>
+    <p:spTree>
+      <p:nvGrpSpPr>
+        <p:cNvPr id="1" name=""/>
+        <p:cNvGrpSpPr/>
+        <p:nvPr/>
+      </p:nvGrpSpPr>
+      <p:grpSpPr>
+        <a:xfrm>
+          <a:off x="0" y="0"/>
+          <a:ext cx="0" cy="0"/>
+          <a:chOff x="0" y="0"/>
+          <a:chExt cx="0" cy="0"/>
+        </a:xfrm>
+      </p:grpSpPr>
+      <p:sp>
+        <p:nvSpPr>
+          <p:cNvPr id="2" name="Título 1"/>
+          <p:cNvSpPr>
+            <a:spLocks noGrp="1"/>
+          </p:cNvSpPr>
+          <p:nvPr>
+            <p:ph type="title"/>
+          </p:nvPr>
+        </p:nvSpPr>
+        <p:spPr/>
+        <p:txBody>
+          <a:bodyPr>
+            <a:normAutofit/>
+          </a:bodyPr>
+          <a:lstStyle/>
+          <a:p>
+            <a:r>
+              <a:rPr lang="pt-BR" sz="4000" dirty="0" smtClean="0"/>
+              <a:t>Modelo BEIR VII</a:t>
+            </a:r>
+            <a:endParaRPr lang="pt-BR" sz="4000" dirty="0"/>
+          </a:p>
+        </p:txBody>
+      </p:sp>
+      <p:sp>
+        <p:nvSpPr>
+          <p:cNvPr id="3" name="Espaço Reservado para Conteúdo 2"/>
+          <p:cNvSpPr>
+            <a:spLocks noGrp="1"/>
+          </p:cNvSpPr>
+          <p:nvPr>
+            <p:ph idx="1"/>
+          </p:nvPr>
+        </p:nvSpPr>
+        <p:spPr/>
+        <p:txBody>
+          <a:bodyPr>
+            <a:normAutofit/>
+          </a:bodyPr>
+          <a:lstStyle/>
+          <a:p>
+            <a:r>
+              <a:rPr lang="el-GR" sz="2800" dirty="0" smtClean="0"/>
+              <a:t>Β</a:t>
+            </a:r>
+            <a:r>
+              <a:rPr lang="en-US" sz="2800" dirty="0" smtClean="0"/>
+              <a:t>s </a:t>
+            </a:r>
+            <a:r>
+              <a:rPr lang="en-US" sz="2800" dirty="0" err="1" smtClean="0"/>
+              <a:t>representa</a:t>
+            </a:r>
+            <a:r>
+              <a:rPr lang="en-US" sz="2800" dirty="0" smtClean="0"/>
+              <a:t> </a:t>
+            </a:r>
+            <a:r>
+              <a:rPr lang="en-US" sz="2800" dirty="0" smtClean="0"/>
+              <a:t>ERR/</a:t>
+            </a:r>
+            <a:r>
+              <a:rPr lang="en-US" sz="2800" dirty="0" err="1" smtClean="0"/>
+              <a:t>Sv</a:t>
+            </a:r>
+            <a:r>
+              <a:rPr lang="en-US" sz="2800" dirty="0" smtClean="0"/>
+              <a:t> </a:t>
+            </a:r>
+            <a:r>
+              <a:rPr lang="en-US" sz="2800" dirty="0" err="1" smtClean="0"/>
+              <a:t>por</a:t>
+            </a:r>
+            <a:r>
+              <a:rPr lang="en-US" sz="2800" dirty="0" smtClean="0"/>
+              <a:t> </a:t>
+            </a:r>
+            <a:r>
+              <a:rPr lang="en-US" sz="2800" dirty="0" err="1" smtClean="0"/>
+              <a:t>sexo</a:t>
+            </a:r>
+            <a:r>
+              <a:rPr lang="en-US" sz="2800" dirty="0" smtClean="0"/>
+              <a:t>, </a:t>
+            </a:r>
+            <a:r>
+              <a:rPr lang="en-US" sz="2800" dirty="0" err="1" smtClean="0"/>
+              <a:t>diferenciado</a:t>
+            </a:r>
+            <a:r>
+              <a:rPr lang="en-US" sz="2800" dirty="0" smtClean="0"/>
+              <a:t> </a:t>
+            </a:r>
+            <a:r>
+              <a:rPr lang="en-US" sz="2800" dirty="0" err="1" smtClean="0"/>
+              <a:t>em</a:t>
+            </a:r>
+            <a:r>
+              <a:rPr lang="en-US" sz="2800" dirty="0" smtClean="0"/>
+              <a:t> </a:t>
+            </a:r>
+            <a:r>
+              <a:rPr lang="pt-BR" sz="2800" dirty="0" err="1" smtClean="0">
+                <a:solidFill>
+                  <a:schemeClr val="dk1"/>
+                </a:solidFill>
+              </a:rPr>
+              <a:t>β</a:t>
+            </a:r>
+            <a:r>
+              <a:rPr lang="pt-BR" sz="2800" baseline="-25000" dirty="0" err="1" smtClean="0">
+                <a:solidFill>
+                  <a:schemeClr val="dk1"/>
+                </a:solidFill>
+              </a:rPr>
+              <a:t>M</a:t>
+            </a:r>
+            <a:r>
+              <a:rPr lang="el-GR" sz="2800" dirty="0" smtClean="0"/>
+              <a:t> </a:t>
+            </a:r>
+            <a:r>
+              <a:rPr lang="pt-BR" sz="2800" dirty="0" smtClean="0"/>
+              <a:t>(homens) e </a:t>
+            </a:r>
+            <a:r>
+              <a:rPr lang="pt-BR" sz="2800" dirty="0" err="1" smtClean="0">
+                <a:solidFill>
+                  <a:schemeClr val="dk1"/>
+                </a:solidFill>
+              </a:rPr>
+              <a:t>β</a:t>
+            </a:r>
+            <a:r>
+              <a:rPr lang="pt-BR" sz="2800" baseline="-25000" dirty="0" err="1" smtClean="0">
+                <a:solidFill>
+                  <a:schemeClr val="dk1"/>
+                </a:solidFill>
+              </a:rPr>
+              <a:t>F</a:t>
+            </a:r>
+            <a:r>
+              <a:rPr lang="pt-BR" sz="2800" dirty="0" smtClean="0">
+                <a:solidFill>
+                  <a:schemeClr val="dk1"/>
+                </a:solidFill>
+              </a:rPr>
+              <a:t> (mulheres).</a:t>
+            </a:r>
+          </a:p>
+          <a:p>
+            <a:r>
+              <a:rPr lang="pt-BR" sz="2800" dirty="0" smtClean="0">
+                <a:solidFill>
+                  <a:schemeClr val="dk1"/>
+                </a:solidFill>
+              </a:rPr>
+              <a:t>Constante </a:t>
+            </a:r>
+            <a:r>
+              <a:rPr lang="el-GR" sz="2800" dirty="0" smtClean="0">
+                <a:solidFill>
+                  <a:schemeClr val="dk1"/>
+                </a:solidFill>
+              </a:rPr>
+              <a:t>γ </a:t>
+            </a:r>
+            <a:r>
+              <a:rPr lang="pt-BR" sz="2800" dirty="0" smtClean="0">
+                <a:solidFill>
+                  <a:schemeClr val="dk1"/>
+                </a:solidFill>
+              </a:rPr>
+              <a:t>é expressa por aumento de década na idade desde a exposição;</a:t>
+            </a:r>
+          </a:p>
+          <a:p>
+            <a:r>
+              <a:rPr lang="pt-BR" sz="2800" dirty="0" smtClean="0">
+                <a:solidFill>
+                  <a:schemeClr val="dk1"/>
+                </a:solidFill>
+              </a:rPr>
+              <a:t>Constante </a:t>
+            </a:r>
+            <a:r>
+              <a:rPr lang="el-GR" sz="2800" dirty="0" smtClean="0">
+                <a:solidFill>
+                  <a:schemeClr val="dk1"/>
+                </a:solidFill>
+              </a:rPr>
+              <a:t>δ </a:t>
+            </a:r>
+            <a:r>
+              <a:rPr lang="pt-BR" sz="2800" dirty="0" smtClean="0">
+                <a:solidFill>
+                  <a:schemeClr val="dk1"/>
+                </a:solidFill>
+              </a:rPr>
+              <a:t>indica dependência desde a exposição do indivíduo;</a:t>
+            </a:r>
+          </a:p>
+          <a:p>
+            <a:r>
+              <a:rPr lang="el-GR" sz="2800" dirty="0" smtClean="0">
+                <a:solidFill>
+                  <a:schemeClr val="dk1"/>
+                </a:solidFill>
+              </a:rPr>
+              <a:t>φ </a:t>
+            </a:r>
+            <a:r>
+              <a:rPr lang="pt-BR" sz="2800" dirty="0" smtClean="0">
+                <a:solidFill>
+                  <a:schemeClr val="dk1"/>
+                </a:solidFill>
+              </a:rPr>
+              <a:t>é uma constante independente de sexo (s), idade (e) e tempo (t), relacionada ao grau de curvatura da função.</a:t>
+            </a:r>
+          </a:p>
+        </p:txBody>
+      </p:sp>
+    </p:spTree>
+  </p:cSld>
+  <p:clrMapOvr>
+    <a:masterClrMapping/>
+  </p:clrMapOvr>
+</p:sld>
+</file>
+
+<file path=ppt/slides/slide29.xml><?xml version="1.0" encoding="utf-8"?>
+<p:sld xmlns:a="http://schemas.openxmlformats.org/drawingml/2006/main" xmlns:r="http://schemas.openxmlformats.org/officeDocument/2006/relationships" xmlns:p="http://schemas.openxmlformats.org/presentationml/2006/main">
+  <p:cSld>
+    <p:spTree>
+      <p:nvGrpSpPr>
+        <p:cNvPr id="1" name=""/>
+        <p:cNvGrpSpPr/>
+        <p:nvPr/>
+      </p:nvGrpSpPr>
+      <p:grpSpPr>
+        <a:xfrm>
+          <a:off x="0" y="0"/>
+          <a:ext cx="0" cy="0"/>
+          <a:chOff x="0" y="0"/>
+          <a:chExt cx="0" cy="0"/>
+        </a:xfrm>
+      </p:grpSpPr>
+      <p:sp>
+        <p:nvSpPr>
+          <p:cNvPr id="2" name="Título 1"/>
+          <p:cNvSpPr>
+            <a:spLocks noGrp="1"/>
+          </p:cNvSpPr>
+          <p:nvPr>
+            <p:ph type="title"/>
+          </p:nvPr>
+        </p:nvSpPr>
+        <p:spPr/>
+        <p:txBody>
+          <a:bodyPr>
+            <a:normAutofit/>
+          </a:bodyPr>
+          <a:lstStyle/>
+          <a:p>
+            <a:r>
+              <a:rPr lang="pt-BR" sz="4000" dirty="0" smtClean="0"/>
+              <a:t>Modelo BEIR VII</a:t>
+            </a:r>
+            <a:endParaRPr lang="pt-BR" sz="4000" dirty="0"/>
+          </a:p>
+        </p:txBody>
+      </p:sp>
+      <p:sp>
+        <p:nvSpPr>
+          <p:cNvPr id="3" name="Espaço Reservado para Conteúdo 2"/>
+          <p:cNvSpPr>
+            <a:spLocks noGrp="1"/>
+          </p:cNvSpPr>
+          <p:nvPr>
+            <p:ph idx="1"/>
+          </p:nvPr>
+        </p:nvSpPr>
+        <p:spPr/>
+        <p:txBody>
+          <a:bodyPr>
+            <a:normAutofit/>
+          </a:bodyPr>
+          <a:lstStyle/>
+          <a:p>
+            <a:r>
+              <a:rPr lang="pt-BR" sz="2800" dirty="0" smtClean="0"/>
+              <a:t>Logo, a equação proposta pelo BEIR VII para leucemia é dependente apenas de </a:t>
+            </a:r>
+            <a:r>
+              <a:rPr lang="pt-BR" sz="2800" i="1" dirty="0" smtClean="0"/>
+              <a:t>D</a:t>
+            </a:r>
+            <a:r>
+              <a:rPr lang="pt-BR" sz="2800" dirty="0" smtClean="0"/>
+              <a:t>, já que as outras constantes são definidas pelo modelo.</a:t>
+            </a:r>
+          </a:p>
+        </p:txBody>
+      </p:sp>
+    </p:spTree>
+  </p:cSld>
+  <p:clrMapOvr>
+    <a:masterClrMapping/>
+  </p:clrMapOvr>
+</p:sld>
+</file>
+
+<file path=ppt/slides/slide3.xml><?xml version="1.0" encoding="utf-8"?>
+<p:sld xmlns:a="http://schemas.openxmlformats.org/drawingml/2006/main" xmlns:r="http://schemas.openxmlformats.org/officeDocument/2006/relationships" xmlns:p="http://schemas.openxmlformats.org/presentationml/2006/main">
+  <p:cSld>
+    <p:spTree>
+      <p:nvGrpSpPr>
+        <p:cNvPr id="1" name=""/>
+        <p:cNvGrpSpPr/>
+        <p:nvPr/>
+      </p:nvGrpSpPr>
+      <p:grpSpPr>
+        <a:xfrm>
+          <a:off x="0" y="0"/>
+          <a:ext cx="0" cy="0"/>
+          <a:chOff x="0" y="0"/>
+          <a:chExt cx="0" cy="0"/>
+        </a:xfrm>
+      </p:grpSpPr>
+      <p:sp>
+        <p:nvSpPr>
+          <p:cNvPr id="2" name="Título 1"/>
+          <p:cNvSpPr>
+            <a:spLocks noGrp="1"/>
+          </p:cNvSpPr>
+          <p:nvPr>
+            <p:ph type="title"/>
+          </p:nvPr>
+        </p:nvSpPr>
+        <p:spPr/>
+        <p:txBody>
+          <a:bodyPr/>
+          <a:lstStyle/>
+          <a:p>
+            <a:r>
+              <a:rPr lang="pt-BR" sz="4000" dirty="0" smtClean="0"/>
+              <a:t>Introdução</a:t>
+            </a:r>
+            <a:endParaRPr lang="pt-BR" sz="4000" dirty="0"/>
+          </a:p>
+        </p:txBody>
+      </p:sp>
+      <p:sp>
+        <p:nvSpPr>
+          <p:cNvPr id="3" name="Espaço Reservado para Conteúdo 2"/>
+          <p:cNvSpPr>
+            <a:spLocks noGrp="1"/>
+          </p:cNvSpPr>
+          <p:nvPr>
+            <p:ph idx="1"/>
+          </p:nvPr>
+        </p:nvSpPr>
+        <p:spPr/>
+        <p:txBody>
+          <a:bodyPr/>
+          <a:lstStyle/>
+          <a:p>
+            <a:r>
+              <a:rPr lang="pt-BR" sz="2800" dirty="0" smtClean="0"/>
+              <a:t>O sistema possui a capacidade de organizar dados de levantamentos radiométricos feitos com o aparelho de detecção </a:t>
+            </a:r>
+            <a:r>
+              <a:rPr lang="pt-BR" sz="2800" dirty="0" err="1" smtClean="0"/>
+              <a:t>SpiR-ID</a:t>
+            </a:r>
+            <a:r>
+              <a:rPr lang="pt-BR" sz="2800" dirty="0" smtClean="0"/>
+              <a:t>, e aplicar equações do BEIR VII para calcular as estimativas de Excesso de Risco Relativo para o surgimento da leucemia;</a:t>
+            </a:r>
+          </a:p>
+          <a:p>
+            <a:r>
+              <a:rPr lang="pt-BR" sz="2800" dirty="0" smtClean="0"/>
+              <a:t>Uma aplicação </a:t>
+            </a:r>
+            <a:r>
+              <a:rPr lang="pt-BR" sz="2800" i="1" dirty="0" smtClean="0"/>
+              <a:t>desktop </a:t>
+            </a:r>
+            <a:r>
+              <a:rPr lang="pt-BR" sz="2800" dirty="0" smtClean="0"/>
+              <a:t>faz todo o processamento, exibe o resultado através de gráficos e pode ainda enviar as estimativas para aplicações </a:t>
+            </a:r>
+            <a:r>
+              <a:rPr lang="pt-BR" sz="2800" dirty="0" err="1" smtClean="0"/>
+              <a:t>Android</a:t>
+            </a:r>
+            <a:r>
+              <a:rPr lang="pt-BR" sz="2800" dirty="0" smtClean="0"/>
+              <a:t>.</a:t>
+            </a:r>
+          </a:p>
+          <a:p>
+            <a:endParaRPr lang="pt-BR" dirty="0"/>
+          </a:p>
+        </p:txBody>
+      </p:sp>
+    </p:spTree>
+  </p:cSld>
+  <p:clrMapOvr>
+    <a:masterClrMapping/>
+  </p:clrMapOvr>
+</p:sld>
+</file>
+
+<file path=ppt/slides/slide30.xml><?xml version="1.0" encoding="utf-8"?>
+<p:sld xmlns:a="http://schemas.openxmlformats.org/drawingml/2006/main" xmlns:r="http://schemas.openxmlformats.org/officeDocument/2006/relationships" xmlns:p="http://schemas.openxmlformats.org/presentationml/2006/main">
+  <p:cSld>
+    <p:spTree>
+      <p:nvGrpSpPr>
+        <p:cNvPr id="1" name=""/>
+        <p:cNvGrpSpPr/>
+        <p:nvPr/>
+      </p:nvGrpSpPr>
+      <p:grpSpPr>
+        <a:xfrm>
+          <a:off x="0" y="0"/>
+          <a:ext cx="0" cy="0"/>
+          <a:chOff x="0" y="0"/>
+          <a:chExt cx="0" cy="0"/>
+        </a:xfrm>
+      </p:grpSpPr>
+      <p:sp>
+        <p:nvSpPr>
+          <p:cNvPr id="2" name="Título 1"/>
+          <p:cNvSpPr>
+            <a:spLocks noGrp="1"/>
+          </p:cNvSpPr>
+          <p:nvPr>
+            <p:ph type="title"/>
+          </p:nvPr>
+        </p:nvSpPr>
+        <p:spPr/>
+        <p:txBody>
+          <a:bodyPr>
+            <a:normAutofit/>
+          </a:bodyPr>
+          <a:lstStyle/>
+          <a:p>
+            <a:r>
+              <a:rPr lang="pt-BR" sz="4000" dirty="0" smtClean="0"/>
+              <a:t>Levantamento radiométrico</a:t>
+            </a:r>
+            <a:endParaRPr lang="pt-BR" sz="4000" dirty="0"/>
+          </a:p>
+        </p:txBody>
+      </p:sp>
+      <p:sp>
+        <p:nvSpPr>
+          <p:cNvPr id="3" name="Espaço Reservado para Conteúdo 2"/>
+          <p:cNvSpPr>
+            <a:spLocks noGrp="1"/>
+          </p:cNvSpPr>
+          <p:nvPr>
+            <p:ph idx="1"/>
+          </p:nvPr>
+        </p:nvSpPr>
+        <p:spPr/>
+        <p:txBody>
+          <a:bodyPr>
+            <a:normAutofit/>
+          </a:bodyPr>
+          <a:lstStyle/>
+          <a:p>
+            <a:r>
+              <a:rPr lang="pt-BR" sz="2800" dirty="0" smtClean="0"/>
+              <a:t>O levantamento utilizado como fonte de dados deste trabalho é feito a partir do uso do equipamento especial para análise e detecção de radiação chamado </a:t>
+            </a:r>
+            <a:r>
+              <a:rPr lang="pt-BR" sz="2800" dirty="0" err="1" smtClean="0"/>
+              <a:t>SpiR-ID</a:t>
+            </a:r>
+            <a:r>
+              <a:rPr lang="pt-BR" sz="2800" dirty="0" smtClean="0"/>
+              <a:t>:</a:t>
+            </a:r>
+            <a:endParaRPr lang="pt-BR" sz="2800" dirty="0"/>
+          </a:p>
+        </p:txBody>
+      </p:sp>
+      <p:pic>
+        <p:nvPicPr>
+          <p:cNvPr id="4" name="Imagem 3" descr="SpiR-ID.jpg"/>
+          <p:cNvPicPr>
+            <a:picLocks noChangeAspect="1"/>
+          </p:cNvPicPr>
+          <p:nvPr/>
+        </p:nvPicPr>
+        <p:blipFill>
+          <a:blip r:embed="rId2" cstate="print"/>
+          <a:stretch>
+            <a:fillRect/>
+          </a:stretch>
+        </p:blipFill>
+        <p:spPr>
+          <a:xfrm>
+            <a:off x="3419872" y="3717032"/>
+            <a:ext cx="2324100" cy="1971675"/>
+          </a:xfrm>
+          <a:prstGeom prst="rect">
+            <a:avLst/>
+          </a:prstGeom>
+          <a:ln>
+            <a:solidFill>
+              <a:schemeClr val="tx1">
+                <a:lumMod val="95000"/>
+                <a:lumOff val="5000"/>
+              </a:schemeClr>
+            </a:solidFill>
+          </a:ln>
+        </p:spPr>
+      </p:pic>
+    </p:spTree>
+  </p:cSld>
+  <p:clrMapOvr>
+    <a:masterClrMapping/>
+  </p:clrMapOvr>
+</p:sld>
+</file>
+
 <file path=ppt/slides/slide31.xml><?xml version="1.0" encoding="utf-8"?>
 <p:sld xmlns:a="http://schemas.openxmlformats.org/drawingml/2006/main" xmlns:r="http://schemas.openxmlformats.org/officeDocument/2006/relationships" xmlns:p="http://schemas.openxmlformats.org/presentationml/2006/main">
   <p:cSld>
@@ -6352,7 +6472,7 @@
           <a:p>
             <a:r>
               <a:rPr lang="pt-BR" sz="4000" dirty="0" smtClean="0"/>
-              <a:t>Modelo BEIR VII</a:t>
+              <a:t>Levantamento radiométrico</a:t>
             </a:r>
             <a:endParaRPr lang="pt-BR" sz="4000" dirty="0"/>
           </a:p>
@@ -6371,152 +6491,96 @@
         <p:spPr/>
         <p:txBody>
           <a:bodyPr>
-            <a:normAutofit/>
+            <a:normAutofit lnSpcReduction="10000"/>
           </a:bodyPr>
           <a:lstStyle/>
           <a:p>
             <a:r>
-              <a:rPr lang="el-GR" sz="2800" dirty="0" smtClean="0"/>
-              <a:t>Β</a:t>
-            </a:r>
-            <a:r>
-              <a:rPr lang="en-US" sz="2800" dirty="0" smtClean="0"/>
-              <a:t>s </a:t>
-            </a:r>
-            <a:r>
-              <a:rPr lang="en-US" sz="2800" dirty="0" err="1" smtClean="0"/>
-              <a:t>representa</a:t>
-            </a:r>
-            <a:r>
-              <a:rPr lang="en-US" sz="2800" dirty="0" smtClean="0"/>
-              <a:t> ERR/</a:t>
-            </a:r>
-            <a:r>
-              <a:rPr lang="en-US" sz="2800" dirty="0" err="1" smtClean="0"/>
+              <a:rPr lang="pt-BR" sz="2800" dirty="0" smtClean="0"/>
+              <a:t>Os dados coletados pelo </a:t>
+            </a:r>
+            <a:r>
+              <a:rPr lang="pt-BR" sz="2800" dirty="0" err="1" smtClean="0"/>
+              <a:t>SpiR-ID</a:t>
+            </a:r>
+            <a:r>
+              <a:rPr lang="pt-BR" sz="2800" dirty="0" smtClean="0"/>
+              <a:t> são enviados para um computador que contenha o programa SPIR;</a:t>
+            </a:r>
+          </a:p>
+          <a:p>
+            <a:r>
+              <a:rPr lang="pt-BR" sz="2800" dirty="0" smtClean="0"/>
+              <a:t>Este programa organiza os dados em um arquivo de texto (com valores separados por ponto-e-vírgula) separado em colunas com cada tipo de dado levantado.</a:t>
+            </a:r>
+          </a:p>
+          <a:p>
+            <a:r>
+              <a:rPr lang="pt-BR" sz="2800" dirty="0" smtClean="0"/>
+              <a:t>As colunas utilizadas neste trabalho são:</a:t>
+            </a:r>
+          </a:p>
+          <a:p>
+            <a:pPr lvl="1"/>
+            <a:r>
+              <a:rPr lang="pt-BR" sz="2400" i="1" dirty="0" smtClean="0"/>
+              <a:t>Date</a:t>
+            </a:r>
+          </a:p>
+          <a:p>
+            <a:pPr lvl="1"/>
+            <a:r>
+              <a:rPr lang="pt-BR" sz="2400" i="1" dirty="0" err="1" smtClean="0"/>
+              <a:t>Gamma</a:t>
+            </a:r>
+            <a:r>
+              <a:rPr lang="pt-BR" sz="2400" i="1" dirty="0" smtClean="0"/>
+              <a:t> </a:t>
+            </a:r>
+            <a:r>
+              <a:rPr lang="pt-BR" sz="2400" i="1" dirty="0" err="1" smtClean="0"/>
+              <a:t>ground</a:t>
+            </a:r>
+            <a:r>
+              <a:rPr lang="pt-BR" sz="2400" i="1" dirty="0" smtClean="0"/>
+              <a:t> dose rate(</a:t>
+            </a:r>
+            <a:r>
+              <a:rPr lang="el-GR" sz="2400" i="1" dirty="0" smtClean="0"/>
+              <a:t>μ</a:t>
+            </a:r>
+            <a:r>
+              <a:rPr lang="pt-BR" sz="2400" i="1" dirty="0" err="1" smtClean="0"/>
               <a:t>Sv</a:t>
             </a:r>
             <a:r>
-              <a:rPr lang="en-US" sz="2800" dirty="0" smtClean="0"/>
-              <a:t>, </a:t>
-            </a:r>
-            <a:r>
-              <a:rPr lang="en-US" sz="2800" dirty="0" err="1" smtClean="0"/>
-              <a:t>diferenciado</a:t>
-            </a:r>
-            <a:r>
-              <a:rPr lang="en-US" sz="2800" dirty="0" smtClean="0"/>
-              <a:t> </a:t>
-            </a:r>
-            <a:r>
-              <a:rPr lang="en-US" sz="2800" dirty="0" err="1" smtClean="0"/>
-              <a:t>em</a:t>
-            </a:r>
-            <a:r>
-              <a:rPr lang="en-US" sz="2800" dirty="0" smtClean="0"/>
-              <a:t> </a:t>
-            </a:r>
-            <a:r>
-              <a:rPr lang="pt-BR" sz="2800" dirty="0" err="1" smtClean="0">
-                <a:solidFill>
-                  <a:schemeClr val="dk1"/>
-                </a:solidFill>
-              </a:rPr>
-              <a:t>β</a:t>
-            </a:r>
-            <a:r>
-              <a:rPr lang="pt-BR" sz="2800" baseline="-25000" dirty="0" err="1" smtClean="0">
-                <a:solidFill>
-                  <a:schemeClr val="dk1"/>
-                </a:solidFill>
-              </a:rPr>
-              <a:t>M</a:t>
-            </a:r>
-            <a:r>
-              <a:rPr lang="el-GR" sz="2800" dirty="0" smtClean="0"/>
-              <a:t> </a:t>
-            </a:r>
-            <a:r>
-              <a:rPr lang="pt-BR" sz="2800" dirty="0" smtClean="0"/>
-              <a:t>(homens) e </a:t>
-            </a:r>
-            <a:r>
-              <a:rPr lang="pt-BR" sz="2800" dirty="0" err="1" smtClean="0">
-                <a:solidFill>
-                  <a:schemeClr val="dk1"/>
-                </a:solidFill>
-              </a:rPr>
-              <a:t>β</a:t>
-            </a:r>
-            <a:r>
-              <a:rPr lang="pt-BR" sz="2800" baseline="-25000" dirty="0" err="1" smtClean="0">
-                <a:solidFill>
-                  <a:schemeClr val="dk1"/>
-                </a:solidFill>
-              </a:rPr>
-              <a:t>F</a:t>
-            </a:r>
-            <a:r>
-              <a:rPr lang="pt-BR" sz="2800" dirty="0" smtClean="0">
-                <a:solidFill>
-                  <a:schemeClr val="dk1"/>
-                </a:solidFill>
-              </a:rPr>
-              <a:t> (mulheres).</a:t>
-            </a:r>
-          </a:p>
-          <a:p>
-            <a:r>
-              <a:rPr lang="el-GR" sz="2800" dirty="0" smtClean="0">
-                <a:solidFill>
-                  <a:schemeClr val="dk1"/>
-                </a:solidFill>
-              </a:rPr>
-              <a:t>γ </a:t>
-            </a:r>
-            <a:r>
-              <a:rPr lang="pt-BR" sz="2800" dirty="0" smtClean="0">
-                <a:solidFill>
-                  <a:schemeClr val="dk1"/>
-                </a:solidFill>
-              </a:rPr>
-              <a:t>é expressa por aumento de década na idade desde a exposição;</a:t>
-            </a:r>
-          </a:p>
-          <a:p>
-            <a:r>
-              <a:rPr lang="el-GR" sz="2800" dirty="0" smtClean="0">
-                <a:solidFill>
-                  <a:schemeClr val="dk1"/>
-                </a:solidFill>
-              </a:rPr>
-              <a:t>δ </a:t>
-            </a:r>
-            <a:r>
-              <a:rPr lang="pt-BR" sz="2800" dirty="0" smtClean="0">
-                <a:solidFill>
-                  <a:schemeClr val="dk1"/>
-                </a:solidFill>
-              </a:rPr>
-              <a:t>indica dependência desde a exposição do indivíduo;</a:t>
-            </a:r>
-          </a:p>
-          <a:p>
-            <a:r>
-              <a:rPr lang="el-GR" sz="2800" dirty="0" smtClean="0">
-                <a:solidFill>
-                  <a:schemeClr val="dk1"/>
-                </a:solidFill>
-              </a:rPr>
-              <a:t>φ </a:t>
-            </a:r>
-            <a:r>
-              <a:rPr lang="pt-BR" sz="2800" dirty="0" smtClean="0">
-                <a:solidFill>
-                  <a:schemeClr val="dk1"/>
-                </a:solidFill>
-              </a:rPr>
-              <a:t>é uma constante independente de sexo (s), idade (e) e tempo (t), relacionada ao grau de curvatura da função.</a:t>
-            </a:r>
+              <a:rPr lang="pt-BR" sz="2400" i="1" dirty="0" smtClean="0"/>
+              <a:t>/h)</a:t>
+            </a:r>
+          </a:p>
+          <a:p>
+            <a:pPr lvl="1"/>
+            <a:r>
+              <a:rPr lang="pt-BR" sz="2400" i="1" dirty="0" err="1" smtClean="0"/>
+              <a:t>Cosmic</a:t>
+            </a:r>
+            <a:r>
+              <a:rPr lang="pt-BR" sz="2400" i="1" dirty="0" smtClean="0"/>
+              <a:t> dose rate(</a:t>
+            </a:r>
+            <a:r>
+              <a:rPr lang="el-GR" sz="2400" i="1" dirty="0" smtClean="0"/>
+              <a:t>μ</a:t>
+            </a:r>
+            <a:r>
+              <a:rPr lang="pt-BR" sz="2400" i="1" dirty="0" err="1" smtClean="0"/>
+              <a:t>Sv</a:t>
+            </a:r>
+            <a:r>
+              <a:rPr lang="pt-BR" sz="2400" i="1" dirty="0" smtClean="0"/>
+              <a:t>/h)</a:t>
+            </a:r>
+            <a:endParaRPr lang="pt-BR" sz="2400" i="1" dirty="0"/>
           </a:p>
         </p:txBody>
       </p:sp>
@@ -6563,45 +6627,56 @@
           <a:lstStyle/>
           <a:p>
             <a:r>
-              <a:rPr lang="pt-BR" sz="4000" dirty="0" smtClean="0"/>
-              <a:t>Modelo BEIR VII</a:t>
+              <a:rPr lang="en-US" sz="4000" dirty="0" err="1" smtClean="0"/>
+              <a:t>Levantamento</a:t>
+            </a:r>
+            <a:r>
+              <a:rPr lang="en-US" sz="4000" dirty="0" smtClean="0"/>
+              <a:t> </a:t>
+            </a:r>
+            <a:r>
+              <a:rPr lang="en-US" sz="4000" dirty="0" err="1" smtClean="0"/>
+              <a:t>radiom</a:t>
+            </a:r>
+            <a:r>
+              <a:rPr lang="pt-BR" sz="4000" dirty="0" err="1" smtClean="0"/>
+              <a:t>étrico</a:t>
             </a:r>
             <a:endParaRPr lang="pt-BR" sz="4000" dirty="0"/>
           </a:p>
         </p:txBody>
       </p:sp>
-      <p:sp>
-        <p:nvSpPr>
-          <p:cNvPr id="3" name="Espaço Reservado para Conteúdo 2"/>
-          <p:cNvSpPr>
-            <a:spLocks noGrp="1"/>
-          </p:cNvSpPr>
+      <p:pic>
+        <p:nvPicPr>
+          <p:cNvPr id="4" name="Espaço Reservado para Conteúdo 3" descr="print trecho colunas date gamma cosmic.PNG"/>
+          <p:cNvPicPr>
+            <a:picLocks noGrp="1" noChangeAspect="1"/>
+          </p:cNvPicPr>
           <p:nvPr>
             <p:ph idx="1"/>
           </p:nvPr>
-        </p:nvSpPr>
-        <p:spPr/>
-        <p:txBody>
-          <a:bodyPr>
-            <a:normAutofit/>
-          </a:bodyPr>
-          <a:lstStyle/>
-          <a:p>
-            <a:r>
-              <a:rPr lang="pt-BR" sz="2800" dirty="0" smtClean="0"/>
-              <a:t>Logo, a equação proposta pelo BEIR VII para leucemia é dependente apenas de </a:t>
-            </a:r>
-            <a:r>
-              <a:rPr lang="pt-BR" sz="2800" i="1" dirty="0" smtClean="0"/>
-              <a:t>D</a:t>
-            </a:r>
-            <a:r>
-              <a:rPr lang="pt-BR" sz="2800" dirty="0" smtClean="0"/>
-              <a:t>, já que as outras constantes são definidas pelo modelo.</a:t>
-            </a:r>
-          </a:p>
-        </p:txBody>
-      </p:sp>
+        </p:nvPicPr>
+        <p:blipFill>
+          <a:blip r:embed="rId2" cstate="print"/>
+          <a:stretch>
+            <a:fillRect/>
+          </a:stretch>
+        </p:blipFill>
+        <p:spPr>
+          <a:xfrm>
+            <a:off x="1499884" y="1600200"/>
+            <a:ext cx="6144232" cy="4525963"/>
+          </a:xfrm>
+          <a:ln>
+            <a:solidFill>
+              <a:schemeClr val="tx1">
+                <a:lumMod val="95000"/>
+                <a:lumOff val="5000"/>
+              </a:schemeClr>
+            </a:solidFill>
+          </a:ln>
+        </p:spPr>
+      </p:pic>
     </p:spTree>
   </p:cSld>
   <p:clrMapOvr>
@@ -6646,7 +6721,7 @@
           <a:p>
             <a:r>
               <a:rPr lang="pt-BR" sz="4000" dirty="0" smtClean="0"/>
-              <a:t>Levantamento radiométrico</a:t>
+              <a:t>Processamento dos dados coletados</a:t>
             </a:r>
             <a:endParaRPr lang="pt-BR" sz="4000" dirty="0"/>
           </a:p>
@@ -6671,44 +6746,116 @@
           <a:p>
             <a:r>
               <a:rPr lang="pt-BR" sz="2800" dirty="0" smtClean="0"/>
-              <a:t>O levantamento utilizado como fonte de dados deste trabalho é feito a partir do uso do equipamento especial para análise e detecção de radiação chamado </a:t>
-            </a:r>
-            <a:r>
-              <a:rPr lang="pt-BR" sz="2800" dirty="0" err="1" smtClean="0"/>
-              <a:t>SpiR-ID</a:t>
-            </a:r>
-            <a:r>
-              <a:rPr lang="pt-BR" sz="2800" dirty="0" smtClean="0"/>
-              <a:t>:</a:t>
-            </a:r>
-            <a:endParaRPr lang="pt-BR" sz="2800" dirty="0"/>
-          </a:p>
-        </p:txBody>
-      </p:sp>
-      <p:pic>
-        <p:nvPicPr>
-          <p:cNvPr id="4" name="Imagem 3" descr="SpiR-ID.jpg"/>
-          <p:cNvPicPr>
-            <a:picLocks noChangeAspect="1"/>
-          </p:cNvPicPr>
-          <p:nvPr/>
-        </p:nvPicPr>
-        <p:blipFill>
-          <a:blip r:embed="rId2" cstate="print"/>
-          <a:stretch>
-            <a:fillRect/>
-          </a:stretch>
-        </p:blipFill>
-        <p:spPr>
-          <a:xfrm>
-            <a:off x="3419872" y="3717032"/>
-            <a:ext cx="2324100" cy="1971675"/>
-          </a:xfrm>
-          <a:prstGeom prst="rect">
-            <a:avLst/>
-          </a:prstGeom>
-        </p:spPr>
-      </p:pic>
+              <a:t>O programa </a:t>
+            </a:r>
+            <a:r>
+              <a:rPr lang="pt-BR" sz="2800" i="1" dirty="0" smtClean="0"/>
+              <a:t>Análise de Risco </a:t>
+            </a:r>
+            <a:r>
+              <a:rPr lang="pt-BR" sz="2800" dirty="0" smtClean="0"/>
+              <a:t>é responsável por coletar as colunas de interesse do arquivo de levantamento radiométrico;</a:t>
+            </a:r>
+          </a:p>
+          <a:p>
+            <a:pPr marL="342900" lvl="1" indent="-342900">
+              <a:buFont typeface="Arial" pitchFamily="34" charset="0"/>
+              <a:buChar char="•"/>
+            </a:pPr>
+            <a:r>
+              <a:rPr lang="pt-BR" sz="2800" dirty="0" smtClean="0"/>
+              <a:t>Calcula </a:t>
+            </a:r>
+            <a:r>
+              <a:rPr lang="pt-BR" sz="2800" i="1" dirty="0" smtClean="0"/>
+              <a:t>D</a:t>
+            </a:r>
+            <a:r>
+              <a:rPr lang="pt-BR" sz="2800" dirty="0" smtClean="0"/>
+              <a:t> através da soma entre cada valor da coluna </a:t>
+            </a:r>
+            <a:r>
+              <a:rPr lang="pt-BR" i="1" dirty="0" err="1" smtClean="0"/>
+              <a:t>Gamma</a:t>
+            </a:r>
+            <a:r>
+              <a:rPr lang="pt-BR" i="1" dirty="0" smtClean="0"/>
+              <a:t> </a:t>
+            </a:r>
+            <a:r>
+              <a:rPr lang="pt-BR" i="1" dirty="0" err="1" smtClean="0"/>
+              <a:t>ground</a:t>
+            </a:r>
+            <a:r>
+              <a:rPr lang="pt-BR" i="1" dirty="0" smtClean="0"/>
+              <a:t> dose rate(</a:t>
+            </a:r>
+            <a:r>
+              <a:rPr lang="el-GR" i="1" dirty="0" smtClean="0"/>
+              <a:t>μ</a:t>
+            </a:r>
+            <a:r>
+              <a:rPr lang="pt-BR" i="1" dirty="0" err="1" smtClean="0"/>
+              <a:t>Sv</a:t>
+            </a:r>
+            <a:r>
+              <a:rPr lang="pt-BR" i="1" dirty="0" smtClean="0"/>
+              <a:t>/h)</a:t>
+            </a:r>
+            <a:r>
+              <a:rPr lang="pt-BR" dirty="0" smtClean="0"/>
+              <a:t> com cada valor da coluna </a:t>
+            </a:r>
+            <a:r>
+              <a:rPr lang="pt-BR" i="1" dirty="0" err="1" smtClean="0"/>
+              <a:t>Cosmic</a:t>
+            </a:r>
+            <a:r>
+              <a:rPr lang="pt-BR" i="1" dirty="0" smtClean="0"/>
+              <a:t> dose rate(</a:t>
+            </a:r>
+            <a:r>
+              <a:rPr lang="el-GR" i="1" dirty="0" smtClean="0"/>
+              <a:t>μ</a:t>
+            </a:r>
+            <a:r>
+              <a:rPr lang="pt-BR" i="1" dirty="0" err="1" smtClean="0"/>
+              <a:t>Sv</a:t>
+            </a:r>
+            <a:r>
+              <a:rPr lang="pt-BR" i="1" dirty="0" smtClean="0"/>
+              <a:t>/h)</a:t>
+            </a:r>
+            <a:r>
+              <a:rPr lang="pt-BR" sz="2400" dirty="0" smtClean="0"/>
+              <a:t>;</a:t>
+            </a:r>
+          </a:p>
+          <a:p>
+            <a:pPr marL="342900" lvl="1" indent="-342900">
+              <a:buFont typeface="Arial" pitchFamily="34" charset="0"/>
+              <a:buChar char="•"/>
+            </a:pPr>
+            <a:r>
+              <a:rPr lang="pt-BR" dirty="0" smtClean="0"/>
+              <a:t>Os valores da coluna </a:t>
+            </a:r>
+            <a:r>
+              <a:rPr lang="pt-BR" i="1" dirty="0" smtClean="0"/>
+              <a:t>Date</a:t>
+            </a:r>
+            <a:r>
+              <a:rPr lang="pt-BR" dirty="0" smtClean="0"/>
+              <a:t> são utilizados exclusivamente para criar o identificador de cada arquivo a ser lido pelo programa </a:t>
+            </a:r>
+            <a:r>
+              <a:rPr lang="pt-BR" i="1" dirty="0" smtClean="0"/>
+              <a:t>desktop.</a:t>
+            </a:r>
+            <a:endParaRPr lang="pt-BR" dirty="0" smtClean="0"/>
+          </a:p>
+        </p:txBody>
+      </p:sp>
     </p:spTree>
   </p:cSld>
   <p:clrMapOvr>
@@ -6747,121 +6894,83 @@
         <p:spPr/>
         <p:txBody>
           <a:bodyPr>
+            <a:normAutofit fontScale="90000"/>
+          </a:bodyPr>
+          <a:lstStyle/>
+          <a:p>
+            <a:r>
+              <a:rPr lang="pt-BR" dirty="0" smtClean="0"/>
+              <a:t>Processamento dos dados coletados</a:t>
+            </a:r>
+            <a:endParaRPr lang="pt-BR" dirty="0"/>
+          </a:p>
+        </p:txBody>
+      </p:sp>
+      <p:sp>
+        <p:nvSpPr>
+          <p:cNvPr id="3" name="Espaço Reservado para Conteúdo 2"/>
+          <p:cNvSpPr>
+            <a:spLocks noGrp="1"/>
+          </p:cNvSpPr>
+          <p:nvPr>
+            <p:ph idx="1"/>
+          </p:nvPr>
+        </p:nvSpPr>
+        <p:spPr/>
+        <p:txBody>
+          <a:bodyPr>
             <a:normAutofit/>
           </a:bodyPr>
           <a:lstStyle/>
           <a:p>
             <a:r>
-              <a:rPr lang="pt-BR" sz="4000" dirty="0" smtClean="0"/>
-              <a:t>Levantamento radiométrico</a:t>
-            </a:r>
-            <a:endParaRPr lang="pt-BR" sz="4000" dirty="0"/>
-          </a:p>
-        </p:txBody>
-      </p:sp>
-      <p:sp>
-        <p:nvSpPr>
-          <p:cNvPr id="3" name="Espaço Reservado para Conteúdo 2"/>
-          <p:cNvSpPr>
-            <a:spLocks noGrp="1"/>
-          </p:cNvSpPr>
-          <p:nvPr>
-            <p:ph idx="1"/>
-          </p:nvPr>
-        </p:nvSpPr>
-        <p:spPr/>
-        <p:txBody>
-          <a:bodyPr>
-            <a:normAutofit lnSpcReduction="10000"/>
-          </a:bodyPr>
-          <a:lstStyle/>
-          <a:p>
-            <a:r>
-              <a:rPr lang="pt-BR" sz="2800" dirty="0" smtClean="0"/>
-              <a:t>Os dados coletados pelo </a:t>
-            </a:r>
-            <a:r>
-              <a:rPr lang="pt-BR" sz="2800" dirty="0" err="1" smtClean="0"/>
-              <a:t>SpiR-ID</a:t>
-            </a:r>
-            <a:r>
-              <a:rPr lang="pt-BR" sz="2800" dirty="0" smtClean="0"/>
-              <a:t> são enviados para um computador que contenha o programa SPIR;</a:t>
-            </a:r>
-          </a:p>
-          <a:p>
-            <a:r>
-              <a:rPr lang="pt-BR" sz="2800" dirty="0" smtClean="0"/>
-              <a:t>Este programa organiza os dados em um arquivo de texto (com valores separados por ponto-e-vírgula) separado em colunas com cada tipo de dado levantado.</a:t>
-            </a:r>
-          </a:p>
-          <a:p>
-            <a:r>
-              <a:rPr lang="pt-BR" sz="2800" dirty="0" smtClean="0"/>
-              <a:t>As colunas utilizadas neste trabalho são:</a:t>
+              <a:rPr lang="pt-BR" sz="2800" dirty="0" smtClean="0"/>
+              <a:t>O programa </a:t>
+            </a:r>
+            <a:r>
+              <a:rPr lang="pt-BR" sz="2800" i="1" dirty="0" smtClean="0"/>
+              <a:t>Análise de Risco</a:t>
+            </a:r>
+            <a:r>
+              <a:rPr lang="pt-BR" sz="2800" dirty="0" smtClean="0"/>
+              <a:t> possui funções específicas para calcular o Excesso de Risco Relativo, onde são definidas a partir de:</a:t>
             </a:r>
           </a:p>
           <a:p>
             <a:pPr lvl="1"/>
             <a:r>
-              <a:rPr lang="pt-BR" sz="2400" i="1" dirty="0" smtClean="0"/>
-              <a:t>Date</a:t>
+              <a:rPr lang="pt-BR" sz="2400" dirty="0" smtClean="0"/>
+              <a:t>Sexo dos indivíduos</a:t>
             </a:r>
           </a:p>
           <a:p>
             <a:pPr lvl="1"/>
             <a:r>
-              <a:rPr lang="pt-BR" sz="2400" i="1" dirty="0" err="1" smtClean="0"/>
-              <a:t>Gamma</a:t>
-            </a:r>
-            <a:r>
-              <a:rPr lang="pt-BR" sz="2400" i="1" dirty="0" smtClean="0"/>
-              <a:t> </a:t>
-            </a:r>
-            <a:r>
-              <a:rPr lang="pt-BR" sz="2400" i="1" dirty="0" err="1" smtClean="0"/>
-              <a:t>ground</a:t>
-            </a:r>
-            <a:r>
-              <a:rPr lang="pt-BR" sz="2400" i="1" dirty="0" smtClean="0"/>
-              <a:t> dose rate(</a:t>
-            </a:r>
-            <a:r>
-              <a:rPr lang="el-GR" sz="2400" i="1" dirty="0" smtClean="0"/>
-              <a:t>μ</a:t>
-            </a:r>
-            <a:r>
-              <a:rPr lang="pt-BR" sz="2400" i="1" dirty="0" err="1" smtClean="0"/>
-              <a:t>Sv</a:t>
-            </a:r>
-            <a:r>
-              <a:rPr lang="pt-BR" sz="2400" i="1" dirty="0" smtClean="0"/>
-              <a:t>/h)</a:t>
-            </a:r>
-          </a:p>
-          <a:p>
-            <a:pPr lvl="1"/>
-            <a:r>
-              <a:rPr lang="pt-BR" sz="2400" i="1" dirty="0" err="1" smtClean="0"/>
-              <a:t>Cosmic</a:t>
-            </a:r>
-            <a:r>
-              <a:rPr lang="pt-BR" sz="2400" i="1" dirty="0" smtClean="0"/>
-              <a:t> dose rate(</a:t>
-            </a:r>
-            <a:r>
-              <a:rPr lang="el-GR" sz="2400" i="1" dirty="0" smtClean="0"/>
-              <a:t>μ</a:t>
-            </a:r>
-            <a:r>
-              <a:rPr lang="pt-BR" sz="2400" i="1" dirty="0" err="1" smtClean="0"/>
-              <a:t>Sv</a:t>
-            </a:r>
-            <a:r>
-              <a:rPr lang="pt-BR" sz="2400" i="1" dirty="0" smtClean="0"/>
-              <a:t>/h)</a:t>
-            </a:r>
-            <a:endParaRPr lang="pt-BR" sz="2400" i="1" dirty="0"/>
+              <a:rPr lang="pt-BR" sz="2400" dirty="0" smtClean="0"/>
+              <a:t>Tempo após exposição</a:t>
+            </a:r>
+          </a:p>
+          <a:p>
+            <a:pPr lvl="2"/>
+            <a:r>
+              <a:rPr lang="pt-BR" sz="2000" dirty="0" smtClean="0"/>
+              <a:t>10 anos</a:t>
+            </a:r>
+          </a:p>
+          <a:p>
+            <a:pPr lvl="2"/>
+            <a:r>
+              <a:rPr lang="pt-BR" sz="2000" dirty="0" smtClean="0"/>
+              <a:t>20 anos</a:t>
+            </a:r>
+          </a:p>
+          <a:p>
+            <a:pPr lvl="2"/>
+            <a:r>
+              <a:rPr lang="pt-BR" sz="2000" dirty="0" smtClean="0"/>
+              <a:t> 30 anos ou mais.</a:t>
+            </a:r>
+            <a:endParaRPr lang="pt-BR" sz="2000" dirty="0"/>
           </a:p>
         </p:txBody>
       </p:sp>
@@ -6874,400 +6983,6 @@
 </file>
 
 <file path=ppt/slides/slide35.xml><?xml version="1.0" encoding="utf-8"?>
-<p:sld xmlns:a="http://schemas.openxmlformats.org/drawingml/2006/main" xmlns:r="http://schemas.openxmlformats.org/officeDocument/2006/relationships" xmlns:p="http://schemas.openxmlformats.org/presentationml/2006/main">
-  <p:cSld>
-    <p:spTree>
-      <p:nvGrpSpPr>
-        <p:cNvPr id="1" name=""/>
-        <p:cNvGrpSpPr/>
-        <p:nvPr/>
-      </p:nvGrpSpPr>
-      <p:grpSpPr>
-        <a:xfrm>
-          <a:off x="0" y="0"/>
-          <a:ext cx="0" cy="0"/>
-          <a:chOff x="0" y="0"/>
-          <a:chExt cx="0" cy="0"/>
-        </a:xfrm>
-      </p:grpSpPr>
-      <p:sp>
-        <p:nvSpPr>
-          <p:cNvPr id="2" name="Título 1"/>
-          <p:cNvSpPr>
-            <a:spLocks noGrp="1"/>
-          </p:cNvSpPr>
-          <p:nvPr>
-            <p:ph type="title"/>
-          </p:nvPr>
-        </p:nvSpPr>
-        <p:spPr/>
-        <p:txBody>
-          <a:bodyPr>
-            <a:normAutofit/>
-          </a:bodyPr>
-          <a:lstStyle/>
-          <a:p>
-            <a:r>
-              <a:rPr lang="en-US" sz="4000" dirty="0" err="1" smtClean="0"/>
-              <a:t>Levantamento</a:t>
-            </a:r>
-            <a:r>
-              <a:rPr lang="en-US" sz="4000" dirty="0" smtClean="0"/>
-              <a:t> </a:t>
-            </a:r>
-            <a:r>
-              <a:rPr lang="en-US" sz="4000" dirty="0" err="1" smtClean="0"/>
-              <a:t>radiom</a:t>
-            </a:r>
-            <a:r>
-              <a:rPr lang="pt-BR" sz="4000" dirty="0" err="1" smtClean="0"/>
-              <a:t>étrico</a:t>
-            </a:r>
-            <a:endParaRPr lang="pt-BR" sz="4000" dirty="0"/>
-          </a:p>
-        </p:txBody>
-      </p:sp>
-      <p:pic>
-        <p:nvPicPr>
-          <p:cNvPr id="4" name="Espaço Reservado para Conteúdo 3" descr="print trecho colunas date gamma cosmic.PNG"/>
-          <p:cNvPicPr>
-            <a:picLocks noGrp="1" noChangeAspect="1"/>
-          </p:cNvPicPr>
-          <p:nvPr>
-            <p:ph idx="1"/>
-          </p:nvPr>
-        </p:nvPicPr>
-        <p:blipFill>
-          <a:blip r:embed="rId2" cstate="print"/>
-          <a:stretch>
-            <a:fillRect/>
-          </a:stretch>
-        </p:blipFill>
-        <p:spPr>
-          <a:xfrm>
-            <a:off x="1499884" y="1600200"/>
-            <a:ext cx="6144232" cy="4525963"/>
-          </a:xfrm>
-        </p:spPr>
-      </p:pic>
-    </p:spTree>
-  </p:cSld>
-  <p:clrMapOvr>
-    <a:masterClrMapping/>
-  </p:clrMapOvr>
-</p:sld>
-</file>
-
-<file path=ppt/slides/slide36.xml><?xml version="1.0" encoding="utf-8"?>
-<p:sld xmlns:a="http://schemas.openxmlformats.org/drawingml/2006/main" xmlns:r="http://schemas.openxmlformats.org/officeDocument/2006/relationships" xmlns:p="http://schemas.openxmlformats.org/presentationml/2006/main">
-  <p:cSld>
-    <p:spTree>
-      <p:nvGrpSpPr>
-        <p:cNvPr id="1" name=""/>
-        <p:cNvGrpSpPr/>
-        <p:nvPr/>
-      </p:nvGrpSpPr>
-      <p:grpSpPr>
-        <a:xfrm>
-          <a:off x="0" y="0"/>
-          <a:ext cx="0" cy="0"/>
-          <a:chOff x="0" y="0"/>
-          <a:chExt cx="0" cy="0"/>
-        </a:xfrm>
-      </p:grpSpPr>
-      <p:sp>
-        <p:nvSpPr>
-          <p:cNvPr id="2" name="Título 1"/>
-          <p:cNvSpPr>
-            <a:spLocks noGrp="1"/>
-          </p:cNvSpPr>
-          <p:nvPr>
-            <p:ph type="title"/>
-          </p:nvPr>
-        </p:nvSpPr>
-        <p:spPr/>
-        <p:txBody>
-          <a:bodyPr>
-            <a:normAutofit/>
-          </a:bodyPr>
-          <a:lstStyle/>
-          <a:p>
-            <a:r>
-              <a:rPr lang="pt-BR" sz="4000" dirty="0" smtClean="0"/>
-              <a:t>Processamento dos dados coletados</a:t>
-            </a:r>
-            <a:endParaRPr lang="pt-BR" sz="4000" dirty="0"/>
-          </a:p>
-        </p:txBody>
-      </p:sp>
-      <p:sp>
-        <p:nvSpPr>
-          <p:cNvPr id="3" name="Espaço Reservado para Conteúdo 2"/>
-          <p:cNvSpPr>
-            <a:spLocks noGrp="1"/>
-          </p:cNvSpPr>
-          <p:nvPr>
-            <p:ph idx="1"/>
-          </p:nvPr>
-        </p:nvSpPr>
-        <p:spPr/>
-        <p:txBody>
-          <a:bodyPr>
-            <a:normAutofit/>
-          </a:bodyPr>
-          <a:lstStyle/>
-          <a:p>
-            <a:r>
-              <a:rPr lang="pt-BR" sz="2800" dirty="0" smtClean="0"/>
-              <a:t>O programa </a:t>
-            </a:r>
-            <a:r>
-              <a:rPr lang="pt-BR" sz="2800" i="1" dirty="0" smtClean="0"/>
-              <a:t>Análise de Risco </a:t>
-            </a:r>
-            <a:r>
-              <a:rPr lang="pt-BR" sz="2800" dirty="0" smtClean="0"/>
-              <a:t>é responsável por coletar as colunas de interesse do arquivo de levantamento radiométrico;</a:t>
-            </a:r>
-          </a:p>
-          <a:p>
-            <a:pPr marL="342900" lvl="1" indent="-342900">
-              <a:buFont typeface="Arial" pitchFamily="34" charset="0"/>
-              <a:buChar char="•"/>
-            </a:pPr>
-            <a:r>
-              <a:rPr lang="pt-BR" sz="2800" dirty="0" smtClean="0"/>
-              <a:t>Calcula </a:t>
-            </a:r>
-            <a:r>
-              <a:rPr lang="pt-BR" sz="2800" i="1" dirty="0" smtClean="0"/>
-              <a:t>D</a:t>
-            </a:r>
-            <a:r>
-              <a:rPr lang="pt-BR" sz="2800" dirty="0" smtClean="0"/>
-              <a:t> através da soma entre cada valor da coluna </a:t>
-            </a:r>
-            <a:r>
-              <a:rPr lang="pt-BR" i="1" dirty="0" err="1" smtClean="0"/>
-              <a:t>Gamma</a:t>
-            </a:r>
-            <a:r>
-              <a:rPr lang="pt-BR" i="1" dirty="0" smtClean="0"/>
-              <a:t> </a:t>
-            </a:r>
-            <a:r>
-              <a:rPr lang="pt-BR" i="1" dirty="0" err="1" smtClean="0"/>
-              <a:t>ground</a:t>
-            </a:r>
-            <a:r>
-              <a:rPr lang="pt-BR" i="1" dirty="0" smtClean="0"/>
-              <a:t> dose rate(</a:t>
-            </a:r>
-            <a:r>
-              <a:rPr lang="el-GR" i="1" dirty="0" smtClean="0"/>
-              <a:t>μ</a:t>
-            </a:r>
-            <a:r>
-              <a:rPr lang="pt-BR" i="1" dirty="0" err="1" smtClean="0"/>
-              <a:t>Sv</a:t>
-            </a:r>
-            <a:r>
-              <a:rPr lang="pt-BR" i="1" dirty="0" smtClean="0"/>
-              <a:t>/h</a:t>
-            </a:r>
-            <a:r>
-              <a:rPr lang="pt-BR" i="1" dirty="0" smtClean="0"/>
-              <a:t>)</a:t>
-            </a:r>
-            <a:r>
-              <a:rPr lang="pt-BR" dirty="0" smtClean="0"/>
-              <a:t> </a:t>
-            </a:r>
-            <a:r>
-              <a:rPr lang="pt-BR" dirty="0" smtClean="0"/>
-              <a:t>com cada valor da coluna </a:t>
-            </a:r>
-            <a:r>
-              <a:rPr lang="pt-BR" i="1" dirty="0" err="1" smtClean="0"/>
-              <a:t>Cosmic</a:t>
-            </a:r>
-            <a:r>
-              <a:rPr lang="pt-BR" i="1" dirty="0" smtClean="0"/>
-              <a:t> dose rate(</a:t>
-            </a:r>
-            <a:r>
-              <a:rPr lang="el-GR" i="1" dirty="0" smtClean="0"/>
-              <a:t>μ</a:t>
-            </a:r>
-            <a:r>
-              <a:rPr lang="pt-BR" i="1" dirty="0" err="1" smtClean="0"/>
-              <a:t>Sv</a:t>
-            </a:r>
-            <a:r>
-              <a:rPr lang="pt-BR" i="1" dirty="0" smtClean="0"/>
-              <a:t>/h)</a:t>
-            </a:r>
-            <a:r>
-              <a:rPr lang="pt-BR" sz="2400" dirty="0" smtClean="0"/>
-              <a:t>;</a:t>
-            </a:r>
-          </a:p>
-          <a:p>
-            <a:pPr marL="342900" lvl="1" indent="-342900">
-              <a:buFont typeface="Arial" pitchFamily="34" charset="0"/>
-              <a:buChar char="•"/>
-            </a:pPr>
-            <a:r>
-              <a:rPr lang="pt-BR" dirty="0" smtClean="0"/>
-              <a:t>Os valores da coluna </a:t>
-            </a:r>
-            <a:r>
-              <a:rPr lang="pt-BR" i="1" dirty="0" smtClean="0"/>
-              <a:t>Date</a:t>
-            </a:r>
-            <a:r>
-              <a:rPr lang="pt-BR" dirty="0" smtClean="0"/>
-              <a:t> são utilizados exclusivamente para criar o identificador de cada arquivo a ser lido pelo programa </a:t>
-            </a:r>
-            <a:r>
-              <a:rPr lang="pt-BR" i="1" dirty="0" smtClean="0"/>
-              <a:t>desktop.</a:t>
-            </a:r>
-            <a:endParaRPr lang="pt-BR" dirty="0" smtClean="0"/>
-          </a:p>
-        </p:txBody>
-      </p:sp>
-    </p:spTree>
-  </p:cSld>
-  <p:clrMapOvr>
-    <a:masterClrMapping/>
-  </p:clrMapOvr>
-</p:sld>
-</file>
-
-<file path=ppt/slides/slide37.xml><?xml version="1.0" encoding="utf-8"?>
-<p:sld xmlns:a="http://schemas.openxmlformats.org/drawingml/2006/main" xmlns:r="http://schemas.openxmlformats.org/officeDocument/2006/relationships" xmlns:p="http://schemas.openxmlformats.org/presentationml/2006/main">
-  <p:cSld>
-    <p:spTree>
-      <p:nvGrpSpPr>
-        <p:cNvPr id="1" name=""/>
-        <p:cNvGrpSpPr/>
-        <p:nvPr/>
-      </p:nvGrpSpPr>
-      <p:grpSpPr>
-        <a:xfrm>
-          <a:off x="0" y="0"/>
-          <a:ext cx="0" cy="0"/>
-          <a:chOff x="0" y="0"/>
-          <a:chExt cx="0" cy="0"/>
-        </a:xfrm>
-      </p:grpSpPr>
-      <p:sp>
-        <p:nvSpPr>
-          <p:cNvPr id="2" name="Título 1"/>
-          <p:cNvSpPr>
-            <a:spLocks noGrp="1"/>
-          </p:cNvSpPr>
-          <p:nvPr>
-            <p:ph type="title"/>
-          </p:nvPr>
-        </p:nvSpPr>
-        <p:spPr/>
-        <p:txBody>
-          <a:bodyPr>
-            <a:normAutofit fontScale="90000"/>
-          </a:bodyPr>
-          <a:lstStyle/>
-          <a:p>
-            <a:r>
-              <a:rPr lang="pt-BR" dirty="0" smtClean="0"/>
-              <a:t>Processamento dos dados coletados</a:t>
-            </a:r>
-            <a:endParaRPr lang="pt-BR" dirty="0"/>
-          </a:p>
-        </p:txBody>
-      </p:sp>
-      <p:sp>
-        <p:nvSpPr>
-          <p:cNvPr id="3" name="Espaço Reservado para Conteúdo 2"/>
-          <p:cNvSpPr>
-            <a:spLocks noGrp="1"/>
-          </p:cNvSpPr>
-          <p:nvPr>
-            <p:ph idx="1"/>
-          </p:nvPr>
-        </p:nvSpPr>
-        <p:spPr/>
-        <p:txBody>
-          <a:bodyPr>
-            <a:normAutofit/>
-          </a:bodyPr>
-          <a:lstStyle/>
-          <a:p>
-            <a:r>
-              <a:rPr lang="pt-BR" sz="2800" dirty="0" smtClean="0"/>
-              <a:t>O programa </a:t>
-            </a:r>
-            <a:r>
-              <a:rPr lang="pt-BR" sz="2800" i="1" dirty="0" smtClean="0"/>
-              <a:t>Análise de Risco</a:t>
-            </a:r>
-            <a:r>
-              <a:rPr lang="pt-BR" sz="2800" dirty="0" smtClean="0"/>
-              <a:t> possui funções específicas para calcular o Excesso de Risco Relativo, onde são definidas a partir de:</a:t>
-            </a:r>
-          </a:p>
-          <a:p>
-            <a:pPr lvl="1"/>
-            <a:r>
-              <a:rPr lang="pt-BR" sz="2400" dirty="0" smtClean="0"/>
-              <a:t>Sexo dos indivíduos</a:t>
-            </a:r>
-          </a:p>
-          <a:p>
-            <a:pPr lvl="1"/>
-            <a:r>
-              <a:rPr lang="pt-BR" sz="2400" dirty="0" smtClean="0"/>
-              <a:t>Tempo após exposição</a:t>
-            </a:r>
-          </a:p>
-          <a:p>
-            <a:pPr lvl="2"/>
-            <a:r>
-              <a:rPr lang="pt-BR" sz="2000" dirty="0" smtClean="0"/>
-              <a:t>10 anos</a:t>
-            </a:r>
-          </a:p>
-          <a:p>
-            <a:pPr lvl="2"/>
-            <a:r>
-              <a:rPr lang="pt-BR" sz="2000" dirty="0" smtClean="0"/>
-              <a:t>20 anos</a:t>
-            </a:r>
-          </a:p>
-          <a:p>
-            <a:pPr lvl="2"/>
-            <a:r>
-              <a:rPr lang="pt-BR" sz="2000" dirty="0" smtClean="0"/>
-              <a:t> </a:t>
-            </a:r>
-            <a:r>
-              <a:rPr lang="pt-BR" sz="2000" dirty="0" smtClean="0"/>
-              <a:t>30 anos ou mais.</a:t>
-            </a:r>
-            <a:endParaRPr lang="pt-BR" sz="2000" dirty="0"/>
-          </a:p>
-        </p:txBody>
-      </p:sp>
-    </p:spTree>
-  </p:cSld>
-  <p:clrMapOvr>
-    <a:masterClrMapping/>
-  </p:clrMapOvr>
-</p:sld>
-</file>
-
-<file path=ppt/slides/slide38.xml><?xml version="1.0" encoding="utf-8"?>
 <p:sld xmlns:a="http://schemas.openxmlformats.org/drawingml/2006/main" xmlns:r="http://schemas.openxmlformats.org/officeDocument/2006/relationships" xmlns:p="http://schemas.openxmlformats.org/presentationml/2006/main">
   <p:cSld>
     <p:spTree>
@@ -7528,7 +7243,7 @@
 </p:sld>
 </file>
 
-<file path=ppt/slides/slide39.xml><?xml version="1.0" encoding="utf-8"?>
+<file path=ppt/slides/slide36.xml><?xml version="1.0" encoding="utf-8"?>
 <p:sld xmlns:a="http://schemas.openxmlformats.org/drawingml/2006/main" xmlns:r="http://schemas.openxmlformats.org/officeDocument/2006/relationships" xmlns:p="http://schemas.openxmlformats.org/presentationml/2006/main">
   <p:cSld>
     <p:spTree>
@@ -7789,6 +7504,349 @@
 </p:sld>
 </file>
 
+<file path=ppt/slides/slide37.xml><?xml version="1.0" encoding="utf-8"?>
+<p:sld xmlns:a="http://schemas.openxmlformats.org/drawingml/2006/main" xmlns:r="http://schemas.openxmlformats.org/officeDocument/2006/relationships" xmlns:p="http://schemas.openxmlformats.org/presentationml/2006/main">
+  <p:cSld>
+    <p:spTree>
+      <p:nvGrpSpPr>
+        <p:cNvPr id="1" name=""/>
+        <p:cNvGrpSpPr/>
+        <p:nvPr/>
+      </p:nvGrpSpPr>
+      <p:grpSpPr>
+        <a:xfrm>
+          <a:off x="0" y="0"/>
+          <a:ext cx="0" cy="0"/>
+          <a:chOff x="0" y="0"/>
+          <a:chExt cx="0" cy="0"/>
+        </a:xfrm>
+      </p:grpSpPr>
+      <p:sp>
+        <p:nvSpPr>
+          <p:cNvPr id="2" name="Título 1"/>
+          <p:cNvSpPr>
+            <a:spLocks noGrp="1"/>
+          </p:cNvSpPr>
+          <p:nvPr>
+            <p:ph type="title"/>
+          </p:nvPr>
+        </p:nvSpPr>
+        <p:spPr/>
+        <p:txBody>
+          <a:bodyPr>
+            <a:normAutofit/>
+          </a:bodyPr>
+          <a:lstStyle/>
+          <a:p>
+            <a:r>
+              <a:rPr lang="pt-BR" sz="4000" dirty="0" smtClean="0"/>
+              <a:t>Visualização das estimativas</a:t>
+            </a:r>
+            <a:endParaRPr lang="pt-BR" sz="4000" dirty="0"/>
+          </a:p>
+        </p:txBody>
+      </p:sp>
+      <p:sp>
+        <p:nvSpPr>
+          <p:cNvPr id="3" name="Espaço Reservado para Conteúdo 2"/>
+          <p:cNvSpPr>
+            <a:spLocks noGrp="1"/>
+          </p:cNvSpPr>
+          <p:nvPr>
+            <p:ph idx="1"/>
+          </p:nvPr>
+        </p:nvSpPr>
+        <p:spPr/>
+        <p:txBody>
+          <a:bodyPr>
+            <a:normAutofit/>
+          </a:bodyPr>
+          <a:lstStyle/>
+          <a:p>
+            <a:r>
+              <a:rPr lang="pt-BR" sz="2800" dirty="0" smtClean="0"/>
+              <a:t>Após os cálculos serem feitos pelo programa, as estimativas podem ser visualizadas através de um gráfico em </a:t>
+            </a:r>
+            <a:r>
+              <a:rPr lang="pt-BR" sz="2800" dirty="0" smtClean="0"/>
+              <a:t>barras;</a:t>
+            </a:r>
+            <a:endParaRPr lang="pt-BR" sz="2800" dirty="0" smtClean="0"/>
+          </a:p>
+          <a:p>
+            <a:r>
+              <a:rPr lang="pt-BR" sz="2800" dirty="0" smtClean="0"/>
+              <a:t>O programa ainda permite o envio das estimativas calculadas para uma base de dados </a:t>
+            </a:r>
+            <a:r>
+              <a:rPr lang="pt-BR" sz="2800" i="1" dirty="0" smtClean="0"/>
+              <a:t>online</a:t>
+            </a:r>
+            <a:r>
+              <a:rPr lang="pt-BR" sz="2800" dirty="0" smtClean="0"/>
+              <a:t> </a:t>
+            </a:r>
+            <a:r>
+              <a:rPr lang="pt-BR" sz="2800" dirty="0" err="1" smtClean="0"/>
+              <a:t>NoSQL</a:t>
+            </a:r>
+            <a:r>
+              <a:rPr lang="pt-BR" sz="2800" dirty="0" smtClean="0"/>
+              <a:t> do </a:t>
+            </a:r>
+            <a:r>
+              <a:rPr lang="pt-BR" sz="2800" dirty="0" err="1" smtClean="0"/>
+              <a:t>Firebase</a:t>
+            </a:r>
+            <a:r>
+              <a:rPr lang="pt-BR" sz="2800" dirty="0" smtClean="0"/>
+              <a:t>.</a:t>
+            </a:r>
+            <a:endParaRPr lang="pt-BR" sz="2800" dirty="0" smtClean="0"/>
+          </a:p>
+          <a:p>
+            <a:pPr lvl="1"/>
+            <a:r>
+              <a:rPr lang="pt-BR" sz="2400" dirty="0" smtClean="0"/>
+              <a:t>O </a:t>
+            </a:r>
+            <a:r>
+              <a:rPr lang="pt-BR" sz="2400" dirty="0" err="1" smtClean="0"/>
+              <a:t>Firebase</a:t>
+            </a:r>
+            <a:r>
+              <a:rPr lang="pt-BR" sz="2400" dirty="0" smtClean="0"/>
+              <a:t> </a:t>
+            </a:r>
+            <a:r>
+              <a:rPr lang="pt-BR" sz="2400" dirty="0" smtClean="0"/>
+              <a:t>será utilizado para sincronizar as estimativas de ERR/</a:t>
+            </a:r>
+            <a:r>
+              <a:rPr lang="pt-BR" sz="2400" dirty="0" err="1" smtClean="0"/>
+              <a:t>Sv</a:t>
+            </a:r>
+            <a:r>
+              <a:rPr lang="pt-BR" sz="2400" dirty="0" smtClean="0"/>
+              <a:t> com uma aplicação </a:t>
+            </a:r>
+            <a:r>
+              <a:rPr lang="pt-BR" sz="2400" i="1" dirty="0" err="1" smtClean="0"/>
+              <a:t>mobile</a:t>
+            </a:r>
+            <a:r>
+              <a:rPr lang="pt-BR" sz="2400" i="1" dirty="0" smtClean="0"/>
+              <a:t> ERR</a:t>
+            </a:r>
+            <a:r>
+              <a:rPr lang="pt-BR" sz="2400" dirty="0" smtClean="0"/>
+              <a:t>.</a:t>
+            </a:r>
+          </a:p>
+          <a:p>
+            <a:pPr lvl="2"/>
+            <a:r>
+              <a:rPr lang="pt-BR" sz="2000" dirty="0" smtClean="0"/>
+              <a:t>Que por sua vez, também gera a visualização das estimativas de ERR/</a:t>
+            </a:r>
+            <a:r>
+              <a:rPr lang="pt-BR" sz="2000" dirty="0" err="1" smtClean="0"/>
+              <a:t>Sv</a:t>
+            </a:r>
+            <a:r>
+              <a:rPr lang="pt-BR" sz="2000" dirty="0" smtClean="0"/>
+              <a:t> em tempo real na tela do </a:t>
+            </a:r>
+            <a:r>
+              <a:rPr lang="pt-BR" sz="2000" i="1" dirty="0" err="1" smtClean="0"/>
+              <a:t>smartphone</a:t>
+            </a:r>
+            <a:r>
+              <a:rPr lang="pt-BR" sz="2000" i="1" dirty="0" smtClean="0"/>
+              <a:t> ou </a:t>
+            </a:r>
+            <a:r>
+              <a:rPr lang="pt-BR" sz="2000" i="1" dirty="0" err="1" smtClean="0"/>
+              <a:t>tablet</a:t>
+            </a:r>
+            <a:r>
+              <a:rPr lang="pt-BR" sz="2000" i="1" dirty="0" smtClean="0"/>
+              <a:t>.</a:t>
+            </a:r>
+            <a:endParaRPr lang="pt-BR" sz="2000" dirty="0" smtClean="0"/>
+          </a:p>
+        </p:txBody>
+      </p:sp>
+    </p:spTree>
+  </p:cSld>
+  <p:clrMapOvr>
+    <a:masterClrMapping/>
+  </p:clrMapOvr>
+</p:sld>
+</file>
+
+<file path=ppt/slides/slide38.xml><?xml version="1.0" encoding="utf-8"?>
+<p:sld xmlns:a="http://schemas.openxmlformats.org/drawingml/2006/main" xmlns:r="http://schemas.openxmlformats.org/officeDocument/2006/relationships" xmlns:p="http://schemas.openxmlformats.org/presentationml/2006/main">
+  <p:cSld>
+    <p:spTree>
+      <p:nvGrpSpPr>
+        <p:cNvPr id="1" name=""/>
+        <p:cNvGrpSpPr/>
+        <p:nvPr/>
+      </p:nvGrpSpPr>
+      <p:grpSpPr>
+        <a:xfrm>
+          <a:off x="0" y="0"/>
+          <a:ext cx="0" cy="0"/>
+          <a:chOff x="0" y="0"/>
+          <a:chExt cx="0" cy="0"/>
+        </a:xfrm>
+      </p:grpSpPr>
+      <p:sp>
+        <p:nvSpPr>
+          <p:cNvPr id="2" name="Título 1"/>
+          <p:cNvSpPr>
+            <a:spLocks noGrp="1"/>
+          </p:cNvSpPr>
+          <p:nvPr>
+            <p:ph type="title"/>
+          </p:nvPr>
+        </p:nvSpPr>
+        <p:spPr/>
+        <p:txBody>
+          <a:bodyPr>
+            <a:normAutofit/>
+          </a:bodyPr>
+          <a:lstStyle/>
+          <a:p>
+            <a:r>
+              <a:rPr lang="pt-BR" sz="4000" dirty="0" smtClean="0"/>
+              <a:t>Visualização das estimativas</a:t>
+            </a:r>
+            <a:endParaRPr lang="pt-BR" sz="4000" dirty="0"/>
+          </a:p>
+        </p:txBody>
+      </p:sp>
+      <p:pic>
+        <p:nvPicPr>
+          <p:cNvPr id="4" name="Espaço Reservado para Conteúdo 3" descr="print trecho desktop estimativas.PNG"/>
+          <p:cNvPicPr>
+            <a:picLocks noGrp="1" noChangeAspect="1"/>
+          </p:cNvPicPr>
+          <p:nvPr>
+            <p:ph idx="1"/>
+          </p:nvPr>
+        </p:nvPicPr>
+        <p:blipFill>
+          <a:blip r:embed="rId2" cstate="print"/>
+          <a:stretch>
+            <a:fillRect/>
+          </a:stretch>
+        </p:blipFill>
+        <p:spPr>
+          <a:xfrm>
+            <a:off x="2156536" y="1600200"/>
+            <a:ext cx="4830927" cy="4525963"/>
+          </a:xfrm>
+          <a:ln>
+            <a:solidFill>
+              <a:schemeClr val="tx1">
+                <a:lumMod val="95000"/>
+                <a:lumOff val="5000"/>
+              </a:schemeClr>
+            </a:solidFill>
+          </a:ln>
+        </p:spPr>
+      </p:pic>
+    </p:spTree>
+  </p:cSld>
+  <p:clrMapOvr>
+    <a:masterClrMapping/>
+  </p:clrMapOvr>
+</p:sld>
+</file>
+
+<file path=ppt/slides/slide39.xml><?xml version="1.0" encoding="utf-8"?>
+<p:sld xmlns:a="http://schemas.openxmlformats.org/drawingml/2006/main" xmlns:r="http://schemas.openxmlformats.org/officeDocument/2006/relationships" xmlns:p="http://schemas.openxmlformats.org/presentationml/2006/main">
+  <p:cSld>
+    <p:spTree>
+      <p:nvGrpSpPr>
+        <p:cNvPr id="1" name=""/>
+        <p:cNvGrpSpPr/>
+        <p:nvPr/>
+      </p:nvGrpSpPr>
+      <p:grpSpPr>
+        <a:xfrm>
+          <a:off x="0" y="0"/>
+          <a:ext cx="0" cy="0"/>
+          <a:chOff x="0" y="0"/>
+          <a:chExt cx="0" cy="0"/>
+        </a:xfrm>
+      </p:grpSpPr>
+      <p:sp>
+        <p:nvSpPr>
+          <p:cNvPr id="2" name="Título 1"/>
+          <p:cNvSpPr>
+            <a:spLocks noGrp="1"/>
+          </p:cNvSpPr>
+          <p:nvPr>
+            <p:ph type="title"/>
+          </p:nvPr>
+        </p:nvSpPr>
+        <p:spPr/>
+        <p:txBody>
+          <a:bodyPr>
+            <a:normAutofit/>
+          </a:bodyPr>
+          <a:lstStyle/>
+          <a:p>
+            <a:r>
+              <a:rPr lang="pt-BR" sz="4000" dirty="0" smtClean="0"/>
+              <a:t>Visualização das estimativas</a:t>
+            </a:r>
+            <a:endParaRPr lang="pt-BR" sz="4000" dirty="0"/>
+          </a:p>
+        </p:txBody>
+      </p:sp>
+      <p:pic>
+        <p:nvPicPr>
+          <p:cNvPr id="4" name="Espaço Reservado para Conteúdo 3" descr="device-2018-12-09-020647.png"/>
+          <p:cNvPicPr>
+            <a:picLocks noGrp="1" noChangeAspect="1"/>
+          </p:cNvPicPr>
+          <p:nvPr>
+            <p:ph idx="1"/>
+          </p:nvPr>
+        </p:nvPicPr>
+        <p:blipFill>
+          <a:blip r:embed="rId2" cstate="print"/>
+          <a:stretch>
+            <a:fillRect/>
+          </a:stretch>
+        </p:blipFill>
+        <p:spPr>
+          <a:xfrm>
+            <a:off x="3299073" y="1600200"/>
+            <a:ext cx="2545854" cy="4525963"/>
+          </a:xfrm>
+          <a:ln>
+            <a:solidFill>
+              <a:schemeClr val="tx1">
+                <a:lumMod val="85000"/>
+                <a:lumOff val="15000"/>
+              </a:schemeClr>
+            </a:solidFill>
+          </a:ln>
+        </p:spPr>
+      </p:pic>
+    </p:spTree>
+  </p:cSld>
+  <p:clrMapOvr>
+    <a:masterClrMapping/>
+  </p:clrMapOvr>
+</p:sld>
+</file>
+
 <file path=ppt/slides/slide4.xml><?xml version="1.0" encoding="utf-8"?>
 <p:sld xmlns:a="http://schemas.openxmlformats.org/drawingml/2006/main" xmlns:r="http://schemas.openxmlformats.org/officeDocument/2006/relationships" xmlns:p="http://schemas.openxmlformats.org/presentationml/2006/main">
   <p:cSld>
@@ -7808,7 +7866,7 @@
       </p:grpSpPr>
       <p:sp>
         <p:nvSpPr>
-          <p:cNvPr id="2" name="Título 1"/>
+          <p:cNvPr id="4" name="Título 3"/>
           <p:cNvSpPr>
             <a:spLocks noGrp="1"/>
           </p:cNvSpPr>
@@ -7825,48 +7883,43 @@
           <a:p>
             <a:r>
               <a:rPr lang="pt-BR" sz="4000" dirty="0" smtClean="0"/>
-              <a:t>Introdução</a:t>
+              <a:t>Fluxo do sistema</a:t>
             </a:r>
             <a:endParaRPr lang="pt-BR" sz="4000" dirty="0"/>
           </a:p>
         </p:txBody>
       </p:sp>
-      <p:sp>
-        <p:nvSpPr>
-          <p:cNvPr id="3" name="Espaço Reservado para Conteúdo 2"/>
-          <p:cNvSpPr>
-            <a:spLocks noGrp="1"/>
-          </p:cNvSpPr>
+      <p:pic>
+        <p:nvPicPr>
+          <p:cNvPr id="6" name="Espaço Reservado para Conteúdo 5" descr="cenário proposto.png"/>
+          <p:cNvPicPr>
+            <a:picLocks noGrp="1" noChangeAspect="1"/>
+          </p:cNvPicPr>
           <p:nvPr>
             <p:ph idx="1"/>
           </p:nvPr>
-        </p:nvSpPr>
-        <p:spPr/>
-        <p:txBody>
-          <a:bodyPr>
-            <a:normAutofit/>
-          </a:bodyPr>
-          <a:lstStyle/>
-          <a:p>
-            <a:r>
-              <a:rPr lang="pt-BR" sz="2800" dirty="0" smtClean="0"/>
-              <a:t>O sistema pode dar apoio a pessoas especializadas, que estejam envolvidas direta ou indiretamente na resolução de eventos de natureza radiológica;</a:t>
-            </a:r>
-          </a:p>
-          <a:p>
-            <a:r>
-              <a:rPr lang="pt-BR" sz="2800" dirty="0" smtClean="0"/>
-              <a:t>Permitindo o acesso a resultados e estimativas de indivíduos expostos a radiação, a fim de produzirem soluções e tomarem decisões como resposta aos eventos radiológicos (acidentes ou atentados).</a:t>
-            </a:r>
-          </a:p>
-          <a:p>
-            <a:endParaRPr lang="pt-BR" sz="2800" dirty="0" smtClean="0"/>
-          </a:p>
-          <a:p>
-            <a:endParaRPr lang="pt-BR" sz="2800" dirty="0"/>
-          </a:p>
-        </p:txBody>
-      </p:sp>
+        </p:nvPicPr>
+        <p:blipFill>
+          <a:blip r:embed="rId2" cstate="print"/>
+          <a:stretch>
+            <a:fillRect/>
+          </a:stretch>
+        </p:blipFill>
+        <p:spPr>
+          <a:xfrm>
+            <a:off x="1554691" y="1600200"/>
+            <a:ext cx="6034617" cy="4525963"/>
+          </a:xfrm>
+          <a:ln>
+            <a:solidFill>
+              <a:schemeClr val="tx1">
+                <a:lumMod val="95000"/>
+                <a:lumOff val="5000"/>
+              </a:schemeClr>
+            </a:solidFill>
+          </a:ln>
+        </p:spPr>
+      </p:pic>
     </p:spTree>
   </p:cSld>
   <p:clrMapOvr>
@@ -7911,7 +7964,7 @@
           <a:p>
             <a:r>
               <a:rPr lang="pt-BR" sz="4000" dirty="0" smtClean="0"/>
-              <a:t>Visualização das estimativas</a:t>
+              <a:t>Conclusão</a:t>
             </a:r>
             <a:endParaRPr lang="pt-BR" sz="4000" dirty="0"/>
           </a:p>
@@ -7930,111 +7983,39 @@
         <p:spPr/>
         <p:txBody>
           <a:bodyPr>
-            <a:normAutofit/>
+            <a:normAutofit fontScale="92500" lnSpcReduction="10000"/>
           </a:bodyPr>
           <a:lstStyle/>
           <a:p>
             <a:r>
               <a:rPr lang="pt-BR" sz="2800" dirty="0" smtClean="0"/>
-              <a:t>Após os cálculos serem feitos pelo programa, as estimativas podem ser visualizadas através de um gráfico em barra.</a:t>
-            </a:r>
-          </a:p>
-          <a:p>
-            <a:r>
-              <a:rPr lang="pt-BR" sz="2800" dirty="0" smtClean="0"/>
-              <a:t>O programa ainda permite o envio das estimativas calculadas para uma base de dados </a:t>
-            </a:r>
-            <a:r>
-              <a:rPr lang="pt-BR" sz="2800" i="1" dirty="0" smtClean="0"/>
-              <a:t>online</a:t>
-            </a:r>
-            <a:r>
-              <a:rPr lang="pt-BR" sz="2800" dirty="0" smtClean="0"/>
-              <a:t> </a:t>
+              <a:t>O sistema desenvolvido neste trabalho pode ser usado na população que foi exposta a baixas doses de radiação (abaixo de </a:t>
+            </a:r>
+            <a:r>
+              <a:rPr lang="pt-BR" sz="2800" dirty="0" smtClean="0"/>
+              <a:t>0,1 </a:t>
             </a:r>
             <a:r>
               <a:rPr lang="pt-BR" sz="2800" dirty="0" err="1" smtClean="0"/>
-              <a:t>NoSQL</a:t>
-            </a:r>
-            <a:r>
-              <a:rPr lang="pt-BR" sz="2800" dirty="0" smtClean="0"/>
-              <a:t> do </a:t>
-            </a:r>
-            <a:r>
-              <a:rPr lang="pt-BR" sz="2800" dirty="0" err="1" smtClean="0"/>
-              <a:t>Firebase</a:t>
-            </a:r>
-            <a:r>
-              <a:rPr lang="pt-BR" sz="2800" dirty="0" smtClean="0"/>
-              <a:t>®.</a:t>
-            </a:r>
-          </a:p>
-          <a:p>
-            <a:pPr lvl="1"/>
-            <a:r>
-              <a:rPr lang="pt-BR" sz="2400" dirty="0" smtClean="0"/>
-              <a:t>O </a:t>
-            </a:r>
-            <a:r>
-              <a:rPr lang="pt-BR" sz="2400" dirty="0" err="1" smtClean="0"/>
-              <a:t>Firebase</a:t>
-            </a:r>
-            <a:r>
-              <a:rPr lang="pt-BR" sz="2400" dirty="0" smtClean="0"/>
-              <a:t>® será utilizado para sincronizar as estimativas de ERR/</a:t>
-            </a:r>
-            <a:r>
-              <a:rPr lang="pt-BR" sz="2400" dirty="0" err="1" smtClean="0"/>
               <a:t>Sv</a:t>
             </a:r>
             <a:r>
-              <a:rPr lang="pt-BR" sz="2400" dirty="0" smtClean="0"/>
-              <a:t> com uma aplicação </a:t>
-            </a:r>
-            <a:r>
-              <a:rPr lang="pt-BR" sz="2400" i="1" dirty="0" err="1" smtClean="0"/>
-              <a:t>mobile</a:t>
-            </a:r>
-            <a:r>
-              <a:rPr lang="pt-BR" sz="2400" i="1" dirty="0" smtClean="0"/>
-              <a:t> ERR</a:t>
-            </a:r>
-            <a:r>
-              <a:rPr lang="pt-BR" sz="2400" dirty="0" smtClean="0"/>
-              <a:t>.</a:t>
-            </a:r>
-          </a:p>
-          <a:p>
-            <a:pPr lvl="2"/>
-            <a:r>
-              <a:rPr lang="pt-BR" sz="2000" dirty="0" smtClean="0"/>
-              <a:t>Que por sua vez, também gera a visualização das estimativas de ERR/</a:t>
-            </a:r>
-            <a:r>
-              <a:rPr lang="pt-BR" sz="2000" dirty="0" err="1" smtClean="0"/>
-              <a:t>Sv</a:t>
-            </a:r>
-            <a:r>
-              <a:rPr lang="pt-BR" sz="2000" dirty="0" smtClean="0"/>
-              <a:t> em tempo real na tela do </a:t>
-            </a:r>
-            <a:r>
-              <a:rPr lang="pt-BR" sz="2000" i="1" dirty="0" err="1" smtClean="0"/>
-              <a:t>smartphone</a:t>
-            </a:r>
-            <a:r>
-              <a:rPr lang="pt-BR" sz="2000" i="1" dirty="0" smtClean="0"/>
-              <a:t> ou </a:t>
-            </a:r>
-            <a:r>
-              <a:rPr lang="pt-BR" sz="2000" i="1" dirty="0" err="1" smtClean="0"/>
-              <a:t>tablet</a:t>
-            </a:r>
-            <a:r>
-              <a:rPr lang="pt-BR" sz="2000" i="1" dirty="0" smtClean="0"/>
-              <a:t>.</a:t>
-            </a:r>
-            <a:endParaRPr lang="pt-BR" sz="2000" dirty="0" smtClean="0"/>
+              <a:rPr lang="pt-BR" sz="2800" dirty="0" smtClean="0"/>
+              <a:t>);</a:t>
+            </a:r>
+          </a:p>
+          <a:p>
+            <a:r>
+              <a:rPr lang="pt-BR" sz="2800" dirty="0" smtClean="0"/>
+              <a:t>Pode ser utilizado como ferramenta auxiliar no processo decisório por órgãos competentes perante eventos radiológicos (atentados ou não);</a:t>
+            </a:r>
+          </a:p>
+          <a:p>
+            <a:r>
+              <a:rPr lang="pt-BR" sz="2800" dirty="0" smtClean="0"/>
+              <a:t>Também pode contribuir para que envolvidos nos eventos radiológicos que tenham interesse direto na resolução do problema e na busca das pessoas afetadas, possam decidir quais vítimas terão prioridade no atendimento médico após exposição.</a:t>
+            </a:r>
+            <a:endParaRPr lang="pt-BR" sz="2800" dirty="0"/>
           </a:p>
         </p:txBody>
       </p:sp>
@@ -8082,35 +8063,97 @@
           <a:p>
             <a:r>
               <a:rPr lang="pt-BR" sz="4000" dirty="0" smtClean="0"/>
-              <a:t>Visualização das estimativas</a:t>
+              <a:t>Trabalhos Futuros</a:t>
             </a:r>
             <a:endParaRPr lang="pt-BR" sz="4000" dirty="0"/>
           </a:p>
         </p:txBody>
       </p:sp>
-      <p:pic>
-        <p:nvPicPr>
-          <p:cNvPr id="4" name="Espaço Reservado para Conteúdo 3" descr="print trecho desktop estimativas.PNG"/>
-          <p:cNvPicPr>
-            <a:picLocks noGrp="1" noChangeAspect="1"/>
-          </p:cNvPicPr>
+      <p:sp>
+        <p:nvSpPr>
+          <p:cNvPr id="3" name="Espaço Reservado para Conteúdo 2"/>
+          <p:cNvSpPr>
+            <a:spLocks noGrp="1"/>
+          </p:cNvSpPr>
           <p:nvPr>
             <p:ph idx="1"/>
           </p:nvPr>
-        </p:nvPicPr>
-        <p:blipFill>
-          <a:blip r:embed="rId2" cstate="print"/>
-          <a:stretch>
-            <a:fillRect/>
-          </a:stretch>
-        </p:blipFill>
-        <p:spPr>
-          <a:xfrm>
-            <a:off x="2156536" y="1600200"/>
-            <a:ext cx="4830927" cy="4525963"/>
-          </a:xfrm>
-        </p:spPr>
-      </p:pic>
+        </p:nvSpPr>
+        <p:spPr/>
+        <p:txBody>
+          <a:bodyPr>
+            <a:normAutofit lnSpcReduction="10000"/>
+          </a:bodyPr>
+          <a:lstStyle/>
+          <a:p>
+            <a:r>
+              <a:rPr lang="pt-BR" sz="2800" dirty="0" smtClean="0"/>
+              <a:t>Implementar um banco de dados próprio nas aplicações </a:t>
+            </a:r>
+            <a:r>
+              <a:rPr lang="pt-BR" sz="2800" i="1" dirty="0" smtClean="0"/>
+              <a:t>desktop Análise de Risco</a:t>
+            </a:r>
+            <a:r>
+              <a:rPr lang="pt-BR" sz="2800" dirty="0" smtClean="0"/>
+              <a:t> e </a:t>
+            </a:r>
+            <a:r>
+              <a:rPr lang="pt-BR" sz="2800" i="1" dirty="0" err="1" smtClean="0"/>
+              <a:t>mobile</a:t>
+            </a:r>
+            <a:r>
+              <a:rPr lang="pt-BR" sz="2800" i="1" dirty="0" smtClean="0"/>
+              <a:t> ERR;</a:t>
+            </a:r>
+          </a:p>
+          <a:p>
+            <a:r>
+              <a:rPr lang="pt-BR" sz="2800" dirty="0" smtClean="0"/>
+              <a:t>Implementar uma interface </a:t>
+            </a:r>
+            <a:r>
+              <a:rPr lang="pt-BR" sz="2800" i="1" dirty="0" smtClean="0"/>
+              <a:t>web</a:t>
+            </a:r>
+            <a:r>
+              <a:rPr lang="pt-BR" sz="2800" dirty="0" smtClean="0"/>
+              <a:t> mais robusta na aplicação </a:t>
+            </a:r>
+            <a:r>
+              <a:rPr lang="pt-BR" sz="2800" i="1" dirty="0" smtClean="0"/>
+              <a:t>Análise de Risco</a:t>
+            </a:r>
+            <a:r>
+              <a:rPr lang="pt-BR" sz="2800" dirty="0" smtClean="0"/>
+              <a:t>;</a:t>
+            </a:r>
+          </a:p>
+          <a:p>
+            <a:r>
+              <a:rPr lang="pt-BR" sz="2800" dirty="0" smtClean="0"/>
+              <a:t>Implementar opções de visualizações com outros tipos de gráficos;</a:t>
+            </a:r>
+          </a:p>
+          <a:p>
+            <a:r>
+              <a:rPr lang="pt-BR" sz="2800" dirty="0" smtClean="0"/>
+              <a:t>Utilizar outros dados contidos em outras colunas dos arquivos de levantamento radiométrico aéreo;</a:t>
+            </a:r>
+          </a:p>
+          <a:p>
+            <a:r>
+              <a:rPr lang="pt-BR" sz="2800" dirty="0" smtClean="0"/>
+              <a:t>Implementar sistema de notificações na aplicação </a:t>
+            </a:r>
+            <a:r>
+              <a:rPr lang="pt-BR" sz="2800" i="1" dirty="0" smtClean="0"/>
+              <a:t>ERR;</a:t>
+            </a:r>
+            <a:endParaRPr lang="pt-BR" sz="2800" dirty="0" smtClean="0"/>
+          </a:p>
+        </p:txBody>
+      </p:sp>
     </p:spTree>
   </p:cSld>
   <p:clrMapOvr>
@@ -8155,35 +8198,65 @@
           <a:p>
             <a:r>
               <a:rPr lang="pt-BR" sz="4000" dirty="0" smtClean="0"/>
-              <a:t>Visualização das estimativas</a:t>
+              <a:t>Trabalhos Futuros</a:t>
             </a:r>
             <a:endParaRPr lang="pt-BR" sz="4000" dirty="0"/>
           </a:p>
         </p:txBody>
       </p:sp>
-      <p:pic>
-        <p:nvPicPr>
-          <p:cNvPr id="4" name="Espaço Reservado para Conteúdo 3" descr="device-2018-12-09-020647.png"/>
-          <p:cNvPicPr>
-            <a:picLocks noGrp="1" noChangeAspect="1"/>
-          </p:cNvPicPr>
+      <p:sp>
+        <p:nvSpPr>
+          <p:cNvPr id="3" name="Espaço Reservado para Conteúdo 2"/>
+          <p:cNvSpPr>
+            <a:spLocks noGrp="1"/>
+          </p:cNvSpPr>
           <p:nvPr>
             <p:ph idx="1"/>
           </p:nvPr>
-        </p:nvPicPr>
-        <p:blipFill>
-          <a:blip r:embed="rId2" cstate="print"/>
-          <a:stretch>
-            <a:fillRect/>
-          </a:stretch>
-        </p:blipFill>
-        <p:spPr>
-          <a:xfrm>
-            <a:off x="3299073" y="1600200"/>
-            <a:ext cx="2545854" cy="4525963"/>
-          </a:xfrm>
-        </p:spPr>
-      </p:pic>
+        </p:nvSpPr>
+        <p:spPr/>
+        <p:txBody>
+          <a:bodyPr>
+            <a:normAutofit/>
+          </a:bodyPr>
+          <a:lstStyle/>
+          <a:p>
+            <a:r>
+              <a:rPr lang="pt-BR" sz="2800" dirty="0" smtClean="0"/>
+              <a:t>Criar verão híbrida do aplicativo </a:t>
+            </a:r>
+            <a:r>
+              <a:rPr lang="pt-BR" sz="2800" i="1" dirty="0" smtClean="0"/>
+              <a:t>ERR</a:t>
+            </a:r>
+            <a:r>
+              <a:rPr lang="pt-BR" sz="2800" dirty="0" smtClean="0"/>
+              <a:t>;</a:t>
+            </a:r>
+          </a:p>
+          <a:p>
+            <a:r>
+              <a:rPr lang="pt-BR" sz="2800" dirty="0" smtClean="0"/>
+              <a:t>Implementar sistema de autenticação na conexão com o </a:t>
+            </a:r>
+            <a:r>
+              <a:rPr lang="pt-BR" sz="2800" dirty="0" err="1" smtClean="0"/>
+              <a:t>Firebase</a:t>
+            </a:r>
+            <a:r>
+              <a:rPr lang="pt-BR" sz="2800" dirty="0" smtClean="0"/>
+              <a:t>;</a:t>
+            </a:r>
+            <a:endParaRPr lang="pt-BR" sz="2800" dirty="0" smtClean="0"/>
+          </a:p>
+          <a:p>
+            <a:r>
+              <a:rPr lang="pt-BR" sz="2800" dirty="0" smtClean="0"/>
+              <a:t>Permitir utilização de outros modelos (como o BEIR VII) de cálculo de risco para outros tipos de cânceres.</a:t>
+            </a:r>
+          </a:p>
+        </p:txBody>
+      </p:sp>
     </p:spTree>
   </p:cSld>
   <p:clrMapOvr>
@@ -8228,346 +8301,6 @@
           <a:p>
             <a:r>
               <a:rPr lang="pt-BR" sz="4000" dirty="0" smtClean="0"/>
-              <a:t>Conclusão</a:t>
-            </a:r>
-            <a:endParaRPr lang="pt-BR" sz="4000" dirty="0"/>
-          </a:p>
-        </p:txBody>
-      </p:sp>
-      <p:sp>
-        <p:nvSpPr>
-          <p:cNvPr id="3" name="Espaço Reservado para Conteúdo 2"/>
-          <p:cNvSpPr>
-            <a:spLocks noGrp="1"/>
-          </p:cNvSpPr>
-          <p:nvPr>
-            <p:ph idx="1"/>
-          </p:nvPr>
-        </p:nvSpPr>
-        <p:spPr/>
-        <p:txBody>
-          <a:bodyPr>
-            <a:normAutofit fontScale="92500" lnSpcReduction="10000"/>
-          </a:bodyPr>
-          <a:lstStyle/>
-          <a:p>
-            <a:r>
-              <a:rPr lang="pt-BR" sz="2800" dirty="0" smtClean="0"/>
-              <a:t>O sistema desenvolvido neste trabalho pode ser usado na população que foi exposta a baixas doses de radiação (abaixo de 100 </a:t>
-            </a:r>
-            <a:r>
-              <a:rPr lang="pt-BR" sz="2800" dirty="0" err="1" smtClean="0"/>
-              <a:t>mSv</a:t>
-            </a:r>
-            <a:r>
-              <a:rPr lang="pt-BR" sz="2800" dirty="0" smtClean="0"/>
-              <a:t>);</a:t>
-            </a:r>
-          </a:p>
-          <a:p>
-            <a:r>
-              <a:rPr lang="pt-BR" sz="2800" dirty="0" smtClean="0"/>
-              <a:t>P</a:t>
-            </a:r>
-            <a:r>
-              <a:rPr lang="pt-BR" sz="2800" dirty="0" smtClean="0"/>
-              <a:t>ode ser utilizado como ferramenta auxiliar no processo decisório por órgãos competentes perante eventos radiológicos (atentados ou não);</a:t>
-            </a:r>
-          </a:p>
-          <a:p>
-            <a:r>
-              <a:rPr lang="pt-BR" sz="2800" dirty="0" smtClean="0"/>
-              <a:t>Também pode contribuir para que envolvidos nos eventos radiológicos que tenham interesse direto na resolução do problema e na busca das pessoas afetadas, possam decidir quais vítimas terão prioridade no atendimento médico após exposição.</a:t>
-            </a:r>
-            <a:endParaRPr lang="pt-BR" sz="2800" dirty="0"/>
-          </a:p>
-        </p:txBody>
-      </p:sp>
-    </p:spTree>
-  </p:cSld>
-  <p:clrMapOvr>
-    <a:masterClrMapping/>
-  </p:clrMapOvr>
-</p:sld>
-</file>
-
-<file path=ppt/slides/slide44.xml><?xml version="1.0" encoding="utf-8"?>
-<p:sld xmlns:a="http://schemas.openxmlformats.org/drawingml/2006/main" xmlns:r="http://schemas.openxmlformats.org/officeDocument/2006/relationships" xmlns:p="http://schemas.openxmlformats.org/presentationml/2006/main">
-  <p:cSld>
-    <p:spTree>
-      <p:nvGrpSpPr>
-        <p:cNvPr id="1" name=""/>
-        <p:cNvGrpSpPr/>
-        <p:nvPr/>
-      </p:nvGrpSpPr>
-      <p:grpSpPr>
-        <a:xfrm>
-          <a:off x="0" y="0"/>
-          <a:ext cx="0" cy="0"/>
-          <a:chOff x="0" y="0"/>
-          <a:chExt cx="0" cy="0"/>
-        </a:xfrm>
-      </p:grpSpPr>
-      <p:sp>
-        <p:nvSpPr>
-          <p:cNvPr id="2" name="Título 1"/>
-          <p:cNvSpPr>
-            <a:spLocks noGrp="1"/>
-          </p:cNvSpPr>
-          <p:nvPr>
-            <p:ph type="title"/>
-          </p:nvPr>
-        </p:nvSpPr>
-        <p:spPr/>
-        <p:txBody>
-          <a:bodyPr>
-            <a:normAutofit/>
-          </a:bodyPr>
-          <a:lstStyle/>
-          <a:p>
-            <a:r>
-              <a:rPr lang="pt-BR" sz="4000" dirty="0" smtClean="0"/>
-              <a:t>Trabalhos Futuros</a:t>
-            </a:r>
-            <a:endParaRPr lang="pt-BR" sz="4000" dirty="0"/>
-          </a:p>
-        </p:txBody>
-      </p:sp>
-      <p:sp>
-        <p:nvSpPr>
-          <p:cNvPr id="3" name="Espaço Reservado para Conteúdo 2"/>
-          <p:cNvSpPr>
-            <a:spLocks noGrp="1"/>
-          </p:cNvSpPr>
-          <p:nvPr>
-            <p:ph idx="1"/>
-          </p:nvPr>
-        </p:nvSpPr>
-        <p:spPr/>
-        <p:txBody>
-          <a:bodyPr>
-            <a:normAutofit lnSpcReduction="10000"/>
-          </a:bodyPr>
-          <a:lstStyle/>
-          <a:p>
-            <a:r>
-              <a:rPr lang="pt-BR" sz="2800" dirty="0" smtClean="0"/>
-              <a:t>Implementar um banco de dados próprio nas aplicações </a:t>
-            </a:r>
-            <a:r>
-              <a:rPr lang="pt-BR" sz="2800" i="1" dirty="0" smtClean="0"/>
-              <a:t>desktop Análise de Risco</a:t>
-            </a:r>
-            <a:r>
-              <a:rPr lang="pt-BR" sz="2800" dirty="0" smtClean="0"/>
-              <a:t> e </a:t>
-            </a:r>
-            <a:r>
-              <a:rPr lang="pt-BR" sz="2800" i="1" dirty="0" err="1" smtClean="0"/>
-              <a:t>mobile</a:t>
-            </a:r>
-            <a:r>
-              <a:rPr lang="pt-BR" sz="2800" i="1" dirty="0" smtClean="0"/>
-              <a:t> ERR;</a:t>
-            </a:r>
-          </a:p>
-          <a:p>
-            <a:r>
-              <a:rPr lang="pt-BR" sz="2800" dirty="0" smtClean="0"/>
-              <a:t>Implementar uma interface </a:t>
-            </a:r>
-            <a:r>
-              <a:rPr lang="pt-BR" sz="2800" i="1" dirty="0" smtClean="0"/>
-              <a:t>web</a:t>
-            </a:r>
-            <a:r>
-              <a:rPr lang="pt-BR" sz="2800" dirty="0" smtClean="0"/>
-              <a:t> mais robusta na aplicação </a:t>
-            </a:r>
-            <a:r>
-              <a:rPr lang="pt-BR" sz="2800" i="1" dirty="0" smtClean="0"/>
-              <a:t>Análise de Risco</a:t>
-            </a:r>
-            <a:r>
-              <a:rPr lang="pt-BR" sz="2800" dirty="0" smtClean="0"/>
-              <a:t>;</a:t>
-            </a:r>
-          </a:p>
-          <a:p>
-            <a:r>
-              <a:rPr lang="pt-BR" sz="2800" dirty="0" smtClean="0"/>
-              <a:t>Implementar opções de visualizações com outros tipos de gráficos;</a:t>
-            </a:r>
-          </a:p>
-          <a:p>
-            <a:r>
-              <a:rPr lang="pt-BR" sz="2800" dirty="0" smtClean="0"/>
-              <a:t>Utilizar outros dados contidos em outras colunas dos arquivos de levantamento radiométrico aéreo;</a:t>
-            </a:r>
-          </a:p>
-          <a:p>
-            <a:r>
-              <a:rPr lang="pt-BR" sz="2800" dirty="0" smtClean="0"/>
-              <a:t>Implementar sistema de notificações na aplicação </a:t>
-            </a:r>
-            <a:r>
-              <a:rPr lang="pt-BR" sz="2800" i="1" dirty="0" smtClean="0"/>
-              <a:t>ERR;</a:t>
-            </a:r>
-            <a:endParaRPr lang="pt-BR" sz="2800" dirty="0" smtClean="0"/>
-          </a:p>
-        </p:txBody>
-      </p:sp>
-    </p:spTree>
-  </p:cSld>
-  <p:clrMapOvr>
-    <a:masterClrMapping/>
-  </p:clrMapOvr>
-</p:sld>
-</file>
-
-<file path=ppt/slides/slide45.xml><?xml version="1.0" encoding="utf-8"?>
-<p:sld xmlns:a="http://schemas.openxmlformats.org/drawingml/2006/main" xmlns:r="http://schemas.openxmlformats.org/officeDocument/2006/relationships" xmlns:p="http://schemas.openxmlformats.org/presentationml/2006/main">
-  <p:cSld>
-    <p:spTree>
-      <p:nvGrpSpPr>
-        <p:cNvPr id="1" name=""/>
-        <p:cNvGrpSpPr/>
-        <p:nvPr/>
-      </p:nvGrpSpPr>
-      <p:grpSpPr>
-        <a:xfrm>
-          <a:off x="0" y="0"/>
-          <a:ext cx="0" cy="0"/>
-          <a:chOff x="0" y="0"/>
-          <a:chExt cx="0" cy="0"/>
-        </a:xfrm>
-      </p:grpSpPr>
-      <p:sp>
-        <p:nvSpPr>
-          <p:cNvPr id="2" name="Título 1"/>
-          <p:cNvSpPr>
-            <a:spLocks noGrp="1"/>
-          </p:cNvSpPr>
-          <p:nvPr>
-            <p:ph type="title"/>
-          </p:nvPr>
-        </p:nvSpPr>
-        <p:spPr/>
-        <p:txBody>
-          <a:bodyPr>
-            <a:normAutofit/>
-          </a:bodyPr>
-          <a:lstStyle/>
-          <a:p>
-            <a:r>
-              <a:rPr lang="pt-BR" sz="4000" dirty="0" smtClean="0"/>
-              <a:t>Trabalhos Futuros</a:t>
-            </a:r>
-            <a:endParaRPr lang="pt-BR" sz="4000" dirty="0"/>
-          </a:p>
-        </p:txBody>
-      </p:sp>
-      <p:sp>
-        <p:nvSpPr>
-          <p:cNvPr id="3" name="Espaço Reservado para Conteúdo 2"/>
-          <p:cNvSpPr>
-            <a:spLocks noGrp="1"/>
-          </p:cNvSpPr>
-          <p:nvPr>
-            <p:ph idx="1"/>
-          </p:nvPr>
-        </p:nvSpPr>
-        <p:spPr/>
-        <p:txBody>
-          <a:bodyPr>
-            <a:normAutofit/>
-          </a:bodyPr>
-          <a:lstStyle/>
-          <a:p>
-            <a:r>
-              <a:rPr lang="pt-BR" sz="2800" dirty="0" smtClean="0"/>
-              <a:t>Criar ver</a:t>
-            </a:r>
-            <a:r>
-              <a:rPr lang="pt-BR" sz="2800" dirty="0" smtClean="0"/>
-              <a:t>ão híbrida do aplicativo </a:t>
-            </a:r>
-            <a:r>
-              <a:rPr lang="pt-BR" sz="2800" i="1" dirty="0" smtClean="0"/>
-              <a:t>ERR</a:t>
-            </a:r>
-            <a:r>
-              <a:rPr lang="pt-BR" sz="2800" dirty="0" smtClean="0"/>
-              <a:t>;</a:t>
-            </a:r>
-          </a:p>
-          <a:p>
-            <a:r>
-              <a:rPr lang="pt-BR" sz="2800" dirty="0" smtClean="0"/>
-              <a:t>Implementar sistema de autenticação na conexão com o </a:t>
-            </a:r>
-            <a:r>
-              <a:rPr lang="pt-BR" sz="2800" dirty="0" err="1" smtClean="0"/>
-              <a:t>Firebase</a:t>
-            </a:r>
-            <a:r>
-              <a:rPr lang="pt-BR" sz="2800" dirty="0" smtClean="0"/>
-              <a:t>®;</a:t>
-            </a:r>
-          </a:p>
-          <a:p>
-            <a:r>
-              <a:rPr lang="pt-BR" sz="2800" dirty="0" smtClean="0"/>
-              <a:t>Permitir utilização de outros modelos (como o BEIR VII) de cálculo de risco para outros tipos de cânceres.</a:t>
-            </a:r>
-          </a:p>
-        </p:txBody>
-      </p:sp>
-    </p:spTree>
-  </p:cSld>
-  <p:clrMapOvr>
-    <a:masterClrMapping/>
-  </p:clrMapOvr>
-</p:sld>
-</file>
-
-<file path=ppt/slides/slide46.xml><?xml version="1.0" encoding="utf-8"?>
-<p:sld xmlns:a="http://schemas.openxmlformats.org/drawingml/2006/main" xmlns:r="http://schemas.openxmlformats.org/officeDocument/2006/relationships" xmlns:p="http://schemas.openxmlformats.org/presentationml/2006/main">
-  <p:cSld>
-    <p:spTree>
-      <p:nvGrpSpPr>
-        <p:cNvPr id="1" name=""/>
-        <p:cNvGrpSpPr/>
-        <p:nvPr/>
-      </p:nvGrpSpPr>
-      <p:grpSpPr>
-        <a:xfrm>
-          <a:off x="0" y="0"/>
-          <a:ext cx="0" cy="0"/>
-          <a:chOff x="0" y="0"/>
-          <a:chExt cx="0" cy="0"/>
-        </a:xfrm>
-      </p:grpSpPr>
-      <p:sp>
-        <p:nvSpPr>
-          <p:cNvPr id="2" name="Título 1"/>
-          <p:cNvSpPr>
-            <a:spLocks noGrp="1"/>
-          </p:cNvSpPr>
-          <p:nvPr>
-            <p:ph type="title"/>
-          </p:nvPr>
-        </p:nvSpPr>
-        <p:spPr/>
-        <p:txBody>
-          <a:bodyPr>
-            <a:normAutofit/>
-          </a:bodyPr>
-          <a:lstStyle/>
-          <a:p>
-            <a:r>
-              <a:rPr lang="pt-BR" sz="4000" dirty="0" smtClean="0"/>
               <a:t>Referências</a:t>
             </a:r>
             <a:endParaRPr lang="pt-BR" sz="4000" dirty="0"/>
@@ -8605,11 +8338,7 @@
             </a:r>
             <a:r>
               <a:rPr lang="pt-BR" sz="2800" dirty="0" smtClean="0"/>
-              <a:t>ISBN 978-0-309-09156-5 | DOI 10.17226/11340, </a:t>
-            </a:r>
-            <a:r>
-              <a:rPr lang="pt-BR" sz="2800" dirty="0" smtClean="0"/>
-              <a:t>2006.</a:t>
+              <a:t>ISBN 978-0-309-09156-5 | DOI 10.17226/11340, 2006.</a:t>
             </a:r>
           </a:p>
           <a:p>
@@ -8623,11 +8352,7 @@
             </a:r>
             <a:r>
               <a:rPr lang="pt-BR" sz="2800" dirty="0" smtClean="0"/>
-              <a:t>. https://www.nobelprize.org/prizes/physics/1903/marie-curie/biographical</a:t>
-            </a:r>
-            <a:r>
-              <a:rPr lang="pt-BR" sz="2800" dirty="0" smtClean="0"/>
-              <a:t>/.</a:t>
+              <a:t>. https://www.nobelprize.org/prizes/physics/1903/marie-curie/biographical/.</a:t>
             </a:r>
           </a:p>
           <a:p>
@@ -8641,11 +8366,7 @@
             </a:r>
             <a:r>
               <a:rPr lang="pt-BR" sz="2800" dirty="0" smtClean="0"/>
-              <a:t>. Tese (Doutorado em Radioproteção e Dosimetria). Rio de Janeiro: IRD/CNEN, </a:t>
-            </a:r>
-            <a:r>
-              <a:rPr lang="pt-BR" sz="2800" dirty="0" smtClean="0"/>
-              <a:t>2018.</a:t>
+              <a:t>. Tese (Doutorado em Radioproteção e Dosimetria). Rio de Janeiro: IRD/CNEN, 2018.</a:t>
             </a:r>
           </a:p>
           <a:p>
@@ -8671,11 +8392,7 @@
             </a:r>
             <a:r>
               <a:rPr lang="pt-BR" sz="2800" dirty="0" smtClean="0"/>
-              <a:t>. Rio de Janeiro: IRD, CNEN, 10ª Revisão, </a:t>
-            </a:r>
-            <a:r>
-              <a:rPr lang="pt-BR" sz="2800" dirty="0" smtClean="0"/>
-              <a:t>2014.</a:t>
+              <a:t>. Rio de Janeiro: IRD, CNEN, 10ª Revisão, 2014.</a:t>
             </a:r>
             <a:endParaRPr lang="pt-BR" sz="2800" dirty="0"/>
           </a:p>
@@ -8708,7 +8425,7 @@
       </p:grpSpPr>
       <p:sp>
         <p:nvSpPr>
-          <p:cNvPr id="4" name="Título 3"/>
+          <p:cNvPr id="2" name="Título 1"/>
           <p:cNvSpPr>
             <a:spLocks noGrp="1"/>
           </p:cNvSpPr>
@@ -8725,35 +8442,64 @@
           <a:p>
             <a:r>
               <a:rPr lang="pt-BR" sz="4000" dirty="0" smtClean="0"/>
-              <a:t>Fluxo do sistema</a:t>
+              <a:t>Radiação ionizante</a:t>
             </a:r>
             <a:endParaRPr lang="pt-BR" sz="4000" dirty="0"/>
           </a:p>
         </p:txBody>
       </p:sp>
-      <p:pic>
-        <p:nvPicPr>
-          <p:cNvPr id="6" name="Espaço Reservado para Conteúdo 5" descr="cenário proposto.png"/>
-          <p:cNvPicPr>
-            <a:picLocks noGrp="1" noChangeAspect="1"/>
-          </p:cNvPicPr>
+      <p:sp>
+        <p:nvSpPr>
+          <p:cNvPr id="3" name="Espaço Reservado para Conteúdo 2"/>
+          <p:cNvSpPr>
+            <a:spLocks noGrp="1"/>
+          </p:cNvSpPr>
           <p:nvPr>
             <p:ph idx="1"/>
           </p:nvPr>
-        </p:nvPicPr>
-        <p:blipFill>
-          <a:blip r:embed="rId2" cstate="print"/>
-          <a:stretch>
-            <a:fillRect/>
-          </a:stretch>
-        </p:blipFill>
-        <p:spPr>
-          <a:xfrm>
-            <a:off x="1554691" y="1600200"/>
-            <a:ext cx="6034617" cy="4525963"/>
-          </a:xfrm>
-        </p:spPr>
-      </p:pic>
+        </p:nvSpPr>
+        <p:spPr/>
+        <p:txBody>
+          <a:bodyPr>
+            <a:normAutofit lnSpcReduction="10000"/>
+          </a:bodyPr>
+          <a:lstStyle/>
+          <a:p>
+            <a:r>
+              <a:rPr lang="pt-BR" sz="2800" dirty="0" smtClean="0"/>
+              <a:t>É a radiação que possui capacidade energética suficiente para arrancar um elétron de um átomo ou de uma molécula, transformando-o em um par de íons;</a:t>
+            </a:r>
+          </a:p>
+          <a:p>
+            <a:r>
+              <a:rPr lang="pt-BR" sz="2800" dirty="0" smtClean="0"/>
+              <a:t>Partículas carregadas como elétrons, prótons e partículas-alfa são definidas como diretamente ionizantes, ou seja, são capazes de produzir ionização em um meio;</a:t>
+            </a:r>
+          </a:p>
+          <a:p>
+            <a:r>
+              <a:rPr lang="pt-BR" sz="2800" dirty="0" smtClean="0"/>
+              <a:t>Indiretamente ionizantes são as partículas sem carga: fótons (raios X e raios </a:t>
+            </a:r>
+            <a:r>
+              <a:rPr lang="pt-BR" sz="2800" dirty="0" smtClean="0"/>
+              <a:t>gama </a:t>
+            </a:r>
+            <a:r>
+              <a:rPr lang="pt-BR" sz="2800" dirty="0" smtClean="0"/>
+              <a:t>(</a:t>
+            </a:r>
+            <a:r>
+              <a:rPr lang="el-GR" sz="2800" dirty="0" smtClean="0"/>
+              <a:t>γ</a:t>
+            </a:r>
+            <a:r>
+              <a:rPr lang="pt-BR" sz="2800" dirty="0" smtClean="0"/>
+              <a:t>)) e nêutrons.</a:t>
+            </a:r>
+          </a:p>
+        </p:txBody>
+      </p:sp>
     </p:spTree>
   </p:cSld>
   <p:clrMapOvr>
@@ -8798,11 +8544,7 @@
           <a:p>
             <a:r>
               <a:rPr lang="pt-BR" sz="4000" dirty="0" smtClean="0"/>
-              <a:t>Radiação </a:t>
-            </a:r>
-            <a:r>
-              <a:rPr lang="pt-BR" sz="4000" dirty="0" smtClean="0"/>
-              <a:t>ionizante</a:t>
+              <a:t>Radiação ionizante</a:t>
             </a:r>
             <a:endParaRPr lang="pt-BR" sz="4000" dirty="0"/>
           </a:p>
@@ -8821,41 +8563,13 @@
         <p:spPr/>
         <p:txBody>
           <a:bodyPr>
-            <a:normAutofit lnSpcReduction="10000"/>
+            <a:normAutofit/>
           </a:bodyPr>
           <a:lstStyle/>
           <a:p>
             <a:r>
               <a:rPr lang="pt-BR" sz="2800" dirty="0" smtClean="0"/>
-              <a:t>É a radiação que possui capacidade energética suficiente para arrancar um elétron de um átomo ou de uma molécula, </a:t>
-            </a:r>
-            <a:r>
-              <a:rPr lang="pt-BR" sz="2800" dirty="0" smtClean="0"/>
-              <a:t>transformando-o </a:t>
-            </a:r>
-            <a:r>
-              <a:rPr lang="pt-BR" sz="2800" dirty="0" smtClean="0"/>
-              <a:t>em um par de íons;</a:t>
-            </a:r>
-          </a:p>
-          <a:p>
-            <a:r>
-              <a:rPr lang="pt-BR" sz="2800" dirty="0" smtClean="0"/>
-              <a:t>Partículas carregadas como elétrons, prótons e partículas-alfa são definidas como diretamente ionizantes, ou seja, são capazes de produzir ionização em um meio;</a:t>
-            </a:r>
-          </a:p>
-          <a:p>
-            <a:r>
-              <a:rPr lang="pt-BR" sz="2800" dirty="0" smtClean="0"/>
-              <a:t>Indiretamente ionizantes são as partículas sem carga: fótons (raios X e raios Gama (</a:t>
-            </a:r>
-            <a:r>
-              <a:rPr lang="el-GR" sz="2800" dirty="0" smtClean="0"/>
-              <a:t>γ</a:t>
-            </a:r>
-            <a:r>
-              <a:rPr lang="pt-BR" sz="2800" dirty="0" smtClean="0"/>
-              <a:t>)) e nêutrons.</a:t>
+              <a:t>Por terem energia suficiente para ionizar átomos e moléculas, as radiações são capazes de alterar conformações eletroquímicas, resultando em elétrons livres de alta energia, íons positivos ou radicais livres, que são responsáveis por produzir quebras de ligações químicas de uma célula.</a:t>
             </a:r>
           </a:p>
         </p:txBody>
@@ -8903,41 +8617,52 @@
           <a:lstStyle/>
           <a:p>
             <a:r>
+              <a:rPr lang="en-US" sz="4000" dirty="0" err="1" smtClean="0"/>
+              <a:t>Radia</a:t>
+            </a:r>
+            <a:r>
+              <a:rPr lang="pt-BR" sz="4000" dirty="0" err="1" smtClean="0"/>
+              <a:t>ção</a:t>
+            </a:r>
+            <a:r>
               <a:rPr lang="pt-BR" sz="4000" dirty="0" smtClean="0"/>
-              <a:t>Radiação </a:t>
-            </a:r>
-            <a:r>
-              <a:rPr lang="pt-BR" sz="4000" dirty="0" smtClean="0"/>
-              <a:t>ionizante</a:t>
+              <a:t> ionizante</a:t>
             </a:r>
             <a:endParaRPr lang="pt-BR" sz="4000" dirty="0"/>
           </a:p>
         </p:txBody>
       </p:sp>
-      <p:sp>
-        <p:nvSpPr>
-          <p:cNvPr id="3" name="Espaço Reservado para Conteúdo 2"/>
-          <p:cNvSpPr>
-            <a:spLocks noGrp="1"/>
-          </p:cNvSpPr>
+      <p:pic>
+        <p:nvPicPr>
+          <p:cNvPr id="4" name="Espaço Reservado para Conteúdo 3" descr="ionization_por.jpg"/>
+          <p:cNvPicPr>
+            <a:picLocks noGrp="1" noChangeAspect="1"/>
+          </p:cNvPicPr>
           <p:nvPr>
             <p:ph idx="1"/>
           </p:nvPr>
-        </p:nvSpPr>
-        <p:spPr/>
-        <p:txBody>
-          <a:bodyPr>
-            <a:normAutofit/>
-          </a:bodyPr>
-          <a:lstStyle/>
-          <a:p>
-            <a:r>
-              <a:rPr lang="pt-BR" sz="2800" dirty="0" smtClean="0"/>
-              <a:t>Por terem energia suficiente para ionizar átomos e moléculas, as radiações são capazes de alterar conformações eletroquímicas, resultando em elétrons livres de alta energia, íons positivos ou radicais livres, que são responsáveis por produzir quebras de ligações químicas de uma célula.</a:t>
-            </a:r>
-          </a:p>
-        </p:txBody>
-      </p:sp>
+        </p:nvPicPr>
+        <p:blipFill>
+          <a:blip r:embed="rId2" cstate="print"/>
+          <a:stretch>
+            <a:fillRect/>
+          </a:stretch>
+        </p:blipFill>
+        <p:spPr>
+          <a:xfrm>
+            <a:off x="1557337" y="1877219"/>
+            <a:ext cx="6029325" cy="3971925"/>
+          </a:xfrm>
+          <a:ln>
+            <a:solidFill>
+              <a:schemeClr val="tx1">
+                <a:lumMod val="95000"/>
+                <a:lumOff val="5000"/>
+              </a:schemeClr>
+            </a:solidFill>
+          </a:ln>
+        </p:spPr>
+      </p:pic>
     </p:spTree>
   </p:cSld>
   <p:clrMapOvr>
@@ -8981,48 +8706,146 @@
           <a:lstStyle/>
           <a:p>
             <a:r>
-              <a:rPr lang="en-US" sz="4000" dirty="0" err="1" smtClean="0"/>
-              <a:t>Radia</a:t>
-            </a:r>
-            <a:r>
-              <a:rPr lang="pt-BR" sz="4000" dirty="0" err="1" smtClean="0"/>
-              <a:t>ção</a:t>
-            </a:r>
-            <a:r>
               <a:rPr lang="pt-BR" sz="4000" dirty="0" smtClean="0"/>
+              <a:t>Fontes naturais e artificiais de radiação</a:t>
+            </a:r>
+            <a:endParaRPr lang="pt-BR" sz="4000" dirty="0"/>
+          </a:p>
+        </p:txBody>
+      </p:sp>
+      <p:sp>
+        <p:nvSpPr>
+          <p:cNvPr id="3" name="Espaço Reservado para Conteúdo 2"/>
+          <p:cNvSpPr>
+            <a:spLocks noGrp="1"/>
+          </p:cNvSpPr>
+          <p:nvPr>
+            <p:ph idx="1"/>
+          </p:nvPr>
+        </p:nvSpPr>
+        <p:spPr/>
+        <p:txBody>
+          <a:bodyPr>
+            <a:normAutofit lnSpcReduction="10000"/>
+          </a:bodyPr>
+          <a:lstStyle/>
+          <a:p>
+            <a:r>
+              <a:rPr lang="pt-BR" sz="2800" dirty="0" smtClean="0"/>
+              <a:t>Fonte natural:</a:t>
+            </a:r>
+          </a:p>
+          <a:p>
+            <a:pPr lvl="1"/>
+            <a:r>
+              <a:rPr lang="pt-BR" dirty="0" smtClean="0"/>
+              <a:t>Radiação cósmica:</a:t>
+            </a:r>
+          </a:p>
+          <a:p>
+            <a:pPr lvl="2"/>
+            <a:r>
+              <a:rPr lang="pt-BR" dirty="0" smtClean="0"/>
+              <a:t>Elementos químicos sintetizados no momento da explosão de uma supernova, que são dispersos através do espaço sideral.</a:t>
+            </a:r>
+          </a:p>
+          <a:p>
+            <a:r>
+              <a:rPr lang="pt-BR" sz="2800" dirty="0" smtClean="0"/>
+              <a:t>Fontes artificiais:</a:t>
+            </a:r>
+          </a:p>
+          <a:p>
+            <a:pPr lvl="1"/>
+            <a:r>
+              <a:rPr lang="pt-BR" sz="2400" dirty="0" smtClean="0"/>
+              <a:t>Dispositivos de diagnóstico e terapia na medicina;</a:t>
+            </a:r>
+          </a:p>
+          <a:p>
+            <a:pPr lvl="1"/>
+            <a:r>
+              <a:rPr lang="en-US" sz="2400" dirty="0" err="1" smtClean="0"/>
+              <a:t>Aparelhos</a:t>
+            </a:r>
+            <a:r>
+              <a:rPr lang="en-US" sz="2400" dirty="0" smtClean="0"/>
               <a:t> </a:t>
             </a:r>
             <a:r>
-              <a:rPr lang="pt-BR" sz="4000" dirty="0" smtClean="0"/>
-              <a:t>ionizante</a:t>
-            </a:r>
-            <a:endParaRPr lang="pt-BR" sz="4000" dirty="0"/>
-          </a:p>
-        </p:txBody>
-      </p:sp>
-      <p:pic>
-        <p:nvPicPr>
-          <p:cNvPr id="4" name="Espaço Reservado para Conteúdo 3" descr="ionization_por.jpg"/>
-          <p:cNvPicPr>
-            <a:picLocks noGrp="1" noChangeAspect="1"/>
-          </p:cNvPicPr>
-          <p:nvPr>
-            <p:ph idx="1"/>
-          </p:nvPr>
-        </p:nvPicPr>
-        <p:blipFill>
-          <a:blip r:embed="rId2" cstate="print"/>
-          <a:stretch>
-            <a:fillRect/>
-          </a:stretch>
-        </p:blipFill>
-        <p:spPr>
-          <a:xfrm>
-            <a:off x="1557337" y="1877219"/>
-            <a:ext cx="6029325" cy="3971925"/>
-          </a:xfrm>
-        </p:spPr>
-      </p:pic>
+              <a:rPr lang="en-US" sz="2400" dirty="0" err="1" smtClean="0"/>
+              <a:t>m</a:t>
+            </a:r>
+            <a:r>
+              <a:rPr lang="en-US" sz="2400" dirty="0" err="1" smtClean="0"/>
+              <a:t>edidores</a:t>
+            </a:r>
+            <a:r>
+              <a:rPr lang="en-US" sz="2400" dirty="0" smtClean="0"/>
+              <a:t> </a:t>
+            </a:r>
+            <a:r>
+              <a:rPr lang="en-US" sz="2400" dirty="0" smtClean="0"/>
+              <a:t>e </a:t>
+            </a:r>
+            <a:r>
+              <a:rPr lang="en-US" sz="2400" dirty="0" smtClean="0"/>
+              <a:t>de </a:t>
+            </a:r>
+            <a:r>
+              <a:rPr lang="en-US" sz="2400" dirty="0" err="1" smtClean="0"/>
+              <a:t>radiografias</a:t>
+            </a:r>
+            <a:r>
+              <a:rPr lang="en-US" sz="2400" dirty="0" smtClean="0"/>
+              <a:t> </a:t>
+            </a:r>
+            <a:r>
+              <a:rPr lang="en-US" sz="2400" dirty="0" err="1" smtClean="0"/>
+              <a:t>usados</a:t>
+            </a:r>
+            <a:r>
+              <a:rPr lang="en-US" sz="2400" dirty="0" smtClean="0"/>
+              <a:t> </a:t>
+            </a:r>
+            <a:r>
+              <a:rPr lang="en-US" sz="2400" dirty="0" err="1" smtClean="0"/>
+              <a:t>na</a:t>
+            </a:r>
+            <a:r>
+              <a:rPr lang="en-US" sz="2400" dirty="0" smtClean="0"/>
+              <a:t> </a:t>
+            </a:r>
+            <a:r>
+              <a:rPr lang="en-US" sz="2400" dirty="0" err="1" smtClean="0"/>
+              <a:t>ind</a:t>
+            </a:r>
+            <a:r>
+              <a:rPr lang="pt-BR" sz="2400" dirty="0" err="1" smtClean="0"/>
+              <a:t>ústria</a:t>
+            </a:r>
+            <a:r>
+              <a:rPr lang="pt-BR" sz="2400" dirty="0" smtClean="0"/>
+              <a:t> e comércio;</a:t>
+            </a:r>
+          </a:p>
+          <a:p>
+            <a:pPr lvl="1"/>
+            <a:r>
+              <a:rPr lang="pt-BR" sz="2400" dirty="0" smtClean="0"/>
+              <a:t>Instalações do ciclo de combustível nuclear e máquinas utilizadas nas pesquisas científicas.</a:t>
+            </a:r>
+          </a:p>
+          <a:p>
+            <a:pPr lvl="1"/>
+            <a:endParaRPr lang="pt-BR" sz="2400" dirty="0" smtClean="0"/>
+          </a:p>
+          <a:p>
+            <a:pPr lvl="1"/>
+            <a:endParaRPr lang="pt-BR" dirty="0"/>
+          </a:p>
+        </p:txBody>
+      </p:sp>
     </p:spTree>
   </p:cSld>
   <p:clrMapOvr>
@@ -9066,20 +8889,8 @@
           <a:lstStyle/>
           <a:p>
             <a:r>
-              <a:rPr lang="en-US" sz="4000" dirty="0" err="1" smtClean="0"/>
-              <a:t>Radia</a:t>
-            </a:r>
-            <a:r>
-              <a:rPr lang="pt-BR" sz="4000" dirty="0" err="1" smtClean="0"/>
-              <a:t>ção</a:t>
-            </a:r>
-            <a:r>
               <a:rPr lang="pt-BR" sz="4000" dirty="0" smtClean="0"/>
-              <a:t> </a:t>
-            </a:r>
-            <a:r>
-              <a:rPr lang="pt-BR" sz="4000" dirty="0" smtClean="0"/>
-              <a:t>nuclear</a:t>
+              <a:t>Efeitos biológicos</a:t>
             </a:r>
             <a:endParaRPr lang="pt-BR" sz="4000" dirty="0"/>
           </a:p>
@@ -9104,21 +8915,32 @@
           <a:p>
             <a:r>
               <a:rPr lang="pt-BR" sz="2800" dirty="0" smtClean="0"/>
-              <a:t>Composta por partículas ou ondas eletromagnéticas emitidas pelo núcleo durante o processo de reestruturação interna, para atingir a estabilidade.</a:t>
-            </a:r>
-          </a:p>
-          <a:p>
-            <a:r>
-              <a:rPr lang="pt-BR" sz="2800" dirty="0" smtClean="0"/>
-              <a:t>Devido à intensidade das forças atuantes dentro do núcleo atômico, as radiações nucleares são altamente energéticas (se comparadas com as radiações emitidas pelas camadas eletrônicas).</a:t>
-            </a:r>
-          </a:p>
-          <a:p>
-            <a:r>
-              <a:rPr lang="pt-BR" sz="2800" dirty="0" smtClean="0"/>
-              <a:t>Essas radiações são indicadores das transformações do núcleo instável, na busca de estados estáveis.</a:t>
-            </a:r>
-            <a:endParaRPr lang="pt-BR" sz="2800" dirty="0"/>
+              <a:t>A relação entre exposição à radiação ionizante e os efeitos biológicos induzidos no homem foi estabelecida pela observação de efeitos danosos em pessoas nas primeiras exposições com raios X, e em exposições com </a:t>
+            </a:r>
+            <a:r>
+              <a:rPr lang="pt-BR" sz="2800" dirty="0" err="1" smtClean="0"/>
+              <a:t>radionuclídeos</a:t>
+            </a:r>
+            <a:r>
+              <a:rPr lang="pt-BR" sz="2800" dirty="0" smtClean="0"/>
+              <a:t> sofridas pelos pioneiros nas descobertas sobre radioatividade.</a:t>
+            </a:r>
+          </a:p>
+          <a:p>
+            <a:pPr lvl="1"/>
+            <a:r>
+              <a:rPr lang="pt-BR" sz="2400" dirty="0" smtClean="0"/>
+              <a:t>como exemplo o caso de Marie Curie, que, junto de seu marido, descobriu o polônio (</a:t>
+            </a:r>
+            <a:r>
+              <a:rPr lang="pt-BR" sz="2400" dirty="0" err="1" smtClean="0"/>
+              <a:t>Pu</a:t>
+            </a:r>
+            <a:r>
+              <a:rPr lang="pt-BR" sz="2400" dirty="0" smtClean="0"/>
+              <a:t>) e o rádio (Ra), e que faleceu por conta de uma grave leucemia devido à exposição maciça a radiação de suas descobertas.</a:t>
+            </a:r>
+            <a:endParaRPr lang="pt-BR" sz="2400" dirty="0"/>
           </a:p>
         </p:txBody>
       </p:sp>

</xml_diff>